<commit_message>
Add content for 3rd party Tag Helpers slide
</commit_message>
<xml_diff>
--- a/Building Reusable UI Components in ASP.NET Core MVC.pptx
+++ b/Building Reusable UI Components in ASP.NET Core MVC.pptx
@@ -6,7 +6,7 @@
     <p:sldMasterId id="2147483847" r:id="rId2"/>
   </p:sldMasterIdLst>
   <p:notesMasterIdLst>
-    <p:notesMasterId r:id="rId21"/>
+    <p:notesMasterId r:id="rId22"/>
   </p:notesMasterIdLst>
   <p:sldIdLst>
     <p:sldId id="323" r:id="rId3"/>
@@ -17,16 +17,17 @@
     <p:sldId id="332" r:id="rId8"/>
     <p:sldId id="333" r:id="rId9"/>
     <p:sldId id="338" r:id="rId10"/>
-    <p:sldId id="334" r:id="rId11"/>
-    <p:sldId id="325" r:id="rId12"/>
-    <p:sldId id="329" r:id="rId13"/>
-    <p:sldId id="327" r:id="rId14"/>
-    <p:sldId id="328" r:id="rId15"/>
-    <p:sldId id="330" r:id="rId16"/>
-    <p:sldId id="319" r:id="rId17"/>
-    <p:sldId id="336" r:id="rId18"/>
-    <p:sldId id="335" r:id="rId19"/>
-    <p:sldId id="320" r:id="rId20"/>
+    <p:sldId id="340" r:id="rId11"/>
+    <p:sldId id="334" r:id="rId12"/>
+    <p:sldId id="325" r:id="rId13"/>
+    <p:sldId id="329" r:id="rId14"/>
+    <p:sldId id="327" r:id="rId15"/>
+    <p:sldId id="328" r:id="rId16"/>
+    <p:sldId id="330" r:id="rId17"/>
+    <p:sldId id="319" r:id="rId18"/>
+    <p:sldId id="336" r:id="rId19"/>
+    <p:sldId id="335" r:id="rId20"/>
+    <p:sldId id="320" r:id="rId21"/>
   </p:sldIdLst>
   <p:sldSz cx="12192000" cy="6858000"/>
   <p:notesSz cx="6858000" cy="9144000"/>
@@ -143,6 +144,7 @@
             <p14:sldId id="332"/>
             <p14:sldId id="333"/>
             <p14:sldId id="338"/>
+            <p14:sldId id="340"/>
             <p14:sldId id="334"/>
             <p14:sldId id="325"/>
             <p14:sldId id="329"/>
@@ -249,7 +251,7 @@
           <a:p>
             <a:fld id="{3B87D1B5-D667-42F5-9E38-2FD202ABDFA0}" type="datetimeFigureOut">
               <a:rPr lang="en-US" smtClean="0"/>
-              <a:t>4/14/2017</a:t>
+              <a:t>4/17/2017</a:t>
             </a:fld>
             <a:endParaRPr lang="en-US"/>
           </a:p>
@@ -698,13 +700,23 @@
           <a:bodyPr/>
           <a:lstStyle/>
           <a:p>
-            <a:pPr marL="0" indent="0">
+            <a:pPr marL="171450" indent="-171450">
               <a:buFontTx/>
-              <a:buNone/>
+              <a:buChar char="-"/>
             </a:pPr>
             <a:r>
               <a:rPr lang="en-US" dirty="0"/>
-              <a:t>- Can’t use filters with them since they don’t participate in lifecycle</a:t>
+              <a:t>Similar to partial view</a:t>
+            </a:r>
+          </a:p>
+          <a:p>
+            <a:pPr marL="171450" indent="-171450">
+              <a:buFontTx/>
+              <a:buChar char="-"/>
+            </a:pPr>
+            <a:r>
+              <a:rPr lang="en-US" dirty="0"/>
+              <a:t>Only depends on data you provide when calling into it</a:t>
             </a:r>
           </a:p>
         </p:txBody>
@@ -735,7 +747,7 @@
     </p:spTree>
     <p:extLst>
       <p:ext uri="{BB962C8B-B14F-4D97-AF65-F5344CB8AC3E}">
-        <p14:creationId xmlns:p14="http://schemas.microsoft.com/office/powerpoint/2010/main" val="1921181592"/>
+        <p14:creationId xmlns:p14="http://schemas.microsoft.com/office/powerpoint/2010/main" val="2468047678"/>
       </p:ext>
     </p:extLst>
   </p:cSld>
@@ -793,7 +805,10 @@
               <a:buFontTx/>
               <a:buNone/>
             </a:pPr>
-            <a:endParaRPr lang="en-US" dirty="0"/>
+            <a:r>
+              <a:rPr lang="en-US" dirty="0"/>
+              <a:t>- Can’t use filters with them since they don’t participate in lifecycle</a:t>
+            </a:r>
           </a:p>
         </p:txBody>
       </p:sp>
@@ -823,7 +838,7 @@
     </p:spTree>
     <p:extLst>
       <p:ext uri="{BB962C8B-B14F-4D97-AF65-F5344CB8AC3E}">
-        <p14:creationId xmlns:p14="http://schemas.microsoft.com/office/powerpoint/2010/main" val="3621555814"/>
+        <p14:creationId xmlns:p14="http://schemas.microsoft.com/office/powerpoint/2010/main" val="1921181592"/>
       </p:ext>
     </p:extLst>
   </p:cSld>
@@ -911,7 +926,7 @@
     </p:spTree>
     <p:extLst>
       <p:ext uri="{BB962C8B-B14F-4D97-AF65-F5344CB8AC3E}">
-        <p14:creationId xmlns:p14="http://schemas.microsoft.com/office/powerpoint/2010/main" val="792856117"/>
+        <p14:creationId xmlns:p14="http://schemas.microsoft.com/office/powerpoint/2010/main" val="3621555814"/>
       </p:ext>
     </p:extLst>
   </p:cSld>
@@ -969,16 +984,6 @@
               <a:buFontTx/>
               <a:buNone/>
             </a:pPr>
-            <a:r>
-              <a:rPr lang="en-US" dirty="0"/>
-              <a:t>- Tag Helper </a:t>
-            </a:r>
-            <a:r>
-              <a:rPr lang="en-US" dirty="0">
-                <a:sym typeface="Wingdings" panose="05000000000000000000" pitchFamily="2" charset="2"/>
-              </a:rPr>
-              <a:t> ASP.NET Core 1.1+ ONLY</a:t>
-            </a:r>
             <a:endParaRPr lang="en-US" dirty="0"/>
           </a:p>
         </p:txBody>
@@ -1001,6 +1006,104 @@
             <a:fld id="{16A87904-88DE-4022-A424-ACD2E6FC1751}" type="slidenum">
               <a:rPr lang="en-US" smtClean="0"/>
               <a:t>14</a:t>
+            </a:fld>
+            <a:endParaRPr lang="en-US" dirty="0"/>
+          </a:p>
+        </p:txBody>
+      </p:sp>
+    </p:spTree>
+    <p:extLst>
+      <p:ext uri="{BB962C8B-B14F-4D97-AF65-F5344CB8AC3E}">
+        <p14:creationId xmlns:p14="http://schemas.microsoft.com/office/powerpoint/2010/main" val="792856117"/>
+      </p:ext>
+    </p:extLst>
+  </p:cSld>
+  <p:clrMapOvr>
+    <a:masterClrMapping/>
+  </p:clrMapOvr>
+</p:notes>
+</file>
+
+<file path=ppt/notesSlides/notesSlide14.xml><?xml version="1.0" encoding="utf-8"?>
+<p:notes xmlns:a="http://schemas.openxmlformats.org/drawingml/2006/main" xmlns:r="http://schemas.openxmlformats.org/officeDocument/2006/relationships" xmlns:p="http://schemas.openxmlformats.org/presentationml/2006/main">
+  <p:cSld>
+    <p:spTree>
+      <p:nvGrpSpPr>
+        <p:cNvPr id="1" name=""/>
+        <p:cNvGrpSpPr/>
+        <p:nvPr/>
+      </p:nvGrpSpPr>
+      <p:grpSpPr>
+        <a:xfrm>
+          <a:off x="0" y="0"/>
+          <a:ext cx="0" cy="0"/>
+          <a:chOff x="0" y="0"/>
+          <a:chExt cx="0" cy="0"/>
+        </a:xfrm>
+      </p:grpSpPr>
+      <p:sp>
+        <p:nvSpPr>
+          <p:cNvPr id="2" name="Slide Image Placeholder 1"/>
+          <p:cNvSpPr>
+            <a:spLocks noGrp="1" noRot="1" noChangeAspect="1"/>
+          </p:cNvSpPr>
+          <p:nvPr>
+            <p:ph type="sldImg"/>
+          </p:nvPr>
+        </p:nvSpPr>
+        <p:spPr/>
+      </p:sp>
+      <p:sp>
+        <p:nvSpPr>
+          <p:cNvPr id="3" name="Notes Placeholder 2"/>
+          <p:cNvSpPr>
+            <a:spLocks noGrp="1"/>
+          </p:cNvSpPr>
+          <p:nvPr>
+            <p:ph type="body" idx="1"/>
+          </p:nvPr>
+        </p:nvSpPr>
+        <p:spPr/>
+        <p:txBody>
+          <a:bodyPr/>
+          <a:lstStyle/>
+          <a:p>
+            <a:pPr marL="0" indent="0">
+              <a:buFontTx/>
+              <a:buNone/>
+            </a:pPr>
+            <a:r>
+              <a:rPr lang="en-US" dirty="0"/>
+              <a:t>- Tag Helper </a:t>
+            </a:r>
+            <a:r>
+              <a:rPr lang="en-US" dirty="0">
+                <a:sym typeface="Wingdings" panose="05000000000000000000" pitchFamily="2" charset="2"/>
+              </a:rPr>
+              <a:t> ASP.NET Core 1.1+ ONLY</a:t>
+            </a:r>
+            <a:endParaRPr lang="en-US" dirty="0"/>
+          </a:p>
+        </p:txBody>
+      </p:sp>
+      <p:sp>
+        <p:nvSpPr>
+          <p:cNvPr id="4" name="Slide Number Placeholder 3"/>
+          <p:cNvSpPr>
+            <a:spLocks noGrp="1"/>
+          </p:cNvSpPr>
+          <p:nvPr>
+            <p:ph type="sldNum" sz="quarter" idx="10"/>
+          </p:nvPr>
+        </p:nvSpPr>
+        <p:spPr/>
+        <p:txBody>
+          <a:bodyPr/>
+          <a:lstStyle/>
+          <a:p>
+            <a:fld id="{16A87904-88DE-4022-A424-ACD2E6FC1751}" type="slidenum">
+              <a:rPr lang="en-US" smtClean="0"/>
+              <a:t>15</a:t>
             </a:fld>
             <a:endParaRPr lang="en-US" dirty="0"/>
           </a:p>
@@ -1019,7 +1122,7 @@
 </p:notes>
 </file>
 
-<file path=ppt/notesSlides/notesSlide14.xml><?xml version="1.0" encoding="utf-8"?>
+<file path=ppt/notesSlides/notesSlide15.xml><?xml version="1.0" encoding="utf-8"?>
 <p:notes xmlns:a="http://schemas.openxmlformats.org/drawingml/2006/main" xmlns:r="http://schemas.openxmlformats.org/officeDocument/2006/relationships" xmlns:p="http://schemas.openxmlformats.org/presentationml/2006/main">
   <p:cSld>
     <p:spTree>
@@ -1132,7 +1235,7 @@
                 <a:tabLst/>
                 <a:defRPr/>
               </a:pPr>
-              <a:t>15</a:t>
+              <a:t>16</a:t>
             </a:fld>
             <a:endParaRPr kumimoji="0" lang="en-US" sz="1800" b="0" i="0" u="none" strike="noStrike" kern="0" cap="none" spc="0" normalizeH="0" baseline="0" noProof="0">
               <a:ln>
@@ -1152,94 +1255,6 @@
     <p:extLst>
       <p:ext uri="{BB962C8B-B14F-4D97-AF65-F5344CB8AC3E}">
         <p14:creationId xmlns:p14="http://schemas.microsoft.com/office/powerpoint/2010/main" val="3530350276"/>
-      </p:ext>
-    </p:extLst>
-  </p:cSld>
-  <p:clrMapOvr>
-    <a:masterClrMapping/>
-  </p:clrMapOvr>
-</p:notes>
-</file>
-
-<file path=ppt/notesSlides/notesSlide15.xml><?xml version="1.0" encoding="utf-8"?>
-<p:notes xmlns:a="http://schemas.openxmlformats.org/drawingml/2006/main" xmlns:r="http://schemas.openxmlformats.org/officeDocument/2006/relationships" xmlns:p="http://schemas.openxmlformats.org/presentationml/2006/main">
-  <p:cSld>
-    <p:spTree>
-      <p:nvGrpSpPr>
-        <p:cNvPr id="1" name=""/>
-        <p:cNvGrpSpPr/>
-        <p:nvPr/>
-      </p:nvGrpSpPr>
-      <p:grpSpPr>
-        <a:xfrm>
-          <a:off x="0" y="0"/>
-          <a:ext cx="0" cy="0"/>
-          <a:chOff x="0" y="0"/>
-          <a:chExt cx="0" cy="0"/>
-        </a:xfrm>
-      </p:grpSpPr>
-      <p:sp>
-        <p:nvSpPr>
-          <p:cNvPr id="2" name="Slide Image Placeholder 1"/>
-          <p:cNvSpPr>
-            <a:spLocks noGrp="1" noRot="1" noChangeAspect="1"/>
-          </p:cNvSpPr>
-          <p:nvPr>
-            <p:ph type="sldImg"/>
-          </p:nvPr>
-        </p:nvSpPr>
-        <p:spPr/>
-      </p:sp>
-      <p:sp>
-        <p:nvSpPr>
-          <p:cNvPr id="3" name="Notes Placeholder 2"/>
-          <p:cNvSpPr>
-            <a:spLocks noGrp="1"/>
-          </p:cNvSpPr>
-          <p:nvPr>
-            <p:ph type="body" idx="1"/>
-          </p:nvPr>
-        </p:nvSpPr>
-        <p:spPr/>
-        <p:txBody>
-          <a:bodyPr/>
-          <a:lstStyle/>
-          <a:p>
-            <a:pPr marL="0" indent="0">
-              <a:buFontTx/>
-              <a:buNone/>
-            </a:pPr>
-            <a:endParaRPr lang="en-US" dirty="0"/>
-          </a:p>
-        </p:txBody>
-      </p:sp>
-      <p:sp>
-        <p:nvSpPr>
-          <p:cNvPr id="4" name="Slide Number Placeholder 3"/>
-          <p:cNvSpPr>
-            <a:spLocks noGrp="1"/>
-          </p:cNvSpPr>
-          <p:nvPr>
-            <p:ph type="sldNum" sz="quarter" idx="10"/>
-          </p:nvPr>
-        </p:nvSpPr>
-        <p:spPr/>
-        <p:txBody>
-          <a:bodyPr/>
-          <a:lstStyle/>
-          <a:p>
-            <a:fld id="{16A87904-88DE-4022-A424-ACD2E6FC1751}" type="slidenum">
-              <a:rPr lang="en-US" smtClean="0"/>
-              <a:t>16</a:t>
-            </a:fld>
-            <a:endParaRPr lang="en-US" dirty="0"/>
-          </a:p>
-        </p:txBody>
-      </p:sp>
-    </p:spTree>
-    <p:extLst>
-      <p:ext uri="{BB962C8B-B14F-4D97-AF65-F5344CB8AC3E}">
-        <p14:creationId xmlns:p14="http://schemas.microsoft.com/office/powerpoint/2010/main" val="1662186540"/>
       </p:ext>
     </p:extLst>
   </p:cSld>
@@ -1327,6 +1342,94 @@
     </p:spTree>
     <p:extLst>
       <p:ext uri="{BB962C8B-B14F-4D97-AF65-F5344CB8AC3E}">
+        <p14:creationId xmlns:p14="http://schemas.microsoft.com/office/powerpoint/2010/main" val="1662186540"/>
+      </p:ext>
+    </p:extLst>
+  </p:cSld>
+  <p:clrMapOvr>
+    <a:masterClrMapping/>
+  </p:clrMapOvr>
+</p:notes>
+</file>
+
+<file path=ppt/notesSlides/notesSlide17.xml><?xml version="1.0" encoding="utf-8"?>
+<p:notes xmlns:a="http://schemas.openxmlformats.org/drawingml/2006/main" xmlns:r="http://schemas.openxmlformats.org/officeDocument/2006/relationships" xmlns:p="http://schemas.openxmlformats.org/presentationml/2006/main">
+  <p:cSld>
+    <p:spTree>
+      <p:nvGrpSpPr>
+        <p:cNvPr id="1" name=""/>
+        <p:cNvGrpSpPr/>
+        <p:nvPr/>
+      </p:nvGrpSpPr>
+      <p:grpSpPr>
+        <a:xfrm>
+          <a:off x="0" y="0"/>
+          <a:ext cx="0" cy="0"/>
+          <a:chOff x="0" y="0"/>
+          <a:chExt cx="0" cy="0"/>
+        </a:xfrm>
+      </p:grpSpPr>
+      <p:sp>
+        <p:nvSpPr>
+          <p:cNvPr id="2" name="Slide Image Placeholder 1"/>
+          <p:cNvSpPr>
+            <a:spLocks noGrp="1" noRot="1" noChangeAspect="1"/>
+          </p:cNvSpPr>
+          <p:nvPr>
+            <p:ph type="sldImg"/>
+          </p:nvPr>
+        </p:nvSpPr>
+        <p:spPr/>
+      </p:sp>
+      <p:sp>
+        <p:nvSpPr>
+          <p:cNvPr id="3" name="Notes Placeholder 2"/>
+          <p:cNvSpPr>
+            <a:spLocks noGrp="1"/>
+          </p:cNvSpPr>
+          <p:nvPr>
+            <p:ph type="body" idx="1"/>
+          </p:nvPr>
+        </p:nvSpPr>
+        <p:spPr/>
+        <p:txBody>
+          <a:bodyPr/>
+          <a:lstStyle/>
+          <a:p>
+            <a:pPr marL="0" indent="0">
+              <a:buFontTx/>
+              <a:buNone/>
+            </a:pPr>
+            <a:endParaRPr lang="en-US" dirty="0"/>
+          </a:p>
+        </p:txBody>
+      </p:sp>
+      <p:sp>
+        <p:nvSpPr>
+          <p:cNvPr id="4" name="Slide Number Placeholder 3"/>
+          <p:cNvSpPr>
+            <a:spLocks noGrp="1"/>
+          </p:cNvSpPr>
+          <p:nvPr>
+            <p:ph type="sldNum" sz="quarter" idx="10"/>
+          </p:nvPr>
+        </p:nvSpPr>
+        <p:spPr/>
+        <p:txBody>
+          <a:bodyPr/>
+          <a:lstStyle/>
+          <a:p>
+            <a:fld id="{16A87904-88DE-4022-A424-ACD2E6FC1751}" type="slidenum">
+              <a:rPr lang="en-US" smtClean="0"/>
+              <a:t>18</a:t>
+            </a:fld>
+            <a:endParaRPr lang="en-US" dirty="0"/>
+          </a:p>
+        </p:txBody>
+      </p:sp>
+    </p:spTree>
+    <p:extLst>
+      <p:ext uri="{BB962C8B-B14F-4D97-AF65-F5344CB8AC3E}">
         <p14:creationId xmlns:p14="http://schemas.microsoft.com/office/powerpoint/2010/main" val="4177560496"/>
       </p:ext>
     </p:extLst>
@@ -1337,7 +1440,7 @@
 </p:notes>
 </file>
 
-<file path=ppt/notesSlides/notesSlide17.xml><?xml version="1.0" encoding="utf-8"?>
+<file path=ppt/notesSlides/notesSlide18.xml><?xml version="1.0" encoding="utf-8"?>
 <p:notes xmlns:a="http://schemas.openxmlformats.org/drawingml/2006/main" xmlns:r="http://schemas.openxmlformats.org/officeDocument/2006/relationships" xmlns:p="http://schemas.openxmlformats.org/presentationml/2006/main">
   <p:cSld>
     <p:spTree>
@@ -1453,7 +1556,7 @@
                 <a:tabLst/>
                 <a:defRPr/>
               </a:pPr>
-              <a:t>18</a:t>
+              <a:t>19</a:t>
             </a:fld>
             <a:endParaRPr kumimoji="0" lang="en-US" sz="1200" b="0" i="0" u="none" strike="noStrike" kern="1200" cap="none" spc="0" normalizeH="0" baseline="0" noProof="0">
               <a:ln>
@@ -2041,6 +2144,97 @@
 </file>
 
 <file path=ppt/notesSlides/notesSlide8.xml><?xml version="1.0" encoding="utf-8"?>
+<p:notes xmlns:a="http://schemas.openxmlformats.org/drawingml/2006/main" xmlns:r="http://schemas.openxmlformats.org/officeDocument/2006/relationships" xmlns:p="http://schemas.openxmlformats.org/presentationml/2006/main">
+  <p:cSld>
+    <p:spTree>
+      <p:nvGrpSpPr>
+        <p:cNvPr id="1" name=""/>
+        <p:cNvGrpSpPr/>
+        <p:nvPr/>
+      </p:nvGrpSpPr>
+      <p:grpSpPr>
+        <a:xfrm>
+          <a:off x="0" y="0"/>
+          <a:ext cx="0" cy="0"/>
+          <a:chOff x="0" y="0"/>
+          <a:chExt cx="0" cy="0"/>
+        </a:xfrm>
+      </p:grpSpPr>
+      <p:sp>
+        <p:nvSpPr>
+          <p:cNvPr id="2" name="Slide Image Placeholder 1"/>
+          <p:cNvSpPr>
+            <a:spLocks noGrp="1" noRot="1" noChangeAspect="1"/>
+          </p:cNvSpPr>
+          <p:nvPr>
+            <p:ph type="sldImg"/>
+          </p:nvPr>
+        </p:nvSpPr>
+        <p:spPr/>
+      </p:sp>
+      <p:sp>
+        <p:nvSpPr>
+          <p:cNvPr id="3" name="Notes Placeholder 2"/>
+          <p:cNvSpPr>
+            <a:spLocks noGrp="1"/>
+          </p:cNvSpPr>
+          <p:nvPr>
+            <p:ph type="body" idx="1"/>
+          </p:nvPr>
+        </p:nvSpPr>
+        <p:spPr/>
+        <p:txBody>
+          <a:bodyPr/>
+          <a:lstStyle/>
+          <a:p>
+            <a:pPr marL="0" indent="0">
+              <a:buFontTx/>
+              <a:buNone/>
+            </a:pPr>
+            <a:r>
+              <a:rPr lang="en-US" dirty="0"/>
+              <a:t>- Mention Dave Paquette’s Bootstrap tag helpers</a:t>
+            </a:r>
+          </a:p>
+        </p:txBody>
+      </p:sp>
+      <p:sp>
+        <p:nvSpPr>
+          <p:cNvPr id="4" name="Slide Number Placeholder 3"/>
+          <p:cNvSpPr>
+            <a:spLocks noGrp="1"/>
+          </p:cNvSpPr>
+          <p:nvPr>
+            <p:ph type="sldNum" sz="quarter" idx="10"/>
+          </p:nvPr>
+        </p:nvSpPr>
+        <p:spPr/>
+        <p:txBody>
+          <a:bodyPr/>
+          <a:lstStyle/>
+          <a:p>
+            <a:fld id="{16A87904-88DE-4022-A424-ACD2E6FC1751}" type="slidenum">
+              <a:rPr lang="en-US" smtClean="0"/>
+              <a:t>9</a:t>
+            </a:fld>
+            <a:endParaRPr lang="en-US" dirty="0"/>
+          </a:p>
+        </p:txBody>
+      </p:sp>
+    </p:spTree>
+    <p:extLst>
+      <p:ext uri="{BB962C8B-B14F-4D97-AF65-F5344CB8AC3E}">
+        <p14:creationId xmlns:p14="http://schemas.microsoft.com/office/powerpoint/2010/main" val="3168805941"/>
+      </p:ext>
+    </p:extLst>
+  </p:cSld>
+  <p:clrMapOvr>
+    <a:masterClrMapping/>
+  </p:clrMapOvr>
+</p:notes>
+</file>
+
+<file path=ppt/notesSlides/notesSlide9.xml><?xml version="1.0" encoding="utf-8"?>
 <p:notes xmlns:a="http://schemas.openxmlformats.org/drawingml/2006/main" xmlns:r="http://schemas.openxmlformats.org/officeDocument/2006/relationships" xmlns:p="http://schemas.openxmlformats.org/presentationml/2006/main">
   <p:cSld>
     <p:spTree>
@@ -2153,7 +2347,7 @@
                 <a:tabLst/>
                 <a:defRPr/>
               </a:pPr>
-              <a:t>9</a:t>
+              <a:t>10</a:t>
             </a:fld>
             <a:endParaRPr kumimoji="0" lang="en-US" sz="1800" b="0" i="0" u="none" strike="noStrike" kern="0" cap="none" spc="0" normalizeH="0" baseline="0" noProof="0">
               <a:ln>
@@ -2173,107 +2367,6 @@
     <p:extLst>
       <p:ext uri="{BB962C8B-B14F-4D97-AF65-F5344CB8AC3E}">
         <p14:creationId xmlns:p14="http://schemas.microsoft.com/office/powerpoint/2010/main" val="306552793"/>
-      </p:ext>
-    </p:extLst>
-  </p:cSld>
-  <p:clrMapOvr>
-    <a:masterClrMapping/>
-  </p:clrMapOvr>
-</p:notes>
-</file>
-
-<file path=ppt/notesSlides/notesSlide9.xml><?xml version="1.0" encoding="utf-8"?>
-<p:notes xmlns:a="http://schemas.openxmlformats.org/drawingml/2006/main" xmlns:r="http://schemas.openxmlformats.org/officeDocument/2006/relationships" xmlns:p="http://schemas.openxmlformats.org/presentationml/2006/main">
-  <p:cSld>
-    <p:spTree>
-      <p:nvGrpSpPr>
-        <p:cNvPr id="1" name=""/>
-        <p:cNvGrpSpPr/>
-        <p:nvPr/>
-      </p:nvGrpSpPr>
-      <p:grpSpPr>
-        <a:xfrm>
-          <a:off x="0" y="0"/>
-          <a:ext cx="0" cy="0"/>
-          <a:chOff x="0" y="0"/>
-          <a:chExt cx="0" cy="0"/>
-        </a:xfrm>
-      </p:grpSpPr>
-      <p:sp>
-        <p:nvSpPr>
-          <p:cNvPr id="2" name="Slide Image Placeholder 1"/>
-          <p:cNvSpPr>
-            <a:spLocks noGrp="1" noRot="1" noChangeAspect="1"/>
-          </p:cNvSpPr>
-          <p:nvPr>
-            <p:ph type="sldImg"/>
-          </p:nvPr>
-        </p:nvSpPr>
-        <p:spPr/>
-      </p:sp>
-      <p:sp>
-        <p:nvSpPr>
-          <p:cNvPr id="3" name="Notes Placeholder 2"/>
-          <p:cNvSpPr>
-            <a:spLocks noGrp="1"/>
-          </p:cNvSpPr>
-          <p:nvPr>
-            <p:ph type="body" idx="1"/>
-          </p:nvPr>
-        </p:nvSpPr>
-        <p:spPr/>
-        <p:txBody>
-          <a:bodyPr/>
-          <a:lstStyle/>
-          <a:p>
-            <a:pPr marL="171450" indent="-171450">
-              <a:buFontTx/>
-              <a:buChar char="-"/>
-            </a:pPr>
-            <a:r>
-              <a:rPr lang="en-US" dirty="0"/>
-              <a:t>Similar to partial view</a:t>
-            </a:r>
-          </a:p>
-          <a:p>
-            <a:pPr marL="171450" indent="-171450">
-              <a:buFontTx/>
-              <a:buChar char="-"/>
-            </a:pPr>
-            <a:r>
-              <a:rPr lang="en-US" dirty="0"/>
-              <a:t>Only depends on data you provide when calling into it</a:t>
-            </a:r>
-          </a:p>
-        </p:txBody>
-      </p:sp>
-      <p:sp>
-        <p:nvSpPr>
-          <p:cNvPr id="4" name="Slide Number Placeholder 3"/>
-          <p:cNvSpPr>
-            <a:spLocks noGrp="1"/>
-          </p:cNvSpPr>
-          <p:nvPr>
-            <p:ph type="sldNum" sz="quarter" idx="10"/>
-          </p:nvPr>
-        </p:nvSpPr>
-        <p:spPr/>
-        <p:txBody>
-          <a:bodyPr/>
-          <a:lstStyle/>
-          <a:p>
-            <a:fld id="{16A87904-88DE-4022-A424-ACD2E6FC1751}" type="slidenum">
-              <a:rPr lang="en-US" smtClean="0"/>
-              <a:t>10</a:t>
-            </a:fld>
-            <a:endParaRPr lang="en-US" dirty="0"/>
-          </a:p>
-        </p:txBody>
-      </p:sp>
-    </p:spTree>
-    <p:extLst>
-      <p:ext uri="{BB962C8B-B14F-4D97-AF65-F5344CB8AC3E}">
-        <p14:creationId xmlns:p14="http://schemas.microsoft.com/office/powerpoint/2010/main" val="2468047678"/>
       </p:ext>
     </p:extLst>
   </p:cSld>
@@ -2414,7 +2507,7 @@
           <a:p>
             <a:fld id="{EEC3160E-2579-4584-9765-DC1BA0B358F9}" type="datetimeFigureOut">
               <a:rPr lang="en-US" smtClean="0"/>
-              <a:t>4/14/2017</a:t>
+              <a:t>4/17/2017</a:t>
             </a:fld>
             <a:endParaRPr lang="en-US"/>
           </a:p>
@@ -2584,7 +2677,7 @@
           <a:p>
             <a:fld id="{EEC3160E-2579-4584-9765-DC1BA0B358F9}" type="datetimeFigureOut">
               <a:rPr lang="en-US" smtClean="0"/>
-              <a:t>4/14/2017</a:t>
+              <a:t>4/17/2017</a:t>
             </a:fld>
             <a:endParaRPr lang="en-US"/>
           </a:p>
@@ -2764,7 +2857,7 @@
           <a:p>
             <a:fld id="{EEC3160E-2579-4584-9765-DC1BA0B358F9}" type="datetimeFigureOut">
               <a:rPr lang="en-US" smtClean="0"/>
-              <a:t>4/14/2017</a:t>
+              <a:t>4/17/2017</a:t>
             </a:fld>
             <a:endParaRPr lang="en-US"/>
           </a:p>
@@ -4679,7 +4772,7 @@
           <a:p>
             <a:fld id="{EEC3160E-2579-4584-9765-DC1BA0B358F9}" type="datetimeFigureOut">
               <a:rPr lang="en-US" smtClean="0"/>
-              <a:t>4/14/2017</a:t>
+              <a:t>4/17/2017</a:t>
             </a:fld>
             <a:endParaRPr lang="en-US"/>
           </a:p>
@@ -6161,7 +6254,7 @@
           <a:p>
             <a:fld id="{EEC3160E-2579-4584-9765-DC1BA0B358F9}" type="datetimeFigureOut">
               <a:rPr lang="en-US" smtClean="0"/>
-              <a:t>4/14/2017</a:t>
+              <a:t>4/17/2017</a:t>
             </a:fld>
             <a:endParaRPr lang="en-US"/>
           </a:p>
@@ -7301,7 +7394,7 @@
           <a:p>
             <a:fld id="{EEC3160E-2579-4584-9765-DC1BA0B358F9}" type="datetimeFigureOut">
               <a:rPr lang="en-US" smtClean="0"/>
-              <a:t>4/14/2017</a:t>
+              <a:t>4/17/2017</a:t>
             </a:fld>
             <a:endParaRPr lang="en-US"/>
           </a:p>
@@ -7668,7 +7761,7 @@
           <a:p>
             <a:fld id="{EEC3160E-2579-4584-9765-DC1BA0B358F9}" type="datetimeFigureOut">
               <a:rPr lang="en-US" smtClean="0"/>
-              <a:t>4/14/2017</a:t>
+              <a:t>4/17/2017</a:t>
             </a:fld>
             <a:endParaRPr lang="en-US"/>
           </a:p>
@@ -7786,7 +7879,7 @@
           <a:p>
             <a:fld id="{EEC3160E-2579-4584-9765-DC1BA0B358F9}" type="datetimeFigureOut">
               <a:rPr lang="en-US" smtClean="0"/>
-              <a:t>4/14/2017</a:t>
+              <a:t>4/17/2017</a:t>
             </a:fld>
             <a:endParaRPr lang="en-US"/>
           </a:p>
@@ -7881,7 +7974,7 @@
           <a:p>
             <a:fld id="{EEC3160E-2579-4584-9765-DC1BA0B358F9}" type="datetimeFigureOut">
               <a:rPr lang="en-US" smtClean="0"/>
-              <a:t>4/14/2017</a:t>
+              <a:t>4/17/2017</a:t>
             </a:fld>
             <a:endParaRPr lang="en-US"/>
           </a:p>
@@ -8158,7 +8251,7 @@
           <a:p>
             <a:fld id="{EEC3160E-2579-4584-9765-DC1BA0B358F9}" type="datetimeFigureOut">
               <a:rPr lang="en-US" smtClean="0"/>
-              <a:t>4/14/2017</a:t>
+              <a:t>4/17/2017</a:t>
             </a:fld>
             <a:endParaRPr lang="en-US"/>
           </a:p>
@@ -8415,7 +8508,7 @@
           <a:p>
             <a:fld id="{EEC3160E-2579-4584-9765-DC1BA0B358F9}" type="datetimeFigureOut">
               <a:rPr lang="en-US" smtClean="0"/>
-              <a:t>4/14/2017</a:t>
+              <a:t>4/17/2017</a:t>
             </a:fld>
             <a:endParaRPr lang="en-US"/>
           </a:p>
@@ -8628,7 +8721,7 @@
           <a:p>
             <a:fld id="{EEC3160E-2579-4584-9765-DC1BA0B358F9}" type="datetimeFigureOut">
               <a:rPr lang="en-US" smtClean="0"/>
-              <a:t>4/14/2017</a:t>
+              <a:t>4/17/2017</a:t>
             </a:fld>
             <a:endParaRPr lang="en-US"/>
           </a:p>
@@ -11200,6 +11293,180 @@
           <a:chExt cx="0" cy="0"/>
         </a:xfrm>
       </p:grpSpPr>
+      <p:sp>
+        <p:nvSpPr>
+          <p:cNvPr id="2" name="Title 1"/>
+          <p:cNvSpPr>
+            <a:spLocks noGrp="1"/>
+          </p:cNvSpPr>
+          <p:nvPr>
+            <p:ph type="title"/>
+          </p:nvPr>
+        </p:nvSpPr>
+        <p:spPr/>
+        <p:txBody>
+          <a:bodyPr/>
+          <a:lstStyle/>
+          <a:p>
+            <a:r>
+              <a:rPr lang="en-US" dirty="0"/>
+              <a:t>Demo</a:t>
+            </a:r>
+          </a:p>
+        </p:txBody>
+      </p:sp>
+      <p:sp>
+        <p:nvSpPr>
+          <p:cNvPr id="4" name="Text Placeholder 3"/>
+          <p:cNvSpPr>
+            <a:spLocks noGrp="1"/>
+          </p:cNvSpPr>
+          <p:nvPr>
+            <p:ph type="body" idx="1"/>
+          </p:nvPr>
+        </p:nvSpPr>
+        <p:spPr/>
+        <p:txBody>
+          <a:bodyPr/>
+          <a:lstStyle/>
+          <a:p>
+            <a:r>
+              <a:rPr lang="en-US" dirty="0"/>
+              <a:t>Tag Helpers</a:t>
+            </a:r>
+          </a:p>
+        </p:txBody>
+      </p:sp>
+      <p:sp>
+        <p:nvSpPr>
+          <p:cNvPr id="9" name="TextBox 8"/>
+          <p:cNvSpPr txBox="1"/>
+          <p:nvPr/>
+        </p:nvSpPr>
+        <p:spPr>
+          <a:xfrm>
+            <a:off x="908050" y="1466850"/>
+            <a:ext cx="10928350" cy="369332"/>
+          </a:xfrm>
+          <a:prstGeom prst="rect">
+            <a:avLst/>
+          </a:prstGeom>
+          <a:noFill/>
+        </p:spPr>
+        <p:txBody>
+          <a:bodyPr wrap="square" rtlCol="0">
+            <a:spAutoFit/>
+          </a:bodyPr>
+          <a:lstStyle/>
+          <a:p>
+            <a:pPr marL="0" marR="0" lvl="0" indent="0" defTabSz="914400" eaLnBrk="1" fontAlgn="auto" latinLnBrk="0" hangingPunct="1">
+              <a:lnSpc>
+                <a:spcPct val="100000"/>
+              </a:lnSpc>
+              <a:spcBef>
+                <a:spcPts val="0"/>
+              </a:spcBef>
+              <a:spcAft>
+                <a:spcPts val="0"/>
+              </a:spcAft>
+              <a:buClrTx/>
+              <a:buSzTx/>
+              <a:buFontTx/>
+              <a:buNone/>
+              <a:tabLst/>
+              <a:defRPr/>
+            </a:pPr>
+            <a:endParaRPr kumimoji="0" lang="en-US" sz="1800" b="0" i="0" u="none" strike="noStrike" kern="0" cap="none" spc="0" normalizeH="0" baseline="0" noProof="0" dirty="0">
+              <a:ln>
+                <a:noFill/>
+              </a:ln>
+              <a:solidFill>
+                <a:sysClr val="windowText" lastClr="000000"/>
+              </a:solidFill>
+              <a:effectLst/>
+              <a:uLnTx/>
+              <a:uFillTx/>
+            </a:endParaRPr>
+          </a:p>
+        </p:txBody>
+      </p:sp>
+      <p:pic>
+        <p:nvPicPr>
+          <p:cNvPr id="5" name="Picture 4"/>
+          <p:cNvPicPr>
+            <a:picLocks noChangeAspect="1"/>
+          </p:cNvPicPr>
+          <p:nvPr/>
+        </p:nvPicPr>
+        <p:blipFill>
+          <a:blip r:embed="rId3">
+            <a:extLst>
+              <a:ext uri="{BEBA8EAE-BF5A-486C-A8C5-ECC9F3942E4B}">
+                <a14:imgProps xmlns:a14="http://schemas.microsoft.com/office/drawing/2010/main">
+                  <a14:imgLayer r:embed="rId4">
+                    <a14:imgEffect>
+                      <a14:backgroundRemoval t="0" b="91837" l="0" r="40593"/>
+                    </a14:imgEffect>
+                  </a14:imgLayer>
+                </a14:imgProps>
+              </a:ext>
+              <a:ext uri="{28A0092B-C50C-407E-A947-70E740481C1C}">
+                <a14:useLocalDpi xmlns:a14="http://schemas.microsoft.com/office/drawing/2010/main" val="0"/>
+              </a:ext>
+            </a:extLst>
+          </a:blip>
+          <a:stretch>
+            <a:fillRect/>
+          </a:stretch>
+        </p:blipFill>
+        <p:spPr>
+          <a:xfrm>
+            <a:off x="572165" y="2593320"/>
+            <a:ext cx="8053025" cy="3507540"/>
+          </a:xfrm>
+          <a:prstGeom prst="rect">
+            <a:avLst/>
+          </a:prstGeom>
+        </p:spPr>
+      </p:pic>
+    </p:spTree>
+    <p:extLst>
+      <p:ext uri="{BB962C8B-B14F-4D97-AF65-F5344CB8AC3E}">
+        <p14:creationId xmlns:p14="http://schemas.microsoft.com/office/powerpoint/2010/main" val="533623519"/>
+      </p:ext>
+    </p:extLst>
+  </p:cSld>
+  <p:clrMapOvr>
+    <a:masterClrMapping/>
+  </p:clrMapOvr>
+</p:sld>
+</file>
+
+<file path=ppt/slides/slide11.xml><?xml version="1.0" encoding="utf-8"?>
+<p:sld xmlns:a="http://schemas.openxmlformats.org/drawingml/2006/main" xmlns:r="http://schemas.openxmlformats.org/officeDocument/2006/relationships" xmlns:p="http://schemas.openxmlformats.org/presentationml/2006/main">
+  <p:cSld>
+    <p:bg>
+      <p:bgPr>
+        <a:solidFill>
+          <a:srgbClr val="505050"/>
+        </a:solidFill>
+        <a:effectLst/>
+      </p:bgPr>
+    </p:bg>
+    <p:spTree>
+      <p:nvGrpSpPr>
+        <p:cNvPr id="1" name=""/>
+        <p:cNvGrpSpPr/>
+        <p:nvPr/>
+      </p:nvGrpSpPr>
+      <p:grpSpPr>
+        <a:xfrm>
+          <a:off x="0" y="0"/>
+          <a:ext cx="0" cy="0"/>
+          <a:chOff x="0" y="0"/>
+          <a:chExt cx="0" cy="0"/>
+        </a:xfrm>
+      </p:grpSpPr>
       <p:pic>
         <p:nvPicPr>
           <p:cNvPr id="5" name="Picture 4"/>
@@ -11379,7 +11646,7 @@
 </p:sld>
 </file>
 
-<file path=ppt/slides/slide11.xml><?xml version="1.0" encoding="utf-8"?>
+<file path=ppt/slides/slide12.xml><?xml version="1.0" encoding="utf-8"?>
 <p:sld xmlns:a="http://schemas.openxmlformats.org/drawingml/2006/main" xmlns:r="http://schemas.openxmlformats.org/officeDocument/2006/relationships" xmlns:p="http://schemas.openxmlformats.org/presentationml/2006/main">
   <p:cSld>
     <p:bg>
@@ -11763,7 +12030,7 @@
 </p:sld>
 </file>
 
-<file path=ppt/slides/slide12.xml><?xml version="1.0" encoding="utf-8"?>
+<file path=ppt/slides/slide13.xml><?xml version="1.0" encoding="utf-8"?>
 <p:sld xmlns:a="http://schemas.openxmlformats.org/drawingml/2006/main" xmlns:r="http://schemas.openxmlformats.org/officeDocument/2006/relationships" xmlns:p="http://schemas.openxmlformats.org/presentationml/2006/main">
   <p:cSld>
     <p:bg>
@@ -12021,7 +12288,7 @@
 </p:sld>
 </file>
 
-<file path=ppt/slides/slide13.xml><?xml version="1.0" encoding="utf-8"?>
+<file path=ppt/slides/slide14.xml><?xml version="1.0" encoding="utf-8"?>
 <p:sld xmlns:a="http://schemas.openxmlformats.org/drawingml/2006/main" xmlns:r="http://schemas.openxmlformats.org/officeDocument/2006/relationships" xmlns:p="http://schemas.openxmlformats.org/presentationml/2006/main">
   <p:cSld>
     <p:bg>
@@ -12529,7 +12796,7 @@
 </p:sld>
 </file>
 
-<file path=ppt/slides/slide14.xml><?xml version="1.0" encoding="utf-8"?>
+<file path=ppt/slides/slide15.xml><?xml version="1.0" encoding="utf-8"?>
 <p:sld xmlns:a="http://schemas.openxmlformats.org/drawingml/2006/main" xmlns:r="http://schemas.openxmlformats.org/officeDocument/2006/relationships" xmlns:p="http://schemas.openxmlformats.org/presentationml/2006/main">
   <p:cSld>
     <p:bg>
@@ -14280,7 +14547,7 @@
 </p:sld>
 </file>
 
-<file path=ppt/slides/slide15.xml><?xml version="1.0" encoding="utf-8"?>
+<file path=ppt/slides/slide16.xml><?xml version="1.0" encoding="utf-8"?>
 <p:sld xmlns:a="http://schemas.openxmlformats.org/drawingml/2006/main" xmlns:r="http://schemas.openxmlformats.org/officeDocument/2006/relationships" xmlns:p="http://schemas.openxmlformats.org/presentationml/2006/main">
   <p:cSld>
     <p:bg>
@@ -14454,7 +14721,7 @@
 </p:sld>
 </file>
 
-<file path=ppt/slides/slide16.xml><?xml version="1.0" encoding="utf-8"?>
+<file path=ppt/slides/slide17.xml><?xml version="1.0" encoding="utf-8"?>
 <p:sld xmlns:a="http://schemas.openxmlformats.org/drawingml/2006/main" xmlns:r="http://schemas.openxmlformats.org/officeDocument/2006/relationships" xmlns:p="http://schemas.openxmlformats.org/presentationml/2006/main">
   <p:cSld>
     <p:bg>
@@ -14995,7 +15262,7 @@
 </p:sld>
 </file>
 
-<file path=ppt/slides/slide17.xml><?xml version="1.0" encoding="utf-8"?>
+<file path=ppt/slides/slide18.xml><?xml version="1.0" encoding="utf-8"?>
 <p:sld xmlns:a="http://schemas.openxmlformats.org/drawingml/2006/main" xmlns:r="http://schemas.openxmlformats.org/officeDocument/2006/relationships" xmlns:p="http://schemas.openxmlformats.org/presentationml/2006/main">
   <p:cSld>
     <p:bg>
@@ -15669,7 +15936,7 @@
 </p:sld>
 </file>
 
-<file path=ppt/slides/slide18.xml><?xml version="1.0" encoding="utf-8"?>
+<file path=ppt/slides/slide19.xml><?xml version="1.0" encoding="utf-8"?>
 <p:sld xmlns:a="http://schemas.openxmlformats.org/drawingml/2006/main" xmlns:r="http://schemas.openxmlformats.org/officeDocument/2006/relationships" xmlns:p="http://schemas.openxmlformats.org/presentationml/2006/main">
   <p:cSld>
     <p:bg>
@@ -19576,6 +19843,503 @@
           <a:chExt cx="0" cy="0"/>
         </a:xfrm>
       </p:grpSpPr>
+      <p:graphicFrame>
+        <p:nvGraphicFramePr>
+          <p:cNvPr id="8" name="Table 7"/>
+          <p:cNvGraphicFramePr>
+            <a:graphicFrameLocks noGrp="1"/>
+          </p:cNvGraphicFramePr>
+          <p:nvPr>
+            <p:extLst>
+              <p:ext uri="{D42A27DB-BD31-4B8C-83A1-F6EECF244321}">
+                <p14:modId xmlns:p14="http://schemas.microsoft.com/office/powerpoint/2010/main" val="49853486"/>
+              </p:ext>
+            </p:extLst>
+          </p:nvPr>
+        </p:nvGraphicFramePr>
+        <p:xfrm>
+          <a:off x="937490" y="2318102"/>
+          <a:ext cx="10416310" cy="1615440"/>
+        </p:xfrm>
+        <a:graphic>
+          <a:graphicData uri="http://schemas.openxmlformats.org/drawingml/2006/table">
+            <a:tbl>
+              <a:tblPr firstRow="1" bandRow="1">
+                <a:tableStyleId>{5C22544A-7EE6-4342-B048-85BDC9FD1C3A}</a:tableStyleId>
+              </a:tblPr>
+              <a:tblGrid>
+                <a:gridCol w="10416310">
+                  <a:extLst>
+                    <a:ext uri="{9D8B030D-6E8A-4147-A177-3AD203B41FA5}">
+                      <a16:colId xmlns:a16="http://schemas.microsoft.com/office/drawing/2014/main" val="1057070397"/>
+                    </a:ext>
+                  </a:extLst>
+                </a:gridCol>
+              </a:tblGrid>
+              <a:tr h="584446">
+                <a:tc>
+                  <a:txBody>
+                    <a:bodyPr/>
+                    <a:lstStyle/>
+                    <a:p>
+                      <a:r>
+                        <a:rPr lang="en-US" sz="2000" dirty="0">
+                          <a:solidFill>
+                            <a:srgbClr val="0000FF"/>
+                          </a:solidFill>
+                          <a:latin typeface="Consolas" panose="020B0609020204030204" pitchFamily="49" charset="0"/>
+                        </a:rPr>
+                        <a:t>&lt;</a:t>
+                      </a:r>
+                      <a:r>
+                        <a:rPr lang="en-US" sz="2000" b="1" dirty="0">
+                          <a:solidFill>
+                            <a:srgbClr val="800080"/>
+                          </a:solidFill>
+                          <a:latin typeface="Consolas" panose="020B0609020204030204" pitchFamily="49" charset="0"/>
+                        </a:rPr>
+                        <a:t>kendo-</a:t>
+                      </a:r>
+                      <a:r>
+                        <a:rPr lang="en-US" sz="2000" b="1" dirty="0" err="1">
+                          <a:solidFill>
+                            <a:srgbClr val="800080"/>
+                          </a:solidFill>
+                          <a:latin typeface="Consolas" panose="020B0609020204030204" pitchFamily="49" charset="0"/>
+                        </a:rPr>
+                        <a:t>datepicker</a:t>
+                      </a:r>
+                      <a:r>
+                        <a:rPr lang="en-US" sz="2000" b="0" dirty="0">
+                          <a:solidFill>
+                            <a:srgbClr val="000000"/>
+                          </a:solidFill>
+                          <a:latin typeface="Consolas" panose="020B0609020204030204" pitchFamily="49" charset="0"/>
+                        </a:rPr>
+                        <a:t> </a:t>
+                      </a:r>
+                      <a:r>
+                        <a:rPr lang="en-US" sz="2000" b="1" dirty="0">
+                          <a:solidFill>
+                            <a:srgbClr val="800080"/>
+                          </a:solidFill>
+                          <a:latin typeface="Consolas" panose="020B0609020204030204" pitchFamily="49" charset="0"/>
+                        </a:rPr>
+                        <a:t>name</a:t>
+                      </a:r>
+                      <a:r>
+                        <a:rPr lang="en-US" sz="2000" b="0" dirty="0">
+                          <a:solidFill>
+                            <a:srgbClr val="0000FF"/>
+                          </a:solidFill>
+                          <a:latin typeface="Consolas" panose="020B0609020204030204" pitchFamily="49" charset="0"/>
+                        </a:rPr>
+                        <a:t>="</a:t>
+                      </a:r>
+                      <a:r>
+                        <a:rPr lang="en-US" sz="2000" b="0" dirty="0" err="1">
+                          <a:solidFill>
+                            <a:srgbClr val="0000FF"/>
+                          </a:solidFill>
+                          <a:latin typeface="Consolas" panose="020B0609020204030204" pitchFamily="49" charset="0"/>
+                        </a:rPr>
+                        <a:t>startDate</a:t>
+                      </a:r>
+                      <a:r>
+                        <a:rPr lang="en-US" sz="2000" b="0" dirty="0">
+                          <a:solidFill>
+                            <a:srgbClr val="0000FF"/>
+                          </a:solidFill>
+                          <a:latin typeface="Consolas" panose="020B0609020204030204" pitchFamily="49" charset="0"/>
+                        </a:rPr>
+                        <a:t>"</a:t>
+                      </a:r>
+                      <a:endParaRPr lang="en-US" sz="2000" b="0" dirty="0">
+                        <a:solidFill>
+                          <a:srgbClr val="000000"/>
+                        </a:solidFill>
+                        <a:latin typeface="Consolas" panose="020B0609020204030204" pitchFamily="49" charset="0"/>
+                      </a:endParaRPr>
+                    </a:p>
+                    <a:p>
+                      <a:r>
+                        <a:rPr lang="en-US" sz="2000" b="0" dirty="0">
+                          <a:solidFill>
+                            <a:srgbClr val="000000"/>
+                          </a:solidFill>
+                          <a:latin typeface="Consolas" panose="020B0609020204030204" pitchFamily="49" charset="0"/>
+                        </a:rPr>
+                        <a:t>                  </a:t>
+                      </a:r>
+                      <a:r>
+                        <a:rPr lang="en-US" sz="2000" b="1" dirty="0">
+                          <a:solidFill>
+                            <a:srgbClr val="800080"/>
+                          </a:solidFill>
+                          <a:latin typeface="Consolas" panose="020B0609020204030204" pitchFamily="49" charset="0"/>
+                        </a:rPr>
+                        <a:t>start</a:t>
+                      </a:r>
+                      <a:r>
+                        <a:rPr lang="en-US" sz="2000" b="0" dirty="0">
+                          <a:solidFill>
+                            <a:srgbClr val="0000FF"/>
+                          </a:solidFill>
+                          <a:latin typeface="Consolas" panose="020B0609020204030204" pitchFamily="49" charset="0"/>
+                        </a:rPr>
+                        <a:t>="</a:t>
+                      </a:r>
+                      <a:r>
+                        <a:rPr lang="en-US" sz="2000" b="0" dirty="0" err="1">
+                          <a:solidFill>
+                            <a:srgbClr val="2B91AF"/>
+                          </a:solidFill>
+                          <a:latin typeface="Consolas" panose="020B0609020204030204" pitchFamily="49" charset="0"/>
+                        </a:rPr>
+                        <a:t>CalendarView</a:t>
+                      </a:r>
+                      <a:r>
+                        <a:rPr lang="en-US" sz="2000" b="0" dirty="0" err="1">
+                          <a:solidFill>
+                            <a:srgbClr val="000000"/>
+                          </a:solidFill>
+                          <a:latin typeface="Consolas" panose="020B0609020204030204" pitchFamily="49" charset="0"/>
+                        </a:rPr>
+                        <a:t>.Year</a:t>
+                      </a:r>
+                      <a:r>
+                        <a:rPr lang="en-US" sz="2000" b="0" dirty="0">
+                          <a:solidFill>
+                            <a:srgbClr val="0000FF"/>
+                          </a:solidFill>
+                          <a:latin typeface="Consolas" panose="020B0609020204030204" pitchFamily="49" charset="0"/>
+                        </a:rPr>
+                        <a:t>"</a:t>
+                      </a:r>
+                      <a:endParaRPr lang="en-US" sz="2000" b="0" dirty="0">
+                        <a:solidFill>
+                          <a:srgbClr val="000000"/>
+                        </a:solidFill>
+                        <a:latin typeface="Consolas" panose="020B0609020204030204" pitchFamily="49" charset="0"/>
+                      </a:endParaRPr>
+                    </a:p>
+                    <a:p>
+                      <a:r>
+                        <a:rPr lang="en-US" sz="2000" b="0" dirty="0">
+                          <a:solidFill>
+                            <a:srgbClr val="000000"/>
+                          </a:solidFill>
+                          <a:latin typeface="Consolas" panose="020B0609020204030204" pitchFamily="49" charset="0"/>
+                        </a:rPr>
+                        <a:t>                  </a:t>
+                      </a:r>
+                      <a:r>
+                        <a:rPr lang="en-US" sz="2000" b="1" dirty="0">
+                          <a:solidFill>
+                            <a:srgbClr val="800080"/>
+                          </a:solidFill>
+                          <a:latin typeface="Consolas" panose="020B0609020204030204" pitchFamily="49" charset="0"/>
+                        </a:rPr>
+                        <a:t>depth</a:t>
+                      </a:r>
+                      <a:r>
+                        <a:rPr lang="en-US" sz="2000" b="0" dirty="0">
+                          <a:solidFill>
+                            <a:srgbClr val="0000FF"/>
+                          </a:solidFill>
+                          <a:latin typeface="Consolas" panose="020B0609020204030204" pitchFamily="49" charset="0"/>
+                        </a:rPr>
+                        <a:t>="</a:t>
+                      </a:r>
+                      <a:r>
+                        <a:rPr lang="en-US" sz="2000" b="0" dirty="0" err="1">
+                          <a:solidFill>
+                            <a:srgbClr val="2B91AF"/>
+                          </a:solidFill>
+                          <a:latin typeface="Consolas" panose="020B0609020204030204" pitchFamily="49" charset="0"/>
+                        </a:rPr>
+                        <a:t>CalendarView</a:t>
+                      </a:r>
+                      <a:r>
+                        <a:rPr lang="en-US" sz="2000" b="0" dirty="0" err="1">
+                          <a:solidFill>
+                            <a:srgbClr val="000000"/>
+                          </a:solidFill>
+                          <a:latin typeface="Consolas" panose="020B0609020204030204" pitchFamily="49" charset="0"/>
+                        </a:rPr>
+                        <a:t>.Year</a:t>
+                      </a:r>
+                      <a:r>
+                        <a:rPr lang="en-US" sz="2000" b="0" dirty="0">
+                          <a:solidFill>
+                            <a:srgbClr val="0000FF"/>
+                          </a:solidFill>
+                          <a:latin typeface="Consolas" panose="020B0609020204030204" pitchFamily="49" charset="0"/>
+                        </a:rPr>
+                        <a:t>"</a:t>
+                      </a:r>
+                      <a:endParaRPr lang="en-US" sz="2000" b="0" dirty="0">
+                        <a:solidFill>
+                          <a:srgbClr val="000000"/>
+                        </a:solidFill>
+                        <a:latin typeface="Consolas" panose="020B0609020204030204" pitchFamily="49" charset="0"/>
+                      </a:endParaRPr>
+                    </a:p>
+                    <a:p>
+                      <a:r>
+                        <a:rPr lang="en-US" sz="2000" b="0" dirty="0">
+                          <a:solidFill>
+                            <a:srgbClr val="000000"/>
+                          </a:solidFill>
+                          <a:latin typeface="Consolas" panose="020B0609020204030204" pitchFamily="49" charset="0"/>
+                        </a:rPr>
+                        <a:t>                  </a:t>
+                      </a:r>
+                      <a:r>
+                        <a:rPr lang="en-US" sz="2000" b="1" dirty="0">
+                          <a:solidFill>
+                            <a:srgbClr val="800080"/>
+                          </a:solidFill>
+                          <a:latin typeface="Consolas" panose="020B0609020204030204" pitchFamily="49" charset="0"/>
+                        </a:rPr>
+                        <a:t>format</a:t>
+                      </a:r>
+                      <a:r>
+                        <a:rPr lang="en-US" sz="2000" b="0" dirty="0">
+                          <a:solidFill>
+                            <a:srgbClr val="0000FF"/>
+                          </a:solidFill>
+                          <a:latin typeface="Consolas" panose="020B0609020204030204" pitchFamily="49" charset="0"/>
+                        </a:rPr>
+                        <a:t>="MMMM </a:t>
+                      </a:r>
+                      <a:r>
+                        <a:rPr lang="en-US" sz="2000" b="0" dirty="0" err="1">
+                          <a:solidFill>
+                            <a:srgbClr val="0000FF"/>
+                          </a:solidFill>
+                          <a:latin typeface="Consolas" panose="020B0609020204030204" pitchFamily="49" charset="0"/>
+                        </a:rPr>
+                        <a:t>yyyy</a:t>
+                      </a:r>
+                      <a:r>
+                        <a:rPr lang="en-US" sz="2000" b="0" dirty="0">
+                          <a:solidFill>
+                            <a:srgbClr val="0000FF"/>
+                          </a:solidFill>
+                          <a:latin typeface="Consolas" panose="020B0609020204030204" pitchFamily="49" charset="0"/>
+                        </a:rPr>
+                        <a:t>"</a:t>
+                      </a:r>
+                      <a:endParaRPr lang="en-US" sz="2000" b="0" dirty="0">
+                        <a:solidFill>
+                          <a:srgbClr val="000000"/>
+                        </a:solidFill>
+                        <a:latin typeface="Consolas" panose="020B0609020204030204" pitchFamily="49" charset="0"/>
+                      </a:endParaRPr>
+                    </a:p>
+                    <a:p>
+                      <a:r>
+                        <a:rPr lang="en-US" sz="2000" b="0" dirty="0">
+                          <a:solidFill>
+                            <a:srgbClr val="000000"/>
+                          </a:solidFill>
+                          <a:latin typeface="Consolas" panose="020B0609020204030204" pitchFamily="49" charset="0"/>
+                        </a:rPr>
+                        <a:t>                  </a:t>
+                      </a:r>
+                      <a:r>
+                        <a:rPr lang="en-US" sz="2000" b="1" dirty="0">
+                          <a:solidFill>
+                            <a:srgbClr val="800080"/>
+                          </a:solidFill>
+                          <a:latin typeface="Consolas" panose="020B0609020204030204" pitchFamily="49" charset="0"/>
+                        </a:rPr>
+                        <a:t>value</a:t>
+                      </a:r>
+                      <a:r>
+                        <a:rPr lang="en-US" sz="2000" b="0" dirty="0">
+                          <a:solidFill>
+                            <a:srgbClr val="0000FF"/>
+                          </a:solidFill>
+                          <a:latin typeface="Consolas" panose="020B0609020204030204" pitchFamily="49" charset="0"/>
+                        </a:rPr>
+                        <a:t>='</a:t>
+                      </a:r>
+                      <a:r>
+                        <a:rPr lang="en-US" sz="2000" b="0" dirty="0" err="1">
+                          <a:solidFill>
+                            <a:srgbClr val="2B91AF"/>
+                          </a:solidFill>
+                          <a:latin typeface="Consolas" panose="020B0609020204030204" pitchFamily="49" charset="0"/>
+                        </a:rPr>
+                        <a:t>DateTime</a:t>
+                      </a:r>
+                      <a:r>
+                        <a:rPr lang="en-US" sz="2000" b="0" dirty="0" err="1">
+                          <a:solidFill>
+                            <a:srgbClr val="000000"/>
+                          </a:solidFill>
+                          <a:latin typeface="Consolas" panose="020B0609020204030204" pitchFamily="49" charset="0"/>
+                        </a:rPr>
+                        <a:t>.Parse</a:t>
+                      </a:r>
+                      <a:r>
+                        <a:rPr lang="en-US" sz="2000" b="0" dirty="0">
+                          <a:solidFill>
+                            <a:srgbClr val="000000"/>
+                          </a:solidFill>
+                          <a:latin typeface="Consolas" panose="020B0609020204030204" pitchFamily="49" charset="0"/>
+                        </a:rPr>
+                        <a:t>(</a:t>
+                      </a:r>
+                      <a:r>
+                        <a:rPr lang="en-US" sz="2000" b="0" dirty="0">
+                          <a:solidFill>
+                            <a:srgbClr val="A31515"/>
+                          </a:solidFill>
+                          <a:latin typeface="Consolas" panose="020B0609020204030204" pitchFamily="49" charset="0"/>
+                        </a:rPr>
+                        <a:t>"November 2011"</a:t>
+                      </a:r>
+                      <a:r>
+                        <a:rPr lang="en-US" sz="2000" b="0" dirty="0">
+                          <a:solidFill>
+                            <a:srgbClr val="000000"/>
+                          </a:solidFill>
+                          <a:latin typeface="Consolas" panose="020B0609020204030204" pitchFamily="49" charset="0"/>
+                        </a:rPr>
+                        <a:t>)</a:t>
+                      </a:r>
+                      <a:r>
+                        <a:rPr lang="en-US" sz="2000" b="0" dirty="0">
+                          <a:solidFill>
+                            <a:srgbClr val="0000FF"/>
+                          </a:solidFill>
+                          <a:latin typeface="Consolas" panose="020B0609020204030204" pitchFamily="49" charset="0"/>
+                        </a:rPr>
+                        <a:t>'</a:t>
+                      </a:r>
+                      <a:r>
+                        <a:rPr lang="en-US" sz="2000" b="0" dirty="0">
+                          <a:solidFill>
+                            <a:srgbClr val="000000"/>
+                          </a:solidFill>
+                          <a:latin typeface="Consolas" panose="020B0609020204030204" pitchFamily="49" charset="0"/>
+                        </a:rPr>
+                        <a:t> </a:t>
+                      </a:r>
+                      <a:r>
+                        <a:rPr lang="en-US" sz="2000" b="0" dirty="0">
+                          <a:solidFill>
+                            <a:srgbClr val="0000FF"/>
+                          </a:solidFill>
+                          <a:latin typeface="Consolas" panose="020B0609020204030204" pitchFamily="49" charset="0"/>
+                        </a:rPr>
+                        <a:t>/&gt;</a:t>
+                      </a:r>
+                      <a:endParaRPr lang="en-US" sz="2000" dirty="0">
+                        <a:solidFill>
+                          <a:srgbClr val="000000"/>
+                        </a:solidFill>
+                        <a:latin typeface="Consolas" panose="020B0609020204030204" pitchFamily="49" charset="0"/>
+                      </a:endParaRPr>
+                    </a:p>
+                  </a:txBody>
+                  <a:tcPr>
+                    <a:lnL w="12700" cap="flat" cmpd="sng" algn="ctr">
+                      <a:solidFill>
+                        <a:schemeClr val="tx1"/>
+                      </a:solidFill>
+                      <a:prstDash val="solid"/>
+                      <a:round/>
+                      <a:headEnd type="none" w="med" len="med"/>
+                      <a:tailEnd type="none" w="med" len="med"/>
+                    </a:lnL>
+                    <a:lnR w="12700" cap="flat" cmpd="sng" algn="ctr">
+                      <a:solidFill>
+                        <a:schemeClr val="tx1"/>
+                      </a:solidFill>
+                      <a:prstDash val="solid"/>
+                      <a:round/>
+                      <a:headEnd type="none" w="med" len="med"/>
+                      <a:tailEnd type="none" w="med" len="med"/>
+                    </a:lnR>
+                    <a:lnT w="12700" cap="flat" cmpd="sng" algn="ctr">
+                      <a:solidFill>
+                        <a:schemeClr val="tx1"/>
+                      </a:solidFill>
+                      <a:prstDash val="solid"/>
+                      <a:round/>
+                      <a:headEnd type="none" w="med" len="med"/>
+                      <a:tailEnd type="none" w="med" len="med"/>
+                    </a:lnT>
+                    <a:lnB w="12700" cap="flat" cmpd="sng" algn="ctr">
+                      <a:solidFill>
+                        <a:schemeClr val="tx1"/>
+                      </a:solidFill>
+                      <a:prstDash val="solid"/>
+                      <a:round/>
+                      <a:headEnd type="none" w="med" len="med"/>
+                      <a:tailEnd type="none" w="med" len="med"/>
+                    </a:lnB>
+                    <a:solidFill>
+                      <a:schemeClr val="tx1"/>
+                    </a:solidFill>
+                  </a:tcPr>
+                </a:tc>
+                <a:extLst>
+                  <a:ext uri="{0D108BD9-81ED-4DB2-BD59-A6C34878D82A}">
+                    <a16:rowId xmlns:a16="http://schemas.microsoft.com/office/drawing/2014/main" val="3473222697"/>
+                  </a:ext>
+                </a:extLst>
+              </a:tr>
+            </a:tbl>
+          </a:graphicData>
+        </a:graphic>
+      </p:graphicFrame>
+      <p:sp>
+        <p:nvSpPr>
+          <p:cNvPr id="9" name="Rectangle 8"/>
+          <p:cNvSpPr/>
+          <p:nvPr/>
+        </p:nvSpPr>
+        <p:spPr>
+          <a:xfrm>
+            <a:off x="931228" y="1871533"/>
+            <a:ext cx="2900800" cy="446567"/>
+          </a:xfrm>
+          <a:prstGeom prst="rect">
+            <a:avLst/>
+          </a:prstGeom>
+        </p:spPr>
+        <p:style>
+          <a:lnRef idx="1">
+            <a:schemeClr val="accent1"/>
+          </a:lnRef>
+          <a:fillRef idx="2">
+            <a:schemeClr val="accent1"/>
+          </a:fillRef>
+          <a:effectRef idx="1">
+            <a:schemeClr val="accent1"/>
+          </a:effectRef>
+          <a:fontRef idx="minor">
+            <a:schemeClr val="dk1"/>
+          </a:fontRef>
+        </p:style>
+        <p:txBody>
+          <a:bodyPr rtlCol="0" anchor="ctr"/>
+          <a:lstStyle/>
+          <a:p>
+            <a:pPr algn="ctr"/>
+            <a:r>
+              <a:rPr lang="en-US" b="1" dirty="0" err="1"/>
+              <a:t>Index.cshtml</a:t>
+            </a:r>
+            <a:endParaRPr lang="en-US" b="1" dirty="0"/>
+          </a:p>
+        </p:txBody>
+      </p:sp>
       <p:sp>
         <p:nvSpPr>
           <p:cNvPr id="2" name="Title 1"/>
@@ -19593,19 +20357,38 @@
           <a:p>
             <a:r>
               <a:rPr lang="en-US" dirty="0"/>
-              <a:t>Demo</a:t>
+              <a:t>3</a:t>
+            </a:r>
+            <a:r>
+              <a:rPr lang="en-US" baseline="30000" dirty="0"/>
+              <a:t>rd</a:t>
+            </a:r>
+            <a:r>
+              <a:rPr lang="en-US" dirty="0"/>
+              <a:t> Party Tag Helpers</a:t>
+            </a:r>
+            <a:br>
+              <a:rPr lang="en-US" dirty="0"/>
+            </a:br>
+            <a:r>
+              <a:rPr lang="en-US" sz="2000" dirty="0" err="1"/>
+              <a:t>Telerik</a:t>
+            </a:r>
+            <a:r>
+              <a:rPr lang="en-US" sz="2000" dirty="0"/>
+              <a:t> UI for ASP.NET Core</a:t>
             </a:r>
           </a:p>
         </p:txBody>
       </p:sp>
       <p:sp>
         <p:nvSpPr>
-          <p:cNvPr id="4" name="Text Placeholder 3"/>
+          <p:cNvPr id="5" name="Content Placeholder 4"/>
           <p:cNvSpPr>
             <a:spLocks noGrp="1"/>
           </p:cNvSpPr>
           <p:nvPr>
-            <p:ph type="body" idx="1"/>
+            <p:ph sz="half" idx="2"/>
           </p:nvPr>
         </p:nvSpPr>
         <p:spPr/>
@@ -19613,115 +20396,310 @@
           <a:bodyPr/>
           <a:lstStyle/>
           <a:p>
-            <a:r>
-              <a:rPr lang="en-US" dirty="0"/>
-              <a:t>Tag Helpers</a:t>
-            </a:r>
-          </a:p>
-        </p:txBody>
-      </p:sp>
-      <p:sp>
-        <p:nvSpPr>
-          <p:cNvPr id="9" name="TextBox 8"/>
-          <p:cNvSpPr txBox="1"/>
-          <p:nvPr/>
-        </p:nvSpPr>
-        <p:spPr>
-          <a:xfrm>
-            <a:off x="908050" y="1466850"/>
-            <a:ext cx="10928350" cy="369332"/>
-          </a:xfrm>
-          <a:prstGeom prst="rect">
-            <a:avLst/>
-          </a:prstGeom>
-          <a:noFill/>
-        </p:spPr>
-        <p:txBody>
-          <a:bodyPr wrap="square" rtlCol="0">
-            <a:spAutoFit/>
-          </a:bodyPr>
-          <a:lstStyle/>
-          <a:p>
-            <a:pPr marL="0" marR="0" lvl="0" indent="0" defTabSz="914400" eaLnBrk="1" fontAlgn="auto" latinLnBrk="0" hangingPunct="1">
-              <a:lnSpc>
-                <a:spcPct val="100000"/>
-              </a:lnSpc>
-              <a:spcBef>
-                <a:spcPts val="0"/>
-              </a:spcBef>
-              <a:spcAft>
-                <a:spcPts val="0"/>
-              </a:spcAft>
-              <a:buClrTx/>
-              <a:buSzTx/>
-              <a:buFontTx/>
+            <a:pPr marL="0" indent="0">
               <a:buNone/>
-              <a:tabLst/>
-              <a:defRPr/>
             </a:pPr>
-            <a:endParaRPr kumimoji="0" lang="en-US" sz="1800" b="0" i="0" u="none" strike="noStrike" kern="0" cap="none" spc="0" normalizeH="0" baseline="0" noProof="0" dirty="0">
-              <a:ln>
-                <a:noFill/>
-              </a:ln>
+            <a:endParaRPr lang="en-US" dirty="0"/>
+          </a:p>
+          <a:p>
+            <a:pPr marL="0" indent="0">
+              <a:buNone/>
+            </a:pPr>
+            <a:endParaRPr lang="en-US" b="1" dirty="0">
               <a:solidFill>
-                <a:sysClr val="windowText" lastClr="000000"/>
+                <a:schemeClr val="accent4">
+                  <a:lumMod val="40000"/>
+                  <a:lumOff val="60000"/>
+                </a:schemeClr>
               </a:solidFill>
-              <a:effectLst/>
-              <a:uLnTx/>
-              <a:uFillTx/>
             </a:endParaRPr>
           </a:p>
         </p:txBody>
       </p:sp>
       <p:pic>
         <p:nvPicPr>
-          <p:cNvPr id="5" name="Picture 4"/>
+          <p:cNvPr id="7" name="Picture 6"/>
           <p:cNvPicPr>
             <a:picLocks noChangeAspect="1"/>
           </p:cNvPicPr>
           <p:nvPr/>
         </p:nvPicPr>
         <p:blipFill>
-          <a:blip r:embed="rId3">
-            <a:extLst>
-              <a:ext uri="{BEBA8EAE-BF5A-486C-A8C5-ECC9F3942E4B}">
-                <a14:imgProps xmlns:a14="http://schemas.microsoft.com/office/drawing/2010/main">
-                  <a14:imgLayer r:embed="rId4">
-                    <a14:imgEffect>
-                      <a14:backgroundRemoval t="0" b="91837" l="0" r="40593"/>
-                    </a14:imgEffect>
-                  </a14:imgLayer>
-                </a14:imgProps>
-              </a:ext>
-              <a:ext uri="{28A0092B-C50C-407E-A947-70E740481C1C}">
-                <a14:useLocalDpi xmlns:a14="http://schemas.microsoft.com/office/drawing/2010/main" val="0"/>
-              </a:ext>
-            </a:extLst>
-          </a:blip>
+          <a:blip r:embed="rId3"/>
           <a:stretch>
             <a:fillRect/>
           </a:stretch>
         </p:blipFill>
         <p:spPr>
           <a:xfrm>
-            <a:off x="572165" y="2593320"/>
-            <a:ext cx="8053025" cy="3507540"/>
+            <a:off x="2937753" y="3217568"/>
+            <a:ext cx="8612221" cy="3355087"/>
           </a:xfrm>
           <a:prstGeom prst="rect">
             <a:avLst/>
           </a:prstGeom>
         </p:spPr>
       </p:pic>
+      <p:sp>
+        <p:nvSpPr>
+          <p:cNvPr id="11" name="Arrow: Bent-Up 10"/>
+          <p:cNvSpPr/>
+          <p:nvPr/>
+        </p:nvSpPr>
+        <p:spPr>
+          <a:xfrm rot="5400000">
+            <a:off x="1805573" y="3124952"/>
+            <a:ext cx="1756508" cy="1070042"/>
+          </a:xfrm>
+          <a:prstGeom prst="bentUpArrow">
+            <a:avLst/>
+          </a:prstGeom>
+        </p:spPr>
+        <p:style>
+          <a:lnRef idx="2">
+            <a:schemeClr val="accent1">
+              <a:shade val="50000"/>
+            </a:schemeClr>
+          </a:lnRef>
+          <a:fillRef idx="1">
+            <a:schemeClr val="accent1"/>
+          </a:fillRef>
+          <a:effectRef idx="0">
+            <a:schemeClr val="accent1"/>
+          </a:effectRef>
+          <a:fontRef idx="minor">
+            <a:schemeClr val="lt1"/>
+          </a:fontRef>
+        </p:style>
+        <p:txBody>
+          <a:bodyPr rtlCol="0" anchor="ctr"/>
+          <a:lstStyle/>
+          <a:p>
+            <a:pPr algn="ctr"/>
+            <a:endParaRPr lang="en-US"/>
+          </a:p>
+        </p:txBody>
+      </p:sp>
     </p:spTree>
     <p:extLst>
       <p:ext uri="{BB962C8B-B14F-4D97-AF65-F5344CB8AC3E}">
-        <p14:creationId xmlns:p14="http://schemas.microsoft.com/office/powerpoint/2010/main" val="533623519"/>
+        <p14:creationId xmlns:p14="http://schemas.microsoft.com/office/powerpoint/2010/main" val="2633706702"/>
       </p:ext>
     </p:extLst>
   </p:cSld>
   <p:clrMapOvr>
     <a:masterClrMapping/>
   </p:clrMapOvr>
+  <p:timing>
+    <p:tnLst>
+      <p:par>
+        <p:cTn id="1" dur="indefinite" restart="never" nodeType="tmRoot">
+          <p:childTnLst>
+            <p:seq concurrent="1" nextAc="seek">
+              <p:cTn id="2" dur="indefinite" nodeType="mainSeq">
+                <p:childTnLst>
+                  <p:par>
+                    <p:cTn id="3" fill="hold">
+                      <p:stCondLst>
+                        <p:cond delay="indefinite"/>
+                      </p:stCondLst>
+                      <p:childTnLst>
+                        <p:par>
+                          <p:cTn id="4" fill="hold">
+                            <p:stCondLst>
+                              <p:cond delay="0"/>
+                            </p:stCondLst>
+                            <p:childTnLst>
+                              <p:par>
+                                <p:cTn id="5" presetID="10" presetClass="entr" presetSubtype="0" fill="hold" nodeType="clickEffect">
+                                  <p:stCondLst>
+                                    <p:cond delay="0"/>
+                                  </p:stCondLst>
+                                  <p:childTnLst>
+                                    <p:set>
+                                      <p:cBhvr>
+                                        <p:cTn id="6" dur="1" fill="hold">
+                                          <p:stCondLst>
+                                            <p:cond delay="0"/>
+                                          </p:stCondLst>
+                                        </p:cTn>
+                                        <p:tgtEl>
+                                          <p:spTgt spid="8"/>
+                                        </p:tgtEl>
+                                        <p:attrNameLst>
+                                          <p:attrName>style.visibility</p:attrName>
+                                        </p:attrNameLst>
+                                      </p:cBhvr>
+                                      <p:to>
+                                        <p:strVal val="visible"/>
+                                      </p:to>
+                                    </p:set>
+                                    <p:animEffect transition="in" filter="fade">
+                                      <p:cBhvr>
+                                        <p:cTn id="7" dur="500"/>
+                                        <p:tgtEl>
+                                          <p:spTgt spid="8"/>
+                                        </p:tgtEl>
+                                      </p:cBhvr>
+                                    </p:animEffect>
+                                  </p:childTnLst>
+                                </p:cTn>
+                              </p:par>
+                              <p:par>
+                                <p:cTn id="8" presetID="10" presetClass="entr" presetSubtype="0" fill="hold" grpId="0" nodeType="withEffect">
+                                  <p:stCondLst>
+                                    <p:cond delay="0"/>
+                                  </p:stCondLst>
+                                  <p:childTnLst>
+                                    <p:set>
+                                      <p:cBhvr>
+                                        <p:cTn id="9" dur="1" fill="hold">
+                                          <p:stCondLst>
+                                            <p:cond delay="0"/>
+                                          </p:stCondLst>
+                                        </p:cTn>
+                                        <p:tgtEl>
+                                          <p:spTgt spid="9"/>
+                                        </p:tgtEl>
+                                        <p:attrNameLst>
+                                          <p:attrName>style.visibility</p:attrName>
+                                        </p:attrNameLst>
+                                      </p:cBhvr>
+                                      <p:to>
+                                        <p:strVal val="visible"/>
+                                      </p:to>
+                                    </p:set>
+                                    <p:animEffect transition="in" filter="fade">
+                                      <p:cBhvr>
+                                        <p:cTn id="10" dur="500"/>
+                                        <p:tgtEl>
+                                          <p:spTgt spid="9"/>
+                                        </p:tgtEl>
+                                      </p:cBhvr>
+                                    </p:animEffect>
+                                  </p:childTnLst>
+                                </p:cTn>
+                              </p:par>
+                            </p:childTnLst>
+                          </p:cTn>
+                        </p:par>
+                      </p:childTnLst>
+                    </p:cTn>
+                  </p:par>
+                  <p:par>
+                    <p:cTn id="11" fill="hold">
+                      <p:stCondLst>
+                        <p:cond delay="indefinite"/>
+                      </p:stCondLst>
+                      <p:childTnLst>
+                        <p:par>
+                          <p:cTn id="12" fill="hold">
+                            <p:stCondLst>
+                              <p:cond delay="0"/>
+                            </p:stCondLst>
+                            <p:childTnLst>
+                              <p:par>
+                                <p:cTn id="13" presetID="22" presetClass="entr" presetSubtype="1" fill="hold" grpId="0" nodeType="clickEffect">
+                                  <p:stCondLst>
+                                    <p:cond delay="0"/>
+                                  </p:stCondLst>
+                                  <p:childTnLst>
+                                    <p:set>
+                                      <p:cBhvr>
+                                        <p:cTn id="14" dur="1" fill="hold">
+                                          <p:stCondLst>
+                                            <p:cond delay="0"/>
+                                          </p:stCondLst>
+                                        </p:cTn>
+                                        <p:tgtEl>
+                                          <p:spTgt spid="11"/>
+                                        </p:tgtEl>
+                                        <p:attrNameLst>
+                                          <p:attrName>style.visibility</p:attrName>
+                                        </p:attrNameLst>
+                                      </p:cBhvr>
+                                      <p:to>
+                                        <p:strVal val="visible"/>
+                                      </p:to>
+                                    </p:set>
+                                    <p:animEffect transition="in" filter="wipe(up)">
+                                      <p:cBhvr>
+                                        <p:cTn id="15" dur="500"/>
+                                        <p:tgtEl>
+                                          <p:spTgt spid="11"/>
+                                        </p:tgtEl>
+                                      </p:cBhvr>
+                                    </p:animEffect>
+                                  </p:childTnLst>
+                                </p:cTn>
+                              </p:par>
+                              <p:par>
+                                <p:cTn id="16" presetID="10" presetClass="entr" presetSubtype="0" fill="hold" nodeType="withEffect">
+                                  <p:stCondLst>
+                                    <p:cond delay="0"/>
+                                  </p:stCondLst>
+                                  <p:childTnLst>
+                                    <p:set>
+                                      <p:cBhvr>
+                                        <p:cTn id="17" dur="1" fill="hold">
+                                          <p:stCondLst>
+                                            <p:cond delay="0"/>
+                                          </p:stCondLst>
+                                        </p:cTn>
+                                        <p:tgtEl>
+                                          <p:spTgt spid="7"/>
+                                        </p:tgtEl>
+                                        <p:attrNameLst>
+                                          <p:attrName>style.visibility</p:attrName>
+                                        </p:attrNameLst>
+                                      </p:cBhvr>
+                                      <p:to>
+                                        <p:strVal val="visible"/>
+                                      </p:to>
+                                    </p:set>
+                                    <p:animEffect transition="in" filter="fade">
+                                      <p:cBhvr>
+                                        <p:cTn id="18" dur="500"/>
+                                        <p:tgtEl>
+                                          <p:spTgt spid="7"/>
+                                        </p:tgtEl>
+                                      </p:cBhvr>
+                                    </p:animEffect>
+                                  </p:childTnLst>
+                                </p:cTn>
+                              </p:par>
+                            </p:childTnLst>
+                          </p:cTn>
+                        </p:par>
+                      </p:childTnLst>
+                    </p:cTn>
+                  </p:par>
+                </p:childTnLst>
+              </p:cTn>
+              <p:prevCondLst>
+                <p:cond evt="onPrev" delay="0">
+                  <p:tgtEl>
+                    <p:sldTgt/>
+                  </p:tgtEl>
+                </p:cond>
+              </p:prevCondLst>
+              <p:nextCondLst>
+                <p:cond evt="onNext" delay="0">
+                  <p:tgtEl>
+                    <p:sldTgt/>
+                  </p:tgtEl>
+                </p:cond>
+              </p:nextCondLst>
+            </p:seq>
+          </p:childTnLst>
+        </p:cTn>
+      </p:par>
+    </p:tnLst>
+    <p:bldLst>
+      <p:bldP spid="9" grpId="0" animBg="1"/>
+      <p:bldP spid="11" grpId="0" animBg="1"/>
+    </p:bldLst>
+  </p:timing>
 </p:sld>
 </file>
 

</xml_diff>

<commit_message>
Add demo slide animations
</commit_message>
<xml_diff>
--- a/Building Reusable UI Components in ASP.NET Core MVC.pptx
+++ b/Building Reusable UI Components in ASP.NET Core MVC.pptx
@@ -11439,6 +11439,92 @@
   <p:clrMapOvr>
     <a:masterClrMapping/>
   </p:clrMapOvr>
+  <p:timing>
+    <p:tnLst>
+      <p:par>
+        <p:cTn id="1" dur="indefinite" restart="never" nodeType="tmRoot">
+          <p:childTnLst>
+            <p:seq concurrent="1" nextAc="seek">
+              <p:cTn id="2" dur="indefinite" nodeType="mainSeq">
+                <p:childTnLst>
+                  <p:par>
+                    <p:cTn id="3" fill="hold">
+                      <p:stCondLst>
+                        <p:cond delay="indefinite"/>
+                        <p:cond evt="onBegin" delay="0">
+                          <p:tn val="2"/>
+                        </p:cond>
+                      </p:stCondLst>
+                      <p:childTnLst>
+                        <p:par>
+                          <p:cTn id="4" fill="hold">
+                            <p:stCondLst>
+                              <p:cond delay="0"/>
+                            </p:stCondLst>
+                            <p:childTnLst>
+                              <p:par>
+                                <p:cTn id="5" presetID="22" presetClass="entr" presetSubtype="8" fill="hold" nodeType="afterEffect">
+                                  <p:stCondLst>
+                                    <p:cond delay="0"/>
+                                  </p:stCondLst>
+                                  <p:childTnLst>
+                                    <p:set>
+                                      <p:cBhvr>
+                                        <p:cTn id="6" dur="1" fill="hold">
+                                          <p:stCondLst>
+                                            <p:cond delay="0"/>
+                                          </p:stCondLst>
+                                        </p:cTn>
+                                        <p:tgtEl>
+                                          <p:spTgt spid="5"/>
+                                        </p:tgtEl>
+                                        <p:attrNameLst>
+                                          <p:attrName>style.visibility</p:attrName>
+                                        </p:attrNameLst>
+                                      </p:cBhvr>
+                                      <p:to>
+                                        <p:strVal val="visible"/>
+                                      </p:to>
+                                    </p:set>
+                                    <p:animEffect transition="in" filter="wipe(left)">
+                                      <p:cBhvr>
+                                        <p:cTn id="7" dur="1000"/>
+                                        <p:tgtEl>
+                                          <p:spTgt spid="5"/>
+                                        </p:tgtEl>
+                                      </p:cBhvr>
+                                    </p:animEffect>
+                                  </p:childTnLst>
+                                </p:cTn>
+                              </p:par>
+                            </p:childTnLst>
+                          </p:cTn>
+                        </p:par>
+                      </p:childTnLst>
+                    </p:cTn>
+                  </p:par>
+                </p:childTnLst>
+              </p:cTn>
+              <p:prevCondLst>
+                <p:cond evt="onPrev" delay="0">
+                  <p:tgtEl>
+                    <p:sldTgt/>
+                  </p:tgtEl>
+                </p:cond>
+              </p:prevCondLst>
+              <p:nextCondLst>
+                <p:cond evt="onNext" delay="0">
+                  <p:tgtEl>
+                    <p:sldTgt/>
+                  </p:tgtEl>
+                </p:cond>
+              </p:nextCondLst>
+            </p:seq>
+          </p:childTnLst>
+        </p:cTn>
+      </p:par>
+    </p:tnLst>
+  </p:timing>
 </p:sld>
 </file>
 
@@ -14718,6 +14804,92 @@
   <p:clrMapOvr>
     <a:masterClrMapping/>
   </p:clrMapOvr>
+  <p:timing>
+    <p:tnLst>
+      <p:par>
+        <p:cTn id="1" dur="indefinite" restart="never" nodeType="tmRoot">
+          <p:childTnLst>
+            <p:seq concurrent="1" nextAc="seek">
+              <p:cTn id="2" dur="indefinite" nodeType="mainSeq">
+                <p:childTnLst>
+                  <p:par>
+                    <p:cTn id="3" fill="hold">
+                      <p:stCondLst>
+                        <p:cond delay="indefinite"/>
+                        <p:cond evt="onBegin" delay="0">
+                          <p:tn val="2"/>
+                        </p:cond>
+                      </p:stCondLst>
+                      <p:childTnLst>
+                        <p:par>
+                          <p:cTn id="4" fill="hold">
+                            <p:stCondLst>
+                              <p:cond delay="0"/>
+                            </p:stCondLst>
+                            <p:childTnLst>
+                              <p:par>
+                                <p:cTn id="5" presetID="22" presetClass="entr" presetSubtype="8" fill="hold" nodeType="afterEffect">
+                                  <p:stCondLst>
+                                    <p:cond delay="0"/>
+                                  </p:stCondLst>
+                                  <p:childTnLst>
+                                    <p:set>
+                                      <p:cBhvr>
+                                        <p:cTn id="6" dur="1" fill="hold">
+                                          <p:stCondLst>
+                                            <p:cond delay="0"/>
+                                          </p:stCondLst>
+                                        </p:cTn>
+                                        <p:tgtEl>
+                                          <p:spTgt spid="6"/>
+                                        </p:tgtEl>
+                                        <p:attrNameLst>
+                                          <p:attrName>style.visibility</p:attrName>
+                                        </p:attrNameLst>
+                                      </p:cBhvr>
+                                      <p:to>
+                                        <p:strVal val="visible"/>
+                                      </p:to>
+                                    </p:set>
+                                    <p:animEffect transition="in" filter="wipe(left)">
+                                      <p:cBhvr>
+                                        <p:cTn id="7" dur="1000"/>
+                                        <p:tgtEl>
+                                          <p:spTgt spid="6"/>
+                                        </p:tgtEl>
+                                      </p:cBhvr>
+                                    </p:animEffect>
+                                  </p:childTnLst>
+                                </p:cTn>
+                              </p:par>
+                            </p:childTnLst>
+                          </p:cTn>
+                        </p:par>
+                      </p:childTnLst>
+                    </p:cTn>
+                  </p:par>
+                </p:childTnLst>
+              </p:cTn>
+              <p:prevCondLst>
+                <p:cond evt="onPrev" delay="0">
+                  <p:tgtEl>
+                    <p:sldTgt/>
+                  </p:tgtEl>
+                </p:cond>
+              </p:prevCondLst>
+              <p:nextCondLst>
+                <p:cond evt="onNext" delay="0">
+                  <p:tgtEl>
+                    <p:sldTgt/>
+                  </p:tgtEl>
+                </p:cond>
+              </p:nextCondLst>
+            </p:seq>
+          </p:childTnLst>
+        </p:cTn>
+      </p:par>
+    </p:tnLst>
+  </p:timing>
 </p:sld>
 </file>
 

</xml_diff>

<commit_message>
Updates to 3rd Party Tag Helpers slide
</commit_message>
<xml_diff>
--- a/Building Reusable UI Components in ASP.NET Core MVC.pptx
+++ b/Building Reusable UI Components in ASP.NET Core MVC.pptx
@@ -20543,7 +20543,7 @@
               <a:rPr lang="en-US" dirty="0"/>
             </a:br>
             <a:r>
-              <a:rPr lang="en-US" sz="2000" dirty="0" err="1"/>
+              <a:rPr lang="en-US" sz="2000" b="1" dirty="0" err="1"/>
               <a:t>Telerik</a:t>
             </a:r>
             <a:r>
@@ -20626,6 +20626,11 @@
           <a:prstGeom prst="bentUpArrow">
             <a:avLst/>
           </a:prstGeom>
+          <a:ln>
+            <a:solidFill>
+              <a:schemeClr val="tx1"/>
+            </a:solidFill>
+          </a:ln>
         </p:spPr>
         <p:style>
           <a:lnRef idx="2">
@@ -20652,6 +20657,36 @@
           </a:p>
         </p:txBody>
       </p:sp>
+      <p:pic>
+        <p:nvPicPr>
+          <p:cNvPr id="13" name="Picture 12"/>
+          <p:cNvPicPr>
+            <a:picLocks noChangeAspect="1"/>
+          </p:cNvPicPr>
+          <p:nvPr/>
+        </p:nvPicPr>
+        <p:blipFill>
+          <a:blip r:embed="rId4">
+            <a:extLst>
+              <a:ext uri="{28A0092B-C50C-407E-A947-70E740481C1C}">
+                <a14:useLocalDpi xmlns:a14="http://schemas.microsoft.com/office/drawing/2010/main" val="0"/>
+              </a:ext>
+            </a:extLst>
+          </a:blip>
+          <a:stretch>
+            <a:fillRect/>
+          </a:stretch>
+        </p:blipFill>
+        <p:spPr>
+          <a:xfrm>
+            <a:off x="3783042" y="1175673"/>
+            <a:ext cx="1098923" cy="321114"/>
+          </a:xfrm>
+          <a:prstGeom prst="rect">
+            <a:avLst/>
+          </a:prstGeom>
+        </p:spPr>
+      </p:pic>
     </p:spTree>
     <p:extLst>
       <p:ext uri="{BB962C8B-B14F-4D97-AF65-F5344CB8AC3E}">

</xml_diff>

<commit_message>
Add HTML Helpers vs. Tag Helpers slide
</commit_message>
<xml_diff>
--- a/Building Reusable UI Components in ASP.NET Core MVC.pptx
+++ b/Building Reusable UI Components in ASP.NET Core MVC.pptx
@@ -16,8 +16,8 @@
     <p:sldId id="324" r:id="rId7"/>
     <p:sldId id="332" r:id="rId8"/>
     <p:sldId id="333" r:id="rId9"/>
-    <p:sldId id="338" r:id="rId10"/>
-    <p:sldId id="340" r:id="rId11"/>
+    <p:sldId id="340" r:id="rId10"/>
+    <p:sldId id="338" r:id="rId11"/>
     <p:sldId id="334" r:id="rId12"/>
     <p:sldId id="325" r:id="rId13"/>
     <p:sldId id="329" r:id="rId14"/>
@@ -143,8 +143,8 @@
             <p14:sldId id="324"/>
             <p14:sldId id="332"/>
             <p14:sldId id="333"/>
+            <p14:sldId id="340"/>
             <p14:sldId id="338"/>
-            <p14:sldId id="340"/>
             <p14:sldId id="334"/>
             <p14:sldId id="325"/>
             <p14:sldId id="329"/>
@@ -2103,7 +2103,10 @@
               <a:buFontTx/>
               <a:buNone/>
             </a:pPr>
-            <a:endParaRPr lang="en-US" dirty="0"/>
+            <a:r>
+              <a:rPr lang="en-US" dirty="0"/>
+              <a:t>- Mention Dave Paquette’s Bootstrap tag helpers</a:t>
+            </a:r>
           </a:p>
         </p:txBody>
       </p:sp>
@@ -2133,7 +2136,7 @@
     </p:spTree>
     <p:extLst>
       <p:ext uri="{BB962C8B-B14F-4D97-AF65-F5344CB8AC3E}">
-        <p14:creationId xmlns:p14="http://schemas.microsoft.com/office/powerpoint/2010/main" val="2277361498"/>
+        <p14:creationId xmlns:p14="http://schemas.microsoft.com/office/powerpoint/2010/main" val="3168805941"/>
       </p:ext>
     </p:extLst>
   </p:cSld>
@@ -2191,10 +2194,7 @@
               <a:buFontTx/>
               <a:buNone/>
             </a:pPr>
-            <a:r>
-              <a:rPr lang="en-US" dirty="0"/>
-              <a:t>- Mention Dave Paquette’s Bootstrap tag helpers</a:t>
-            </a:r>
+            <a:endParaRPr lang="en-US" dirty="0"/>
           </a:p>
         </p:txBody>
       </p:sp>
@@ -2224,7 +2224,7 @@
     </p:spTree>
     <p:extLst>
       <p:ext uri="{BB962C8B-B14F-4D97-AF65-F5344CB8AC3E}">
-        <p14:creationId xmlns:p14="http://schemas.microsoft.com/office/powerpoint/2010/main" val="3168805941"/>
+        <p14:creationId xmlns:p14="http://schemas.microsoft.com/office/powerpoint/2010/main" val="2277361498"/>
       </p:ext>
     </p:extLst>
   </p:cSld>
@@ -19834,187 +19834,6 @@
           <a:chExt cx="0" cy="0"/>
         </a:xfrm>
       </p:grpSpPr>
-      <p:sp>
-        <p:nvSpPr>
-          <p:cNvPr id="2" name="Title 1"/>
-          <p:cNvSpPr>
-            <a:spLocks noGrp="1"/>
-          </p:cNvSpPr>
-          <p:nvPr>
-            <p:ph type="title"/>
-          </p:nvPr>
-        </p:nvSpPr>
-        <p:spPr/>
-        <p:txBody>
-          <a:bodyPr/>
-          <a:lstStyle/>
-          <a:p>
-            <a:r>
-              <a:rPr lang="en-US" dirty="0"/>
-              <a:t>Native Tag Helpers</a:t>
-            </a:r>
-          </a:p>
-        </p:txBody>
-      </p:sp>
-      <p:sp>
-        <p:nvSpPr>
-          <p:cNvPr id="3" name="Content Placeholder 2"/>
-          <p:cNvSpPr>
-            <a:spLocks noGrp="1"/>
-          </p:cNvSpPr>
-          <p:nvPr>
-            <p:ph idx="1"/>
-          </p:nvPr>
-        </p:nvSpPr>
-        <p:spPr/>
-        <p:txBody>
-          <a:bodyPr/>
-          <a:lstStyle/>
-          <a:p>
-            <a:pPr marL="0" indent="0">
-              <a:buNone/>
-            </a:pPr>
-            <a:endParaRPr lang="en-US" dirty="0"/>
-          </a:p>
-        </p:txBody>
-      </p:sp>
-    </p:spTree>
-    <p:extLst>
-      <p:ext uri="{BB962C8B-B14F-4D97-AF65-F5344CB8AC3E}">
-        <p14:creationId xmlns:p14="http://schemas.microsoft.com/office/powerpoint/2010/main" val="485067448"/>
-      </p:ext>
-    </p:extLst>
-  </p:cSld>
-  <p:clrMapOvr>
-    <a:masterClrMapping/>
-  </p:clrMapOvr>
-  <p:timing>
-    <p:tnLst>
-      <p:par>
-        <p:cTn id="1" dur="indefinite" restart="never" nodeType="tmRoot">
-          <p:childTnLst>
-            <p:seq concurrent="1" nextAc="seek">
-              <p:cTn id="2" dur="indefinite" nodeType="mainSeq">
-                <p:childTnLst>
-                  <p:par>
-                    <p:cTn id="3" fill="hold">
-                      <p:stCondLst>
-                        <p:cond delay="indefinite"/>
-                      </p:stCondLst>
-                      <p:childTnLst>
-                        <p:par>
-                          <p:cTn id="4" fill="hold">
-                            <p:stCondLst>
-                              <p:cond delay="0"/>
-                            </p:stCondLst>
-                            <p:childTnLst>
-                              <p:par>
-                                <p:cTn id="5" presetID="10" presetClass="entr" presetSubtype="0" fill="hold" grpId="0" nodeType="clickEffect" nodePh="1">
-                                  <p:stCondLst>
-                                    <p:cond delay="0"/>
-                                  </p:stCondLst>
-                                  <p:endCondLst>
-                                    <p:cond evt="begin" delay="0">
-                                      <p:tn val="5"/>
-                                    </p:cond>
-                                  </p:endCondLst>
-                                  <p:childTnLst>
-                                    <p:set>
-                                      <p:cBhvr>
-                                        <p:cTn id="6" dur="1" fill="hold">
-                                          <p:stCondLst>
-                                            <p:cond delay="0"/>
-                                          </p:stCondLst>
-                                        </p:cTn>
-                                        <p:tgtEl>
-                                          <p:spTgt spid="3">
-                                            <p:txEl>
-                                              <p:pRg st="0" end="0"/>
-                                            </p:txEl>
-                                          </p:spTgt>
-                                        </p:tgtEl>
-                                        <p:attrNameLst>
-                                          <p:attrName>style.visibility</p:attrName>
-                                        </p:attrNameLst>
-                                      </p:cBhvr>
-                                      <p:to>
-                                        <p:strVal val="visible"/>
-                                      </p:to>
-                                    </p:set>
-                                    <p:animEffect transition="in" filter="fade">
-                                      <p:cBhvr>
-                                        <p:cTn id="7" dur="500"/>
-                                        <p:tgtEl>
-                                          <p:spTgt spid="3">
-                                            <p:txEl>
-                                              <p:pRg st="0" end="0"/>
-                                            </p:txEl>
-                                          </p:spTgt>
-                                        </p:tgtEl>
-                                      </p:cBhvr>
-                                    </p:animEffect>
-                                  </p:childTnLst>
-                                </p:cTn>
-                              </p:par>
-                            </p:childTnLst>
-                          </p:cTn>
-                        </p:par>
-                      </p:childTnLst>
-                    </p:cTn>
-                  </p:par>
-                </p:childTnLst>
-              </p:cTn>
-              <p:prevCondLst>
-                <p:cond evt="onPrev" delay="0">
-                  <p:tgtEl>
-                    <p:sldTgt/>
-                  </p:tgtEl>
-                </p:cond>
-              </p:prevCondLst>
-              <p:nextCondLst>
-                <p:cond evt="onNext" delay="0">
-                  <p:tgtEl>
-                    <p:sldTgt/>
-                  </p:tgtEl>
-                </p:cond>
-              </p:nextCondLst>
-            </p:seq>
-          </p:childTnLst>
-        </p:cTn>
-      </p:par>
-    </p:tnLst>
-    <p:bldLst>
-      <p:bldP spid="3" grpId="0" build="p"/>
-    </p:bldLst>
-  </p:timing>
-</p:sld>
-</file>
-
-<file path=ppt/slides/slide9.xml><?xml version="1.0" encoding="utf-8"?>
-<p:sld xmlns:a="http://schemas.openxmlformats.org/drawingml/2006/main" xmlns:r="http://schemas.openxmlformats.org/officeDocument/2006/relationships" xmlns:p="http://schemas.openxmlformats.org/presentationml/2006/main">
-  <p:cSld>
-    <p:bg>
-      <p:bgPr>
-        <a:solidFill>
-          <a:srgbClr val="505050"/>
-        </a:solidFill>
-        <a:effectLst/>
-      </p:bgPr>
-    </p:bg>
-    <p:spTree>
-      <p:nvGrpSpPr>
-        <p:cNvPr id="1" name=""/>
-        <p:cNvGrpSpPr/>
-        <p:nvPr/>
-      </p:nvGrpSpPr>
-      <p:grpSpPr>
-        <a:xfrm>
-          <a:off x="0" y="0"/>
-          <a:ext cx="0" cy="0"/>
-          <a:chOff x="0" y="0"/>
-          <a:chExt cx="0" cy="0"/>
-        </a:xfrm>
-      </p:grpSpPr>
       <p:graphicFrame>
         <p:nvGraphicFramePr>
           <p:cNvPr id="8" name="Table 7"/>
@@ -20907,6 +20726,160 @@
       <p:bldP spid="11" grpId="0" animBg="1"/>
     </p:bldLst>
   </p:timing>
+</p:sld>
+</file>
+
+<file path=ppt/slides/slide9.xml><?xml version="1.0" encoding="utf-8"?>
+<p:sld xmlns:a="http://schemas.openxmlformats.org/drawingml/2006/main" xmlns:r="http://schemas.openxmlformats.org/officeDocument/2006/relationships" xmlns:p="http://schemas.openxmlformats.org/presentationml/2006/main">
+  <p:cSld>
+    <p:bg>
+      <p:bgPr>
+        <a:solidFill>
+          <a:srgbClr val="505050"/>
+        </a:solidFill>
+        <a:effectLst/>
+      </p:bgPr>
+    </p:bg>
+    <p:spTree>
+      <p:nvGrpSpPr>
+        <p:cNvPr id="1" name=""/>
+        <p:cNvGrpSpPr/>
+        <p:nvPr/>
+      </p:nvGrpSpPr>
+      <p:grpSpPr>
+        <a:xfrm>
+          <a:off x="0" y="0"/>
+          <a:ext cx="0" cy="0"/>
+          <a:chOff x="0" y="0"/>
+          <a:chExt cx="0" cy="0"/>
+        </a:xfrm>
+      </p:grpSpPr>
+      <p:sp>
+        <p:nvSpPr>
+          <p:cNvPr id="2" name="Title 1"/>
+          <p:cNvSpPr>
+            <a:spLocks noGrp="1"/>
+          </p:cNvSpPr>
+          <p:nvPr>
+            <p:ph type="title"/>
+          </p:nvPr>
+        </p:nvSpPr>
+        <p:spPr/>
+        <p:txBody>
+          <a:bodyPr/>
+          <a:lstStyle/>
+          <a:p>
+            <a:r>
+              <a:rPr lang="en-US" dirty="0"/>
+              <a:t>HTML Helpers vs. Tag Helpers</a:t>
+            </a:r>
+            <a:br>
+              <a:rPr lang="en-US" dirty="0"/>
+            </a:br>
+            <a:r>
+              <a:rPr lang="en-US" sz="2000"/>
+              <a:t>Side-by-side Comparison</a:t>
+            </a:r>
+            <a:endParaRPr lang="en-US" sz="2000" dirty="0"/>
+          </a:p>
+        </p:txBody>
+      </p:sp>
+      <p:pic>
+        <p:nvPicPr>
+          <p:cNvPr id="1026" name="Picture 2" descr="image"/>
+          <p:cNvPicPr>
+            <a:picLocks noGrp="1" noChangeAspect="1" noChangeArrowheads="1"/>
+          </p:cNvPicPr>
+          <p:nvPr>
+            <p:ph sz="half" idx="1"/>
+          </p:nvPr>
+        </p:nvPicPr>
+        <p:blipFill>
+          <a:blip r:embed="rId3">
+            <a:extLst>
+              <a:ext uri="{28A0092B-C50C-407E-A947-70E740481C1C}">
+                <a14:useLocalDpi xmlns:a14="http://schemas.microsoft.com/office/drawing/2010/main" val="0"/>
+              </a:ext>
+            </a:extLst>
+          </a:blip>
+          <a:srcRect/>
+          <a:stretch>
+            <a:fillRect/>
+          </a:stretch>
+        </p:blipFill>
+        <p:spPr bwMode="auto">
+          <a:xfrm>
+            <a:off x="838200" y="2000803"/>
+            <a:ext cx="5181600" cy="4000982"/>
+          </a:xfrm>
+          <a:prstGeom prst="rect">
+            <a:avLst/>
+          </a:prstGeom>
+          <a:noFill/>
+          <a:extLst>
+            <a:ext uri="{909E8E84-426E-40DD-AFC4-6F175D3DCCD1}">
+              <a14:hiddenFill xmlns:a14="http://schemas.microsoft.com/office/drawing/2010/main">
+                <a:solidFill>
+                  <a:srgbClr val="FFFFFF"/>
+                </a:solidFill>
+              </a14:hiddenFill>
+            </a:ext>
+          </a:extLst>
+        </p:spPr>
+      </p:pic>
+      <p:pic>
+        <p:nvPicPr>
+          <p:cNvPr id="1028" name="Picture 4" descr="image"/>
+          <p:cNvPicPr>
+            <a:picLocks noGrp="1" noChangeAspect="1" noChangeArrowheads="1"/>
+          </p:cNvPicPr>
+          <p:nvPr>
+            <p:ph sz="half" idx="2"/>
+          </p:nvPr>
+        </p:nvPicPr>
+        <p:blipFill>
+          <a:blip r:embed="rId4">
+            <a:extLst>
+              <a:ext uri="{28A0092B-C50C-407E-A947-70E740481C1C}">
+                <a14:useLocalDpi xmlns:a14="http://schemas.microsoft.com/office/drawing/2010/main" val="0"/>
+              </a:ext>
+            </a:extLst>
+          </a:blip>
+          <a:srcRect/>
+          <a:stretch>
+            <a:fillRect/>
+          </a:stretch>
+        </p:blipFill>
+        <p:spPr bwMode="auto">
+          <a:xfrm>
+            <a:off x="6239224" y="1825625"/>
+            <a:ext cx="5047551" cy="4351338"/>
+          </a:xfrm>
+          <a:prstGeom prst="rect">
+            <a:avLst/>
+          </a:prstGeom>
+          <a:noFill/>
+          <a:extLst>
+            <a:ext uri="{909E8E84-426E-40DD-AFC4-6F175D3DCCD1}">
+              <a14:hiddenFill xmlns:a14="http://schemas.microsoft.com/office/drawing/2010/main">
+                <a:solidFill>
+                  <a:srgbClr val="FFFFFF"/>
+                </a:solidFill>
+              </a14:hiddenFill>
+            </a:ext>
+          </a:extLst>
+        </p:spPr>
+      </p:pic>
+    </p:spTree>
+    <p:extLst>
+      <p:ext uri="{BB962C8B-B14F-4D97-AF65-F5344CB8AC3E}">
+        <p14:creationId xmlns:p14="http://schemas.microsoft.com/office/powerpoint/2010/main" val="485067448"/>
+      </p:ext>
+    </p:extLst>
+  </p:cSld>
+  <p:clrMapOvr>
+    <a:masterClrMapping/>
+  </p:clrMapOvr>
 </p:sld>
 </file>
 

</xml_diff>

<commit_message>
Add code snippets to View Components Anatomy slide
</commit_message>
<xml_diff>
--- a/Building Reusable UI Components in ASP.NET Core MVC.pptx
+++ b/Building Reusable UI Components in ASP.NET Core MVC.pptx
@@ -251,7 +251,7 @@
           <a:p>
             <a:fld id="{3B87D1B5-D667-42F5-9E38-2FD202ABDFA0}" type="datetimeFigureOut">
               <a:rPr lang="en-US" smtClean="0"/>
-              <a:t>4/17/2017</a:t>
+              <a:t>4/19/2017</a:t>
             </a:fld>
             <a:endParaRPr lang="en-US"/>
           </a:p>
@@ -2507,7 +2507,7 @@
           <a:p>
             <a:fld id="{EEC3160E-2579-4584-9765-DC1BA0B358F9}" type="datetimeFigureOut">
               <a:rPr lang="en-US" smtClean="0"/>
-              <a:t>4/17/2017</a:t>
+              <a:t>4/19/2017</a:t>
             </a:fld>
             <a:endParaRPr lang="en-US"/>
           </a:p>
@@ -2677,7 +2677,7 @@
           <a:p>
             <a:fld id="{EEC3160E-2579-4584-9765-DC1BA0B358F9}" type="datetimeFigureOut">
               <a:rPr lang="en-US" smtClean="0"/>
-              <a:t>4/17/2017</a:t>
+              <a:t>4/19/2017</a:t>
             </a:fld>
             <a:endParaRPr lang="en-US"/>
           </a:p>
@@ -2857,7 +2857,7 @@
           <a:p>
             <a:fld id="{EEC3160E-2579-4584-9765-DC1BA0B358F9}" type="datetimeFigureOut">
               <a:rPr lang="en-US" smtClean="0"/>
-              <a:t>4/17/2017</a:t>
+              <a:t>4/19/2017</a:t>
             </a:fld>
             <a:endParaRPr lang="en-US"/>
           </a:p>
@@ -4772,7 +4772,7 @@
           <a:p>
             <a:fld id="{EEC3160E-2579-4584-9765-DC1BA0B358F9}" type="datetimeFigureOut">
               <a:rPr lang="en-US" smtClean="0"/>
-              <a:t>4/17/2017</a:t>
+              <a:t>4/19/2017</a:t>
             </a:fld>
             <a:endParaRPr lang="en-US"/>
           </a:p>
@@ -6254,7 +6254,7 @@
           <a:p>
             <a:fld id="{EEC3160E-2579-4584-9765-DC1BA0B358F9}" type="datetimeFigureOut">
               <a:rPr lang="en-US" smtClean="0"/>
-              <a:t>4/17/2017</a:t>
+              <a:t>4/19/2017</a:t>
             </a:fld>
             <a:endParaRPr lang="en-US"/>
           </a:p>
@@ -7394,7 +7394,7 @@
           <a:p>
             <a:fld id="{EEC3160E-2579-4584-9765-DC1BA0B358F9}" type="datetimeFigureOut">
               <a:rPr lang="en-US" smtClean="0"/>
-              <a:t>4/17/2017</a:t>
+              <a:t>4/19/2017</a:t>
             </a:fld>
             <a:endParaRPr lang="en-US"/>
           </a:p>
@@ -7761,7 +7761,7 @@
           <a:p>
             <a:fld id="{EEC3160E-2579-4584-9765-DC1BA0B358F9}" type="datetimeFigureOut">
               <a:rPr lang="en-US" smtClean="0"/>
-              <a:t>4/17/2017</a:t>
+              <a:t>4/19/2017</a:t>
             </a:fld>
             <a:endParaRPr lang="en-US"/>
           </a:p>
@@ -7879,7 +7879,7 @@
           <a:p>
             <a:fld id="{EEC3160E-2579-4584-9765-DC1BA0B358F9}" type="datetimeFigureOut">
               <a:rPr lang="en-US" smtClean="0"/>
-              <a:t>4/17/2017</a:t>
+              <a:t>4/19/2017</a:t>
             </a:fld>
             <a:endParaRPr lang="en-US"/>
           </a:p>
@@ -7974,7 +7974,7 @@
           <a:p>
             <a:fld id="{EEC3160E-2579-4584-9765-DC1BA0B358F9}" type="datetimeFigureOut">
               <a:rPr lang="en-US" smtClean="0"/>
-              <a:t>4/17/2017</a:t>
+              <a:t>4/19/2017</a:t>
             </a:fld>
             <a:endParaRPr lang="en-US"/>
           </a:p>
@@ -8251,7 +8251,7 @@
           <a:p>
             <a:fld id="{EEC3160E-2579-4584-9765-DC1BA0B358F9}" type="datetimeFigureOut">
               <a:rPr lang="en-US" smtClean="0"/>
-              <a:t>4/17/2017</a:t>
+              <a:t>4/19/2017</a:t>
             </a:fld>
             <a:endParaRPr lang="en-US"/>
           </a:p>
@@ -8508,7 +8508,7 @@
           <a:p>
             <a:fld id="{EEC3160E-2579-4584-9765-DC1BA0B358F9}" type="datetimeFigureOut">
               <a:rPr lang="en-US" smtClean="0"/>
-              <a:t>4/17/2017</a:t>
+              <a:t>4/19/2017</a:t>
             </a:fld>
             <a:endParaRPr lang="en-US"/>
           </a:p>
@@ -8721,7 +8721,7 @@
           <a:p>
             <a:fld id="{EEC3160E-2579-4584-9765-DC1BA0B358F9}" type="datetimeFigureOut">
               <a:rPr lang="en-US" smtClean="0"/>
-              <a:t>4/17/2017</a:t>
+              <a:t>4/19/2017</a:t>
             </a:fld>
             <a:endParaRPr lang="en-US"/>
           </a:p>
@@ -12209,6 +12209,649 @@
           </a:p>
         </p:txBody>
       </p:sp>
+      <p:graphicFrame>
+        <p:nvGraphicFramePr>
+          <p:cNvPr id="4" name="Table 3"/>
+          <p:cNvGraphicFramePr>
+            <a:graphicFrameLocks noGrp="1"/>
+          </p:cNvGraphicFramePr>
+          <p:nvPr>
+            <p:extLst>
+              <p:ext uri="{D42A27DB-BD31-4B8C-83A1-F6EECF244321}">
+                <p14:modId xmlns:p14="http://schemas.microsoft.com/office/powerpoint/2010/main" val="2449290002"/>
+              </p:ext>
+            </p:extLst>
+          </p:nvPr>
+        </p:nvGraphicFramePr>
+        <p:xfrm>
+          <a:off x="902827" y="3288711"/>
+          <a:ext cx="10964918" cy="3196395"/>
+        </p:xfrm>
+        <a:graphic>
+          <a:graphicData uri="http://schemas.openxmlformats.org/drawingml/2006/table">
+            <a:tbl>
+              <a:tblPr firstRow="1" bandRow="1">
+                <a:tableStyleId>{5C22544A-7EE6-4342-B048-85BDC9FD1C3A}</a:tableStyleId>
+              </a:tblPr>
+              <a:tblGrid>
+                <a:gridCol w="10964918">
+                  <a:extLst>
+                    <a:ext uri="{9D8B030D-6E8A-4147-A177-3AD203B41FA5}">
+                      <a16:colId xmlns:a16="http://schemas.microsoft.com/office/drawing/2014/main" val="1057070397"/>
+                    </a:ext>
+                  </a:extLst>
+                </a:gridCol>
+              </a:tblGrid>
+              <a:tr h="3196395">
+                <a:tc>
+                  <a:txBody>
+                    <a:bodyPr/>
+                    <a:lstStyle/>
+                    <a:p>
+                      <a:r>
+                        <a:rPr lang="en-US" sz="2000" dirty="0">
+                          <a:solidFill>
+                            <a:srgbClr val="0000FF"/>
+                          </a:solidFill>
+                          <a:latin typeface="Consolas" panose="020B0609020204030204" pitchFamily="49" charset="0"/>
+                        </a:rPr>
+                        <a:t>public</a:t>
+                      </a:r>
+                      <a:r>
+                        <a:rPr lang="en-US" sz="2000" dirty="0">
+                          <a:solidFill>
+                            <a:srgbClr val="000000"/>
+                          </a:solidFill>
+                          <a:latin typeface="Consolas" panose="020B0609020204030204" pitchFamily="49" charset="0"/>
+                        </a:rPr>
+                        <a:t> </a:t>
+                      </a:r>
+                      <a:r>
+                        <a:rPr lang="en-US" sz="2000" dirty="0">
+                          <a:solidFill>
+                            <a:srgbClr val="0000FF"/>
+                          </a:solidFill>
+                          <a:latin typeface="Consolas" panose="020B0609020204030204" pitchFamily="49" charset="0"/>
+                        </a:rPr>
+                        <a:t>class</a:t>
+                      </a:r>
+                      <a:r>
+                        <a:rPr lang="en-US" sz="2000" dirty="0">
+                          <a:solidFill>
+                            <a:srgbClr val="000000"/>
+                          </a:solidFill>
+                          <a:latin typeface="Consolas" panose="020B0609020204030204" pitchFamily="49" charset="0"/>
+                        </a:rPr>
+                        <a:t> </a:t>
+                      </a:r>
+                      <a:r>
+                        <a:rPr lang="en-US" sz="2000" dirty="0" err="1">
+                          <a:solidFill>
+                            <a:srgbClr val="2B91AF"/>
+                          </a:solidFill>
+                          <a:latin typeface="Consolas" panose="020B0609020204030204" pitchFamily="49" charset="0"/>
+                        </a:rPr>
+                        <a:t>CurrentWeather</a:t>
+                      </a:r>
+                      <a:r>
+                        <a:rPr lang="en-US" sz="2000" dirty="0">
+                          <a:solidFill>
+                            <a:srgbClr val="000000"/>
+                          </a:solidFill>
+                          <a:latin typeface="Consolas" panose="020B0609020204030204" pitchFamily="49" charset="0"/>
+                        </a:rPr>
+                        <a:t> : </a:t>
+                      </a:r>
+                      <a:r>
+                        <a:rPr lang="en-US" sz="2000" dirty="0" err="1">
+                          <a:solidFill>
+                            <a:srgbClr val="2B91AF"/>
+                          </a:solidFill>
+                          <a:latin typeface="Consolas" panose="020B0609020204030204" pitchFamily="49" charset="0"/>
+                        </a:rPr>
+                        <a:t>ViewComponent</a:t>
+                      </a:r>
+                      <a:r>
+                        <a:rPr lang="en-US" sz="2000" dirty="0">
+                          <a:solidFill>
+                            <a:srgbClr val="000000"/>
+                          </a:solidFill>
+                          <a:latin typeface="Consolas" panose="020B0609020204030204" pitchFamily="49" charset="0"/>
+                        </a:rPr>
+                        <a:t> {</a:t>
+                      </a:r>
+                    </a:p>
+                    <a:p>
+                      <a:r>
+                        <a:rPr lang="en-US" sz="2000" dirty="0">
+                          <a:solidFill>
+                            <a:srgbClr val="0000FF"/>
+                          </a:solidFill>
+                          <a:latin typeface="Consolas" panose="020B0609020204030204" pitchFamily="49" charset="0"/>
+                        </a:rPr>
+                        <a:t>    public</a:t>
+                      </a:r>
+                      <a:r>
+                        <a:rPr lang="en-US" sz="2000" dirty="0">
+                          <a:solidFill>
+                            <a:srgbClr val="000000"/>
+                          </a:solidFill>
+                          <a:latin typeface="Consolas" panose="020B0609020204030204" pitchFamily="49" charset="0"/>
+                        </a:rPr>
+                        <a:t> </a:t>
+                      </a:r>
+                      <a:r>
+                        <a:rPr lang="en-US" sz="2000" dirty="0" err="1">
+                          <a:solidFill>
+                            <a:srgbClr val="0000FF"/>
+                          </a:solidFill>
+                          <a:latin typeface="Consolas" panose="020B0609020204030204" pitchFamily="49" charset="0"/>
+                        </a:rPr>
+                        <a:t>async</a:t>
+                      </a:r>
+                      <a:r>
+                        <a:rPr lang="en-US" sz="2000" dirty="0">
+                          <a:solidFill>
+                            <a:srgbClr val="000000"/>
+                          </a:solidFill>
+                          <a:latin typeface="Consolas" panose="020B0609020204030204" pitchFamily="49" charset="0"/>
+                        </a:rPr>
+                        <a:t> </a:t>
+                      </a:r>
+                      <a:r>
+                        <a:rPr lang="en-US" sz="2000" dirty="0">
+                          <a:solidFill>
+                            <a:srgbClr val="2B91AF"/>
+                          </a:solidFill>
+                          <a:latin typeface="Consolas" panose="020B0609020204030204" pitchFamily="49" charset="0"/>
+                        </a:rPr>
+                        <a:t>Task</a:t>
+                      </a:r>
+                      <a:r>
+                        <a:rPr lang="en-US" sz="2000" dirty="0">
+                          <a:solidFill>
+                            <a:srgbClr val="000000"/>
+                          </a:solidFill>
+                          <a:latin typeface="Consolas" panose="020B0609020204030204" pitchFamily="49" charset="0"/>
+                        </a:rPr>
+                        <a:t>&lt;</a:t>
+                      </a:r>
+                      <a:r>
+                        <a:rPr lang="en-US" sz="2000" dirty="0" err="1">
+                          <a:solidFill>
+                            <a:srgbClr val="2B91AF"/>
+                          </a:solidFill>
+                          <a:latin typeface="Consolas" panose="020B0609020204030204" pitchFamily="49" charset="0"/>
+                        </a:rPr>
+                        <a:t>IViewComponentResult</a:t>
+                      </a:r>
+                      <a:r>
+                        <a:rPr lang="en-US" sz="2000" dirty="0">
+                          <a:solidFill>
+                            <a:srgbClr val="000000"/>
+                          </a:solidFill>
+                          <a:latin typeface="Consolas" panose="020B0609020204030204" pitchFamily="49" charset="0"/>
+                        </a:rPr>
+                        <a:t>&gt; </a:t>
+                      </a:r>
+                      <a:r>
+                        <a:rPr lang="en-US" sz="2000" dirty="0" err="1">
+                          <a:solidFill>
+                            <a:srgbClr val="000000"/>
+                          </a:solidFill>
+                          <a:latin typeface="Consolas" panose="020B0609020204030204" pitchFamily="49" charset="0"/>
+                        </a:rPr>
+                        <a:t>InvokeAsync</a:t>
+                      </a:r>
+                      <a:r>
+                        <a:rPr lang="en-US" sz="2000" dirty="0">
+                          <a:solidFill>
+                            <a:srgbClr val="000000"/>
+                          </a:solidFill>
+                          <a:latin typeface="Consolas" panose="020B0609020204030204" pitchFamily="49" charset="0"/>
+                        </a:rPr>
+                        <a:t>(</a:t>
+                      </a:r>
+                      <a:r>
+                        <a:rPr lang="en-US" sz="2000" dirty="0">
+                          <a:solidFill>
+                            <a:srgbClr val="0000FF"/>
+                          </a:solidFill>
+                          <a:latin typeface="Consolas" panose="020B0609020204030204" pitchFamily="49" charset="0"/>
+                        </a:rPr>
+                        <a:t>string</a:t>
+                      </a:r>
+                      <a:r>
+                        <a:rPr lang="en-US" sz="2000" dirty="0">
+                          <a:solidFill>
+                            <a:srgbClr val="000000"/>
+                          </a:solidFill>
+                          <a:latin typeface="Consolas" panose="020B0609020204030204" pitchFamily="49" charset="0"/>
+                        </a:rPr>
+                        <a:t> city, </a:t>
+                      </a:r>
+                    </a:p>
+                    <a:p>
+                      <a:r>
+                        <a:rPr lang="en-US" sz="2000" dirty="0">
+                          <a:solidFill>
+                            <a:srgbClr val="000000"/>
+                          </a:solidFill>
+                          <a:latin typeface="Consolas" panose="020B0609020204030204" pitchFamily="49" charset="0"/>
+                        </a:rPr>
+                        <a:t>                                                        </a:t>
+                      </a:r>
+                      <a:r>
+                        <a:rPr lang="en-US" sz="2000" dirty="0">
+                          <a:solidFill>
+                            <a:srgbClr val="0000FF"/>
+                          </a:solidFill>
+                          <a:latin typeface="Consolas" panose="020B0609020204030204" pitchFamily="49" charset="0"/>
+                        </a:rPr>
+                        <a:t>string</a:t>
+                      </a:r>
+                      <a:r>
+                        <a:rPr lang="en-US" sz="2000" dirty="0">
+                          <a:solidFill>
+                            <a:srgbClr val="000000"/>
+                          </a:solidFill>
+                          <a:latin typeface="Consolas" panose="020B0609020204030204" pitchFamily="49" charset="0"/>
+                        </a:rPr>
+                        <a:t> </a:t>
+                      </a:r>
+                      <a:r>
+                        <a:rPr lang="en-US" sz="2000" dirty="0" err="1">
+                          <a:solidFill>
+                            <a:srgbClr val="000000"/>
+                          </a:solidFill>
+                          <a:latin typeface="Consolas" panose="020B0609020204030204" pitchFamily="49" charset="0"/>
+                        </a:rPr>
+                        <a:t>stateAbbrev</a:t>
+                      </a:r>
+                      <a:r>
+                        <a:rPr lang="en-US" sz="2000" dirty="0">
+                          <a:solidFill>
+                            <a:srgbClr val="000000"/>
+                          </a:solidFill>
+                          <a:latin typeface="Consolas" panose="020B0609020204030204" pitchFamily="49" charset="0"/>
+                        </a:rPr>
+                        <a:t>) {</a:t>
+                      </a:r>
+                    </a:p>
+                    <a:p>
+                      <a:r>
+                        <a:rPr lang="en-US" sz="2000" dirty="0">
+                          <a:solidFill>
+                            <a:srgbClr val="000000"/>
+                          </a:solidFill>
+                          <a:latin typeface="Consolas" panose="020B0609020204030204" pitchFamily="49" charset="0"/>
+                        </a:rPr>
+                        <a:t>        </a:t>
+                      </a:r>
+                      <a:r>
+                        <a:rPr lang="en-US" sz="2000" dirty="0" err="1">
+                          <a:solidFill>
+                            <a:srgbClr val="2B91AF"/>
+                          </a:solidFill>
+                          <a:latin typeface="Consolas" panose="020B0609020204030204" pitchFamily="49" charset="0"/>
+                        </a:rPr>
+                        <a:t>OpenWeatherMapResponse</a:t>
+                      </a:r>
+                      <a:r>
+                        <a:rPr lang="en-US" sz="2000" dirty="0">
+                          <a:solidFill>
+                            <a:srgbClr val="000000"/>
+                          </a:solidFill>
+                          <a:latin typeface="Consolas" panose="020B0609020204030204" pitchFamily="49" charset="0"/>
+                        </a:rPr>
+                        <a:t> </a:t>
+                      </a:r>
+                      <a:r>
+                        <a:rPr lang="en-US" sz="2000" dirty="0" err="1">
+                          <a:solidFill>
+                            <a:srgbClr val="000000"/>
+                          </a:solidFill>
+                          <a:latin typeface="Consolas" panose="020B0609020204030204" pitchFamily="49" charset="0"/>
+                        </a:rPr>
+                        <a:t>currentWeather</a:t>
+                      </a:r>
+                      <a:r>
+                        <a:rPr lang="en-US" sz="2000" dirty="0">
+                          <a:solidFill>
+                            <a:srgbClr val="000000"/>
+                          </a:solidFill>
+                          <a:latin typeface="Consolas" panose="020B0609020204030204" pitchFamily="49" charset="0"/>
+                        </a:rPr>
+                        <a:t> = </a:t>
+                      </a:r>
+                      <a:r>
+                        <a:rPr lang="en-US" sz="2000" dirty="0">
+                          <a:solidFill>
+                            <a:srgbClr val="0000FF"/>
+                          </a:solidFill>
+                          <a:latin typeface="Consolas" panose="020B0609020204030204" pitchFamily="49" charset="0"/>
+                        </a:rPr>
+                        <a:t>await</a:t>
+                      </a:r>
+                      <a:r>
+                        <a:rPr lang="en-US" sz="2000" dirty="0">
+                          <a:solidFill>
+                            <a:srgbClr val="000000"/>
+                          </a:solidFill>
+                          <a:latin typeface="Consolas" panose="020B0609020204030204" pitchFamily="49" charset="0"/>
+                        </a:rPr>
+                        <a:t> </a:t>
+                      </a:r>
+                    </a:p>
+                    <a:p>
+                      <a:r>
+                        <a:rPr lang="en-US" sz="2000" dirty="0">
+                          <a:solidFill>
+                            <a:srgbClr val="000000"/>
+                          </a:solidFill>
+                          <a:latin typeface="Consolas" panose="020B0609020204030204" pitchFamily="49" charset="0"/>
+                        </a:rPr>
+                        <a:t>            _</a:t>
+                      </a:r>
+                      <a:r>
+                        <a:rPr lang="en-US" sz="2000" dirty="0" err="1">
+                          <a:solidFill>
+                            <a:srgbClr val="000000"/>
+                          </a:solidFill>
+                          <a:latin typeface="Consolas" panose="020B0609020204030204" pitchFamily="49" charset="0"/>
+                        </a:rPr>
+                        <a:t>svc.GetCurrentWeatherAsync</a:t>
+                      </a:r>
+                      <a:r>
+                        <a:rPr lang="en-US" sz="2000" dirty="0">
+                          <a:solidFill>
+                            <a:srgbClr val="000000"/>
+                          </a:solidFill>
+                          <a:latin typeface="Consolas" panose="020B0609020204030204" pitchFamily="49" charset="0"/>
+                        </a:rPr>
+                        <a:t>(city, </a:t>
+                      </a:r>
+                      <a:r>
+                        <a:rPr lang="en-US" sz="2000" dirty="0" err="1">
+                          <a:solidFill>
+                            <a:srgbClr val="000000"/>
+                          </a:solidFill>
+                          <a:latin typeface="Consolas" panose="020B0609020204030204" pitchFamily="49" charset="0"/>
+                        </a:rPr>
+                        <a:t>stateAbbrev</a:t>
+                      </a:r>
+                      <a:r>
+                        <a:rPr lang="en-US" sz="2000" dirty="0">
+                          <a:solidFill>
+                            <a:srgbClr val="000000"/>
+                          </a:solidFill>
+                          <a:latin typeface="Consolas" panose="020B0609020204030204" pitchFamily="49" charset="0"/>
+                        </a:rPr>
+                        <a:t>);</a:t>
+                      </a:r>
+                    </a:p>
+                    <a:p>
+                      <a:r>
+                        <a:rPr lang="en-US" sz="2000" dirty="0">
+                          <a:solidFill>
+                            <a:srgbClr val="000000"/>
+                          </a:solidFill>
+                          <a:latin typeface="Consolas" panose="020B0609020204030204" pitchFamily="49" charset="0"/>
+                        </a:rPr>
+                        <a:t>        </a:t>
+                      </a:r>
+                      <a:r>
+                        <a:rPr lang="en-US" sz="2000" dirty="0" err="1">
+                          <a:solidFill>
+                            <a:srgbClr val="000000"/>
+                          </a:solidFill>
+                          <a:latin typeface="Consolas" panose="020B0609020204030204" pitchFamily="49" charset="0"/>
+                        </a:rPr>
+                        <a:t>VM.</a:t>
+                      </a:r>
+                      <a:r>
+                        <a:rPr lang="en-US" sz="2000" dirty="0" err="1">
+                          <a:solidFill>
+                            <a:srgbClr val="2B91AF"/>
+                          </a:solidFill>
+                          <a:latin typeface="Consolas" panose="020B0609020204030204" pitchFamily="49" charset="0"/>
+                        </a:rPr>
+                        <a:t>Weather</a:t>
+                      </a:r>
+                      <a:r>
+                        <a:rPr lang="en-US" sz="2000" dirty="0">
+                          <a:solidFill>
+                            <a:srgbClr val="000000"/>
+                          </a:solidFill>
+                          <a:latin typeface="Consolas" panose="020B0609020204030204" pitchFamily="49" charset="0"/>
+                        </a:rPr>
+                        <a:t> weather = </a:t>
+                      </a:r>
+                      <a:r>
+                        <a:rPr lang="en-US" sz="2000" dirty="0" err="1">
+                          <a:solidFill>
+                            <a:srgbClr val="000000"/>
+                          </a:solidFill>
+                          <a:latin typeface="Consolas" panose="020B0609020204030204" pitchFamily="49" charset="0"/>
+                        </a:rPr>
+                        <a:t>currentWeather.MapToWeather</a:t>
+                      </a:r>
+                      <a:r>
+                        <a:rPr lang="en-US" sz="2000" dirty="0">
+                          <a:solidFill>
+                            <a:srgbClr val="000000"/>
+                          </a:solidFill>
+                          <a:latin typeface="Consolas" panose="020B0609020204030204" pitchFamily="49" charset="0"/>
+                        </a:rPr>
+                        <a:t>();</a:t>
+                      </a:r>
+                    </a:p>
+                    <a:p>
+                      <a:endParaRPr lang="en-US" sz="2000" dirty="0">
+                        <a:solidFill>
+                          <a:srgbClr val="000000"/>
+                        </a:solidFill>
+                        <a:latin typeface="Consolas" panose="020B0609020204030204" pitchFamily="49" charset="0"/>
+                      </a:endParaRPr>
+                    </a:p>
+                    <a:p>
+                      <a:r>
+                        <a:rPr lang="en-US" sz="2000" dirty="0">
+                          <a:solidFill>
+                            <a:srgbClr val="0000FF"/>
+                          </a:solidFill>
+                          <a:latin typeface="Consolas" panose="020B0609020204030204" pitchFamily="49" charset="0"/>
+                        </a:rPr>
+                        <a:t>        return</a:t>
+                      </a:r>
+                      <a:r>
+                        <a:rPr lang="en-US" sz="2000" dirty="0">
+                          <a:solidFill>
+                            <a:srgbClr val="000000"/>
+                          </a:solidFill>
+                          <a:latin typeface="Consolas" panose="020B0609020204030204" pitchFamily="49" charset="0"/>
+                        </a:rPr>
+                        <a:t> View(weather);</a:t>
+                      </a:r>
+                    </a:p>
+                    <a:p>
+                      <a:r>
+                        <a:rPr lang="en-US" sz="2000" dirty="0">
+                          <a:solidFill>
+                            <a:srgbClr val="000000"/>
+                          </a:solidFill>
+                          <a:latin typeface="Consolas" panose="020B0609020204030204" pitchFamily="49" charset="0"/>
+                        </a:rPr>
+                        <a:t>    }</a:t>
+                      </a:r>
+                    </a:p>
+                    <a:p>
+                      <a:r>
+                        <a:rPr lang="en-US" sz="2000" dirty="0">
+                          <a:solidFill>
+                            <a:srgbClr val="000000"/>
+                          </a:solidFill>
+                          <a:latin typeface="Consolas" panose="020B0609020204030204" pitchFamily="49" charset="0"/>
+                        </a:rPr>
+                        <a:t>}</a:t>
+                      </a:r>
+                      <a:endParaRPr lang="en-US" sz="2000" b="0" dirty="0">
+                        <a:solidFill>
+                          <a:schemeClr val="bg1"/>
+                        </a:solidFill>
+                      </a:endParaRPr>
+                    </a:p>
+                  </a:txBody>
+                  <a:tcPr>
+                    <a:lnL w="12700" cap="flat" cmpd="sng" algn="ctr">
+                      <a:solidFill>
+                        <a:schemeClr val="tx1"/>
+                      </a:solidFill>
+                      <a:prstDash val="solid"/>
+                      <a:round/>
+                      <a:headEnd type="none" w="med" len="med"/>
+                      <a:tailEnd type="none" w="med" len="med"/>
+                    </a:lnL>
+                    <a:lnR w="12700" cap="flat" cmpd="sng" algn="ctr">
+                      <a:solidFill>
+                        <a:schemeClr val="tx1"/>
+                      </a:solidFill>
+                      <a:prstDash val="solid"/>
+                      <a:round/>
+                      <a:headEnd type="none" w="med" len="med"/>
+                      <a:tailEnd type="none" w="med" len="med"/>
+                    </a:lnR>
+                    <a:lnT w="12700" cap="flat" cmpd="sng" algn="ctr">
+                      <a:solidFill>
+                        <a:schemeClr val="tx1"/>
+                      </a:solidFill>
+                      <a:prstDash val="solid"/>
+                      <a:round/>
+                      <a:headEnd type="none" w="med" len="med"/>
+                      <a:tailEnd type="none" w="med" len="med"/>
+                    </a:lnT>
+                    <a:lnB w="12700" cap="flat" cmpd="sng" algn="ctr">
+                      <a:solidFill>
+                        <a:schemeClr val="tx1"/>
+                      </a:solidFill>
+                      <a:prstDash val="solid"/>
+                      <a:round/>
+                      <a:headEnd type="none" w="med" len="med"/>
+                      <a:tailEnd type="none" w="med" len="med"/>
+                    </a:lnB>
+                    <a:solidFill>
+                      <a:schemeClr val="tx1"/>
+                    </a:solidFill>
+                  </a:tcPr>
+                </a:tc>
+                <a:extLst>
+                  <a:ext uri="{0D108BD9-81ED-4DB2-BD59-A6C34878D82A}">
+                    <a16:rowId xmlns:a16="http://schemas.microsoft.com/office/drawing/2014/main" val="3473222697"/>
+                  </a:ext>
+                </a:extLst>
+              </a:tr>
+            </a:tbl>
+          </a:graphicData>
+        </a:graphic>
+      </p:graphicFrame>
+      <p:sp>
+        <p:nvSpPr>
+          <p:cNvPr id="5" name="Rectangle 4"/>
+          <p:cNvSpPr/>
+          <p:nvPr/>
+        </p:nvSpPr>
+        <p:spPr>
+          <a:xfrm>
+            <a:off x="896566" y="2842143"/>
+            <a:ext cx="2101236" cy="446567"/>
+          </a:xfrm>
+          <a:prstGeom prst="rect">
+            <a:avLst/>
+          </a:prstGeom>
+        </p:spPr>
+        <p:style>
+          <a:lnRef idx="1">
+            <a:schemeClr val="accent1"/>
+          </a:lnRef>
+          <a:fillRef idx="2">
+            <a:schemeClr val="accent1"/>
+          </a:fillRef>
+          <a:effectRef idx="1">
+            <a:schemeClr val="accent1"/>
+          </a:effectRef>
+          <a:fontRef idx="minor">
+            <a:schemeClr val="dk1"/>
+          </a:fontRef>
+        </p:style>
+        <p:txBody>
+          <a:bodyPr rtlCol="0" anchor="ctr"/>
+          <a:lstStyle/>
+          <a:p>
+            <a:pPr algn="ctr"/>
+            <a:r>
+              <a:rPr lang="en-US" b="1" dirty="0" err="1"/>
+              <a:t>CurrentWeather.cs</a:t>
+            </a:r>
+            <a:endParaRPr lang="en-US" b="1" dirty="0"/>
+          </a:p>
+        </p:txBody>
+      </p:sp>
+      <p:pic>
+        <p:nvPicPr>
+          <p:cNvPr id="10" name="Picture 9"/>
+          <p:cNvPicPr>
+            <a:picLocks noChangeAspect="1"/>
+          </p:cNvPicPr>
+          <p:nvPr/>
+        </p:nvPicPr>
+        <p:blipFill>
+          <a:blip r:embed="rId3"/>
+          <a:stretch>
+            <a:fillRect/>
+          </a:stretch>
+        </p:blipFill>
+        <p:spPr>
+          <a:xfrm>
+            <a:off x="3411860" y="2454166"/>
+            <a:ext cx="8455885" cy="4310246"/>
+          </a:xfrm>
+          <a:prstGeom prst="rect">
+            <a:avLst/>
+          </a:prstGeom>
+          <a:solidFill>
+            <a:srgbClr val="FFFFFF">
+              <a:shade val="85000"/>
+            </a:srgbClr>
+          </a:solidFill>
+          <a:ln w="190500" cap="sq">
+            <a:solidFill>
+              <a:srgbClr val="FFFFFF"/>
+            </a:solidFill>
+            <a:miter lim="800000"/>
+          </a:ln>
+          <a:effectLst>
+            <a:outerShdw blurRad="65000" dist="50800" dir="12900000" kx="195000" ky="145000" algn="tl" rotWithShape="0">
+              <a:srgbClr val="000000">
+                <a:alpha val="30000"/>
+              </a:srgbClr>
+            </a:outerShdw>
+          </a:effectLst>
+          <a:scene3d>
+            <a:camera prst="orthographicFront">
+              <a:rot lat="0" lon="0" rev="360000"/>
+            </a:camera>
+            <a:lightRig rig="twoPt" dir="t">
+              <a:rot lat="0" lon="0" rev="7200000"/>
+            </a:lightRig>
+          </a:scene3d>
+          <a:sp3d contourW="12700">
+            <a:bevelT w="25400" h="19050"/>
+            <a:contourClr>
+              <a:srgbClr val="969696"/>
+            </a:contourClr>
+          </a:sp3d>
+        </p:spPr>
+      </p:pic>
     </p:spTree>
     <p:extLst>
       <p:ext uri="{BB962C8B-B14F-4D97-AF65-F5344CB8AC3E}">
@@ -12282,6 +12925,76 @@
                                   </p:childTnLst>
                                 </p:cTn>
                               </p:par>
+                              <p:par>
+                                <p:cTn id="8" presetID="10" presetClass="entr" presetSubtype="0" fill="hold" grpId="0" nodeType="withEffect">
+                                  <p:stCondLst>
+                                    <p:cond delay="0"/>
+                                  </p:stCondLst>
+                                  <p:childTnLst>
+                                    <p:set>
+                                      <p:cBhvr>
+                                        <p:cTn id="9" dur="1" fill="hold">
+                                          <p:stCondLst>
+                                            <p:cond delay="0"/>
+                                          </p:stCondLst>
+                                        </p:cTn>
+                                        <p:tgtEl>
+                                          <p:spTgt spid="5"/>
+                                        </p:tgtEl>
+                                        <p:attrNameLst>
+                                          <p:attrName>style.visibility</p:attrName>
+                                        </p:attrNameLst>
+                                      </p:cBhvr>
+                                      <p:to>
+                                        <p:strVal val="visible"/>
+                                      </p:to>
+                                    </p:set>
+                                    <p:animEffect transition="in" filter="fade">
+                                      <p:cBhvr>
+                                        <p:cTn id="10" dur="500"/>
+                                        <p:tgtEl>
+                                          <p:spTgt spid="5"/>
+                                        </p:tgtEl>
+                                      </p:cBhvr>
+                                    </p:animEffect>
+                                  </p:childTnLst>
+                                </p:cTn>
+                              </p:par>
+                              <p:par>
+                                <p:cTn id="11" presetID="10" presetClass="entr" presetSubtype="0" fill="hold" nodeType="withEffect">
+                                  <p:stCondLst>
+                                    <p:cond delay="0"/>
+                                  </p:stCondLst>
+                                  <p:childTnLst>
+                                    <p:set>
+                                      <p:cBhvr>
+                                        <p:cTn id="12" dur="1" fill="hold">
+                                          <p:stCondLst>
+                                            <p:cond delay="0"/>
+                                          </p:stCondLst>
+                                        </p:cTn>
+                                        <p:tgtEl>
+                                          <p:spTgt spid="4"/>
+                                        </p:tgtEl>
+                                        <p:attrNameLst>
+                                          <p:attrName>style.visibility</p:attrName>
+                                        </p:attrNameLst>
+                                      </p:cBhvr>
+                                      <p:to>
+                                        <p:strVal val="visible"/>
+                                      </p:to>
+                                    </p:set>
+                                    <p:animEffect transition="in" filter="fade">
+                                      <p:cBhvr>
+                                        <p:cTn id="13" dur="500"/>
+                                        <p:tgtEl>
+                                          <p:spTgt spid="4"/>
+                                        </p:tgtEl>
+                                      </p:cBhvr>
+                                    </p:animEffect>
+                                  </p:childTnLst>
+                                </p:cTn>
+                              </p:par>
                             </p:childTnLst>
                           </p:cTn>
                         </p:par>
@@ -12289,26 +13002,26 @@
                     </p:cTn>
                   </p:par>
                   <p:par>
-                    <p:cTn id="8" fill="hold">
+                    <p:cTn id="14" fill="hold">
                       <p:stCondLst>
                         <p:cond delay="indefinite"/>
                       </p:stCondLst>
                       <p:childTnLst>
                         <p:par>
-                          <p:cTn id="9" fill="hold">
+                          <p:cTn id="15" fill="hold">
                             <p:stCondLst>
                               <p:cond delay="0"/>
                             </p:stCondLst>
                             <p:childTnLst>
                               <p:par>
-                                <p:cTn id="10" presetID="10" presetClass="entr" presetSubtype="0" fill="hold" nodeType="clickEffect">
+                                <p:cTn id="16" presetID="10" presetClass="entr" presetSubtype="0" fill="hold" nodeType="clickEffect">
                                   <p:stCondLst>
                                     <p:cond delay="0"/>
                                   </p:stCondLst>
                                   <p:childTnLst>
                                     <p:set>
                                       <p:cBhvr>
-                                        <p:cTn id="11" dur="1" fill="hold">
+                                        <p:cTn id="17" dur="1" fill="hold">
                                           <p:stCondLst>
                                             <p:cond delay="0"/>
                                           </p:stCondLst>
@@ -12330,13 +13043,66 @@
                                     </p:set>
                                     <p:animEffect transition="in" filter="fade">
                                       <p:cBhvr>
-                                        <p:cTn id="12" dur="500"/>
+                                        <p:cTn id="18" dur="500"/>
                                         <p:tgtEl>
                                           <p:spTgt spid="3">
                                             <p:txEl>
                                               <p:pRg st="1" end="1"/>
                                             </p:txEl>
                                           </p:spTgt>
+                                        </p:tgtEl>
+                                      </p:cBhvr>
+                                    </p:animEffect>
+                                  </p:childTnLst>
+                                </p:cTn>
+                              </p:par>
+                            </p:childTnLst>
+                          </p:cTn>
+                        </p:par>
+                      </p:childTnLst>
+                    </p:cTn>
+                  </p:par>
+                  <p:par>
+                    <p:cTn id="19" fill="hold">
+                      <p:stCondLst>
+                        <p:cond delay="indefinite"/>
+                      </p:stCondLst>
+                      <p:childTnLst>
+                        <p:par>
+                          <p:cTn id="20" fill="hold">
+                            <p:stCondLst>
+                              <p:cond delay="0"/>
+                            </p:stCondLst>
+                            <p:childTnLst>
+                              <p:par>
+                                <p:cTn id="21" presetID="10" presetClass="entr" presetSubtype="0" fill="hold" nodeType="clickEffect">
+                                  <p:stCondLst>
+                                    <p:cond delay="0"/>
+                                  </p:stCondLst>
+                                  <p:childTnLst>
+                                    <p:set>
+                                      <p:cBhvr>
+                                        <p:cTn id="22" dur="1" fill="hold">
+                                          <p:stCondLst>
+                                            <p:cond delay="0"/>
+                                          </p:stCondLst>
+                                        </p:cTn>
+                                        <p:tgtEl>
+                                          <p:spTgt spid="10"/>
+                                        </p:tgtEl>
+                                        <p:attrNameLst>
+                                          <p:attrName>style.visibility</p:attrName>
+                                        </p:attrNameLst>
+                                      </p:cBhvr>
+                                      <p:to>
+                                        <p:strVal val="visible"/>
+                                      </p:to>
+                                    </p:set>
+                                    <p:animEffect transition="in" filter="fade">
+                                      <p:cBhvr>
+                                        <p:cTn id="23" dur="500"/>
+                                        <p:tgtEl>
+                                          <p:spTgt spid="10"/>
                                         </p:tgtEl>
                                       </p:cBhvr>
                                     </p:animEffect>
@@ -12370,6 +13136,9 @@
         </p:cTn>
       </p:par>
     </p:tnLst>
+    <p:bldLst>
+      <p:bldP spid="5" grpId="0" animBg="1"/>
+    </p:bldLst>
   </p:timing>
 </p:sld>
 </file>
@@ -12590,10 +13359,10 @@
               <a:t>Default view = </a:t>
             </a:r>
             <a:r>
-              <a:rPr lang="en-US" i="1" dirty="0" err="1"/>
+              <a:rPr lang="en-US" b="1" i="1" dirty="0" err="1"/>
               <a:t>Default.cshtml</a:t>
             </a:r>
-            <a:endParaRPr lang="en-US" i="1" dirty="0"/>
+            <a:endParaRPr lang="en-US" b="1" i="1" dirty="0"/>
           </a:p>
         </p:txBody>
       </p:sp>
@@ -20472,7 +21241,14 @@
           <a:lstStyle/>
           <a:p>
             <a:pPr algn="ctr"/>
-            <a:endParaRPr lang="en-US"/>
+            <a:r>
+              <a:rPr lang="en-US" dirty="0">
+                <a:solidFill>
+                  <a:schemeClr val="tx1"/>
+                </a:solidFill>
+              </a:rPr>
+              <a:t>Rendered</a:t>
+            </a:r>
           </a:p>
         </p:txBody>
       </p:sp>

</xml_diff>

<commit_message>
Add slide for TDN supplementary article
</commit_message>
<xml_diff>
--- a/Building Reusable UI Components in ASP.NET Core MVC.pptx
+++ b/Building Reusable UI Components in ASP.NET Core MVC.pptx
@@ -6,7 +6,7 @@
     <p:sldMasterId id="2147483847" r:id="rId2"/>
   </p:sldMasterIdLst>
   <p:notesMasterIdLst>
-    <p:notesMasterId r:id="rId22"/>
+    <p:notesMasterId r:id="rId23"/>
   </p:notesMasterIdLst>
   <p:sldIdLst>
     <p:sldId id="323" r:id="rId3"/>
@@ -27,7 +27,8 @@
     <p:sldId id="319" r:id="rId18"/>
     <p:sldId id="336" r:id="rId19"/>
     <p:sldId id="335" r:id="rId20"/>
-    <p:sldId id="320" r:id="rId21"/>
+    <p:sldId id="341" r:id="rId21"/>
+    <p:sldId id="320" r:id="rId22"/>
   </p:sldIdLst>
   <p:sldSz cx="12192000" cy="6858000"/>
   <p:notesSz cx="6858000" cy="9144000"/>
@@ -154,6 +155,7 @@
             <p14:sldId id="319"/>
             <p14:sldId id="336"/>
             <p14:sldId id="335"/>
+            <p14:sldId id="341"/>
             <p14:sldId id="320"/>
           </p14:sldIdLst>
         </p14:section>
@@ -251,7 +253,7 @@
           <a:p>
             <a:fld id="{3B87D1B5-D667-42F5-9E38-2FD202ABDFA0}" type="datetimeFigureOut">
               <a:rPr lang="en-US" smtClean="0"/>
-              <a:t>7/3/2017</a:t>
+              <a:t>7/10/2017</a:t>
             </a:fld>
             <a:endParaRPr lang="en-US"/>
           </a:p>
@@ -1600,6 +1602,154 @@
     </p:spTree>
     <p:extLst>
       <p:ext uri="{BB962C8B-B14F-4D97-AF65-F5344CB8AC3E}">
+        <p14:creationId xmlns:p14="http://schemas.microsoft.com/office/powerpoint/2010/main" val="187632969"/>
+      </p:ext>
+    </p:extLst>
+  </p:cSld>
+  <p:clrMapOvr>
+    <a:masterClrMapping/>
+  </p:clrMapOvr>
+</p:notes>
+</file>
+
+<file path=ppt/notesSlides/notesSlide19.xml><?xml version="1.0" encoding="utf-8"?>
+<p:notes xmlns:a="http://schemas.openxmlformats.org/drawingml/2006/main" xmlns:r="http://schemas.openxmlformats.org/officeDocument/2006/relationships" xmlns:p="http://schemas.openxmlformats.org/presentationml/2006/main">
+  <p:cSld>
+    <p:spTree>
+      <p:nvGrpSpPr>
+        <p:cNvPr id="1" name=""/>
+        <p:cNvGrpSpPr/>
+        <p:nvPr/>
+      </p:nvGrpSpPr>
+      <p:grpSpPr>
+        <a:xfrm>
+          <a:off x="0" y="0"/>
+          <a:ext cx="0" cy="0"/>
+          <a:chOff x="0" y="0"/>
+          <a:chExt cx="0" cy="0"/>
+        </a:xfrm>
+      </p:grpSpPr>
+      <p:sp>
+        <p:nvSpPr>
+          <p:cNvPr id="2" name="Slide Image Placeholder 1"/>
+          <p:cNvSpPr>
+            <a:spLocks noGrp="1" noRot="1" noChangeAspect="1"/>
+          </p:cNvSpPr>
+          <p:nvPr>
+            <p:ph type="sldImg"/>
+          </p:nvPr>
+        </p:nvSpPr>
+        <p:spPr/>
+      </p:sp>
+      <p:sp>
+        <p:nvSpPr>
+          <p:cNvPr id="3" name="Notes Placeholder 2"/>
+          <p:cNvSpPr>
+            <a:spLocks noGrp="1"/>
+          </p:cNvSpPr>
+          <p:nvPr>
+            <p:ph type="body" idx="1"/>
+          </p:nvPr>
+        </p:nvSpPr>
+        <p:spPr/>
+        <p:txBody>
+          <a:bodyPr/>
+          <a:lstStyle/>
+          <a:p>
+            <a:pPr marL="0" indent="0">
+              <a:buFontTx/>
+              <a:buNone/>
+            </a:pPr>
+            <a:endParaRPr lang="en-US" dirty="0"/>
+          </a:p>
+        </p:txBody>
+      </p:sp>
+      <p:sp>
+        <p:nvSpPr>
+          <p:cNvPr id="4" name="Slide Number Placeholder 3"/>
+          <p:cNvSpPr>
+            <a:spLocks noGrp="1"/>
+          </p:cNvSpPr>
+          <p:nvPr>
+            <p:ph type="sldNum" sz="quarter" idx="10"/>
+          </p:nvPr>
+        </p:nvSpPr>
+        <p:spPr/>
+        <p:txBody>
+          <a:bodyPr/>
+          <a:lstStyle/>
+          <a:p>
+            <a:pPr marL="0" marR="0" lvl="0" indent="0" algn="r" defTabSz="457200" rtl="0" eaLnBrk="1" fontAlgn="auto" latinLnBrk="0" hangingPunct="1">
+              <a:lnSpc>
+                <a:spcPct val="100000"/>
+              </a:lnSpc>
+              <a:spcBef>
+                <a:spcPts val="0"/>
+              </a:spcBef>
+              <a:spcAft>
+                <a:spcPts val="0"/>
+              </a:spcAft>
+              <a:buClrTx/>
+              <a:buSzTx/>
+              <a:buFontTx/>
+              <a:buNone/>
+              <a:tabLst/>
+              <a:defRPr/>
+            </a:pPr>
+            <a:fld id="{16A87904-88DE-4022-A424-ACD2E6FC1751}" type="slidenum">
+              <a:rPr kumimoji="0" lang="en-US" sz="1200" b="0" i="0" u="none" strike="noStrike" kern="1200" cap="none" spc="0" normalizeH="0" baseline="0" noProof="0" smtClean="0">
+                <a:ln>
+                  <a:noFill/>
+                </a:ln>
+                <a:solidFill>
+                  <a:prstClr val="black"/>
+                </a:solidFill>
+                <a:effectLst/>
+                <a:uLnTx/>
+                <a:uFillTx/>
+                <a:latin typeface="Calibri" panose="020F0502020204030204"/>
+                <a:ea typeface="+mn-ea"/>
+                <a:cs typeface="+mn-cs"/>
+              </a:rPr>
+              <a:pPr marL="0" marR="0" lvl="0" indent="0" algn="r" defTabSz="457200" rtl="0" eaLnBrk="1" fontAlgn="auto" latinLnBrk="0" hangingPunct="1">
+                <a:lnSpc>
+                  <a:spcPct val="100000"/>
+                </a:lnSpc>
+                <a:spcBef>
+                  <a:spcPts val="0"/>
+                </a:spcBef>
+                <a:spcAft>
+                  <a:spcPts val="0"/>
+                </a:spcAft>
+                <a:buClrTx/>
+                <a:buSzTx/>
+                <a:buFontTx/>
+                <a:buNone/>
+                <a:tabLst/>
+                <a:defRPr/>
+              </a:pPr>
+              <a:t>20</a:t>
+            </a:fld>
+            <a:endParaRPr kumimoji="0" lang="en-US" sz="1200" b="0" i="0" u="none" strike="noStrike" kern="1200" cap="none" spc="0" normalizeH="0" baseline="0" noProof="0">
+              <a:ln>
+                <a:noFill/>
+              </a:ln>
+              <a:solidFill>
+                <a:prstClr val="black"/>
+              </a:solidFill>
+              <a:effectLst/>
+              <a:uLnTx/>
+              <a:uFillTx/>
+              <a:latin typeface="Calibri" panose="020F0502020204030204"/>
+              <a:ea typeface="+mn-ea"/>
+              <a:cs typeface="+mn-cs"/>
+            </a:endParaRPr>
+          </a:p>
+        </p:txBody>
+      </p:sp>
+    </p:spTree>
+    <p:extLst>
+      <p:ext uri="{BB962C8B-B14F-4D97-AF65-F5344CB8AC3E}">
         <p14:creationId xmlns:p14="http://schemas.microsoft.com/office/powerpoint/2010/main" val="2086728926"/>
       </p:ext>
     </p:extLst>
@@ -2529,7 +2679,7 @@
           <a:p>
             <a:fld id="{EEC3160E-2579-4584-9765-DC1BA0B358F9}" type="datetimeFigureOut">
               <a:rPr lang="en-US" smtClean="0"/>
-              <a:t>7/3/2017</a:t>
+              <a:t>7/10/2017</a:t>
             </a:fld>
             <a:endParaRPr lang="en-US"/>
           </a:p>
@@ -2699,7 +2849,7 @@
           <a:p>
             <a:fld id="{EEC3160E-2579-4584-9765-DC1BA0B358F9}" type="datetimeFigureOut">
               <a:rPr lang="en-US" smtClean="0"/>
-              <a:t>7/3/2017</a:t>
+              <a:t>7/10/2017</a:t>
             </a:fld>
             <a:endParaRPr lang="en-US"/>
           </a:p>
@@ -2879,7 +3029,7 @@
           <a:p>
             <a:fld id="{EEC3160E-2579-4584-9765-DC1BA0B358F9}" type="datetimeFigureOut">
               <a:rPr lang="en-US" smtClean="0"/>
-              <a:t>7/3/2017</a:t>
+              <a:t>7/10/2017</a:t>
             </a:fld>
             <a:endParaRPr lang="en-US"/>
           </a:p>
@@ -4794,7 +4944,7 @@
           <a:p>
             <a:fld id="{EEC3160E-2579-4584-9765-DC1BA0B358F9}" type="datetimeFigureOut">
               <a:rPr lang="en-US" smtClean="0"/>
-              <a:t>7/3/2017</a:t>
+              <a:t>7/10/2017</a:t>
             </a:fld>
             <a:endParaRPr lang="en-US"/>
           </a:p>
@@ -6276,7 +6426,7 @@
           <a:p>
             <a:fld id="{EEC3160E-2579-4584-9765-DC1BA0B358F9}" type="datetimeFigureOut">
               <a:rPr lang="en-US" smtClean="0"/>
-              <a:t>7/3/2017</a:t>
+              <a:t>7/10/2017</a:t>
             </a:fld>
             <a:endParaRPr lang="en-US"/>
           </a:p>
@@ -7416,7 +7566,7 @@
           <a:p>
             <a:fld id="{EEC3160E-2579-4584-9765-DC1BA0B358F9}" type="datetimeFigureOut">
               <a:rPr lang="en-US" smtClean="0"/>
-              <a:t>7/3/2017</a:t>
+              <a:t>7/10/2017</a:t>
             </a:fld>
             <a:endParaRPr lang="en-US"/>
           </a:p>
@@ -7783,7 +7933,7 @@
           <a:p>
             <a:fld id="{EEC3160E-2579-4584-9765-DC1BA0B358F9}" type="datetimeFigureOut">
               <a:rPr lang="en-US" smtClean="0"/>
-              <a:t>7/3/2017</a:t>
+              <a:t>7/10/2017</a:t>
             </a:fld>
             <a:endParaRPr lang="en-US"/>
           </a:p>
@@ -7901,7 +8051,7 @@
           <a:p>
             <a:fld id="{EEC3160E-2579-4584-9765-DC1BA0B358F9}" type="datetimeFigureOut">
               <a:rPr lang="en-US" smtClean="0"/>
-              <a:t>7/3/2017</a:t>
+              <a:t>7/10/2017</a:t>
             </a:fld>
             <a:endParaRPr lang="en-US"/>
           </a:p>
@@ -7996,7 +8146,7 @@
           <a:p>
             <a:fld id="{EEC3160E-2579-4584-9765-DC1BA0B358F9}" type="datetimeFigureOut">
               <a:rPr lang="en-US" smtClean="0"/>
-              <a:t>7/3/2017</a:t>
+              <a:t>7/10/2017</a:t>
             </a:fld>
             <a:endParaRPr lang="en-US"/>
           </a:p>
@@ -8273,7 +8423,7 @@
           <a:p>
             <a:fld id="{EEC3160E-2579-4584-9765-DC1BA0B358F9}" type="datetimeFigureOut">
               <a:rPr lang="en-US" smtClean="0"/>
-              <a:t>7/3/2017</a:t>
+              <a:t>7/10/2017</a:t>
             </a:fld>
             <a:endParaRPr lang="en-US"/>
           </a:p>
@@ -8530,7 +8680,7 @@
           <a:p>
             <a:fld id="{EEC3160E-2579-4584-9765-DC1BA0B358F9}" type="datetimeFigureOut">
               <a:rPr lang="en-US" smtClean="0"/>
-              <a:t>7/3/2017</a:t>
+              <a:t>7/10/2017</a:t>
             </a:fld>
             <a:endParaRPr lang="en-US"/>
           </a:p>
@@ -8743,7 +8893,7 @@
           <a:p>
             <a:fld id="{EEC3160E-2579-4584-9765-DC1BA0B358F9}" type="datetimeFigureOut">
               <a:rPr lang="en-US" smtClean="0"/>
-              <a:t>7/3/2017</a:t>
+              <a:t>7/10/2017</a:t>
             </a:fld>
             <a:endParaRPr lang="en-US"/>
           </a:p>
@@ -16931,13 +17081,11 @@
       </p:grpSpPr>
       <p:pic>
         <p:nvPicPr>
-          <p:cNvPr id="7" name="Content Placeholder 6"/>
+          <p:cNvPr id="5" name="Picture 4"/>
           <p:cNvPicPr>
-            <a:picLocks noGrp="1" noChangeAspect="1"/>
+            <a:picLocks noChangeAspect="1"/>
           </p:cNvPicPr>
-          <p:nvPr>
-            <p:ph sz="half" idx="1"/>
-          </p:nvPr>
+          <p:nvPr/>
         </p:nvPicPr>
         <p:blipFill>
           <a:blip r:embed="rId3">
@@ -16953,9 +17101,12 @@
         </p:blipFill>
         <p:spPr>
           <a:xfrm>
-            <a:off x="1253331" y="1825625"/>
-            <a:ext cx="4351338" cy="4351338"/>
+            <a:off x="523875" y="3313250"/>
+            <a:ext cx="11144250" cy="2828925"/>
           </a:xfrm>
+          <a:prstGeom prst="rect">
+            <a:avLst/>
+          </a:prstGeom>
         </p:spPr>
       </p:pic>
       <p:sp>
@@ -16975,34 +17126,41 @@
           <a:p>
             <a:r>
               <a:rPr lang="en-US" dirty="0"/>
-              <a:t>Thank you!</a:t>
+              <a:t>A Supplementary Resource</a:t>
             </a:r>
           </a:p>
         </p:txBody>
       </p:sp>
       <p:sp>
         <p:nvSpPr>
-          <p:cNvPr id="3" name="Content Placeholder 2"/>
+          <p:cNvPr id="4" name="Content Placeholder 3"/>
           <p:cNvSpPr>
             <a:spLocks noGrp="1"/>
           </p:cNvSpPr>
           <p:nvPr>
-            <p:ph sz="half" idx="2"/>
+            <p:ph idx="1"/>
           </p:nvPr>
         </p:nvSpPr>
-        <p:spPr/>
+        <p:spPr>
+          <a:xfrm>
+            <a:off x="838200" y="1825625"/>
+            <a:ext cx="10515600" cy="4351338"/>
+          </a:xfrm>
+        </p:spPr>
         <p:txBody>
-          <a:bodyPr>
-            <a:normAutofit fontScale="62500" lnSpcReduction="20000"/>
-          </a:bodyPr>
+          <a:bodyPr/>
           <a:lstStyle/>
           <a:p>
             <a:pPr marL="0" indent="0">
               <a:buNone/>
             </a:pPr>
             <a:r>
+              <a:rPr lang="en-US" b="1" dirty="0"/>
+              <a:t>Telerik Developer Network </a:t>
+            </a:r>
+            <a:r>
               <a:rPr lang="en-US" dirty="0"/>
-              <a:t>	</a:t>
+              <a:t>article</a:t>
             </a:r>
           </a:p>
           <a:p>
@@ -17010,250 +17168,28 @@
               <a:buNone/>
             </a:pPr>
             <a:r>
-              <a:rPr lang="en-US" dirty="0"/>
-              <a:t>	@Scott_Addie</a:t>
+              <a:rPr lang="en-US" i="1" dirty="0"/>
+              <a:t>Building Reusable UI Components in ASP.NET Core</a:t>
             </a:r>
           </a:p>
           <a:p>
             <a:pPr marL="0" indent="0">
               <a:buNone/>
             </a:pPr>
-            <a:endParaRPr lang="en-US" dirty="0"/>
-          </a:p>
-          <a:p>
-            <a:pPr marL="0" indent="0">
-              <a:buNone/>
-            </a:pPr>
-            <a:r>
-              <a:rPr lang="en-US" dirty="0"/>
-              <a:t>	</a:t>
-            </a:r>
-          </a:p>
-          <a:p>
-            <a:pPr marL="0" indent="0">
-              <a:buNone/>
-            </a:pPr>
-            <a:r>
-              <a:rPr lang="en-US" dirty="0"/>
-              <a:t>	scottaddie.com</a:t>
-            </a:r>
-          </a:p>
-          <a:p>
-            <a:pPr marL="0" indent="0">
-              <a:buNone/>
-            </a:pPr>
-            <a:endParaRPr lang="en-US" dirty="0"/>
-          </a:p>
-          <a:p>
-            <a:pPr marL="0" indent="0">
-              <a:buNone/>
-            </a:pPr>
-            <a:r>
-              <a:rPr lang="en-US" sz="2400" dirty="0"/>
-              <a:t>	</a:t>
-            </a:r>
-          </a:p>
-          <a:p>
-            <a:pPr marL="0" indent="0">
-              <a:buNone/>
-            </a:pPr>
-            <a:r>
-              <a:rPr lang="en-US" sz="2400" dirty="0"/>
-              <a:t>	</a:t>
-            </a:r>
-            <a:r>
-              <a:rPr lang="en-US" dirty="0"/>
-              <a:t>github.com/</a:t>
-            </a:r>
-            <a:r>
-              <a:rPr lang="en-US" dirty="0" err="1"/>
-              <a:t>scottaddie</a:t>
-            </a:r>
-            <a:endParaRPr lang="en-US" dirty="0"/>
-          </a:p>
-          <a:p>
-            <a:pPr marL="0" indent="0">
-              <a:buNone/>
-            </a:pPr>
-            <a:r>
-              <a:rPr lang="en-US" dirty="0"/>
-              <a:t>	     /</a:t>
-            </a:r>
-            <a:r>
-              <a:rPr lang="en-US" dirty="0" err="1"/>
-              <a:t>TagHelpersDemo</a:t>
-            </a:r>
-            <a:r>
-              <a:rPr lang="en-US" dirty="0"/>
-              <a:t>	</a:t>
-            </a:r>
-          </a:p>
-          <a:p>
-            <a:pPr marL="0" indent="0">
-              <a:buNone/>
-            </a:pPr>
-            <a:r>
-              <a:rPr lang="en-US" dirty="0"/>
-              <a:t>	     /</a:t>
-            </a:r>
-            <a:r>
-              <a:rPr lang="en-US" dirty="0" err="1"/>
-              <a:t>ViewComponentsDemo</a:t>
-            </a:r>
-            <a:endParaRPr lang="en-US" dirty="0"/>
-          </a:p>
-          <a:p>
-            <a:pPr marL="0" indent="0">
-              <a:buNone/>
-            </a:pPr>
-            <a:r>
-              <a:rPr lang="en-US" dirty="0"/>
-              <a:t>	     /slide-decks</a:t>
-            </a:r>
-          </a:p>
-          <a:p>
-            <a:pPr marL="0" indent="0">
-              <a:buNone/>
-            </a:pPr>
-            <a:r>
-              <a:rPr lang="en-US" dirty="0"/>
-              <a:t>			</a:t>
-            </a:r>
-          </a:p>
-          <a:p>
-            <a:pPr marL="0" indent="0">
-              <a:buNone/>
-            </a:pPr>
-            <a:r>
-              <a:rPr lang="en-US" dirty="0"/>
-              <a:t>	</a:t>
-            </a:r>
-          </a:p>
-          <a:p>
-            <a:pPr marL="0" indent="0">
-              <a:buNone/>
-            </a:pPr>
-            <a:endParaRPr lang="en-US" dirty="0"/>
+            <a:r>
+              <a:rPr lang="en-US" dirty="0">
+                <a:hlinkClick r:id="rId4"/>
+              </a:rPr>
+              <a:t>http://bit.ly/2uIU7Mc</a:t>
+            </a:r>
+            <a:endParaRPr lang="en-US" b="1" dirty="0"/>
           </a:p>
         </p:txBody>
       </p:sp>
-      <p:pic>
-        <p:nvPicPr>
-          <p:cNvPr id="8" name="Picture 7"/>
-          <p:cNvPicPr>
-            <a:picLocks noChangeAspect="1"/>
-          </p:cNvPicPr>
-          <p:nvPr/>
-        </p:nvPicPr>
-        <p:blipFill>
-          <a:blip r:embed="rId4" cstate="print">
-            <a:extLst>
-              <a:ext uri="{28A0092B-C50C-407E-A947-70E740481C1C}">
-                <a14:useLocalDpi xmlns:a14="http://schemas.microsoft.com/office/drawing/2010/main" val="0"/>
-              </a:ext>
-            </a:extLst>
-          </a:blip>
-          <a:stretch>
-            <a:fillRect/>
-          </a:stretch>
-        </p:blipFill>
-        <p:spPr>
-          <a:xfrm>
-            <a:off x="6402414" y="1996977"/>
-            <a:ext cx="682893" cy="555188"/>
-          </a:xfrm>
-          <a:prstGeom prst="rect">
-            <a:avLst/>
-          </a:prstGeom>
-        </p:spPr>
-      </p:pic>
-      <p:pic>
-        <p:nvPicPr>
-          <p:cNvPr id="9" name="Picture 2" descr="http://www.freeiconspng.com/uploads/github-logo-icon-30.png"/>
-          <p:cNvPicPr>
-            <a:picLocks noChangeAspect="1" noChangeArrowheads="1"/>
-          </p:cNvPicPr>
-          <p:nvPr/>
-        </p:nvPicPr>
-        <p:blipFill>
-          <a:blip r:embed="rId5">
-            <a:lum bright="70000" contrast="-70000"/>
-            <a:extLst>
-              <a:ext uri="{28A0092B-C50C-407E-A947-70E740481C1C}">
-                <a14:useLocalDpi xmlns:a14="http://schemas.microsoft.com/office/drawing/2010/main" val="0"/>
-              </a:ext>
-            </a:extLst>
-          </a:blip>
-          <a:srcRect/>
-          <a:stretch>
-            <a:fillRect/>
-          </a:stretch>
-        </p:blipFill>
-        <p:spPr bwMode="auto">
-          <a:xfrm>
-            <a:off x="6244128" y="4294173"/>
-            <a:ext cx="913109" cy="913109"/>
-          </a:xfrm>
-          <a:prstGeom prst="rect">
-            <a:avLst/>
-          </a:prstGeom>
-          <a:noFill/>
-          <a:extLst>
-            <a:ext uri="{909E8E84-426E-40DD-AFC4-6F175D3DCCD1}">
-              <a14:hiddenFill xmlns:a14="http://schemas.microsoft.com/office/drawing/2010/main">
-                <a:solidFill>
-                  <a:srgbClr val="FFFFFF"/>
-                </a:solidFill>
-              </a14:hiddenFill>
-            </a:ext>
-          </a:extLst>
-        </p:spPr>
-      </p:pic>
-      <p:pic>
-        <p:nvPicPr>
-          <p:cNvPr id="10" name="Picture 4" descr="http://pfbla47oxrfqoj1qhic01ij0.wpengine.netdna-cdn.com/wp-content/uploads/2013/11/rss.png"/>
-          <p:cNvPicPr>
-            <a:picLocks noChangeAspect="1" noChangeArrowheads="1"/>
-          </p:cNvPicPr>
-          <p:nvPr/>
-        </p:nvPicPr>
-        <p:blipFill>
-          <a:blip r:embed="rId6">
-            <a:extLst>
-              <a:ext uri="{28A0092B-C50C-407E-A947-70E740481C1C}">
-                <a14:useLocalDpi xmlns:a14="http://schemas.microsoft.com/office/drawing/2010/main" val="0"/>
-              </a:ext>
-            </a:extLst>
-          </a:blip>
-          <a:srcRect/>
-          <a:stretch>
-            <a:fillRect/>
-          </a:stretch>
-        </p:blipFill>
-        <p:spPr bwMode="auto">
-          <a:xfrm>
-            <a:off x="6351724" y="3179831"/>
-            <a:ext cx="697916" cy="697916"/>
-          </a:xfrm>
-          <a:prstGeom prst="rect">
-            <a:avLst/>
-          </a:prstGeom>
-          <a:noFill/>
-          <a:extLst>
-            <a:ext uri="{909E8E84-426E-40DD-AFC4-6F175D3DCCD1}">
-              <a14:hiddenFill xmlns:a14="http://schemas.microsoft.com/office/drawing/2010/main">
-                <a:solidFill>
-                  <a:srgbClr val="FFFFFF"/>
-                </a:solidFill>
-              </a14:hiddenFill>
-            </a:ext>
-          </a:extLst>
-        </p:spPr>
-      </p:pic>
     </p:spTree>
     <p:extLst>
       <p:ext uri="{BB962C8B-B14F-4D97-AF65-F5344CB8AC3E}">
-        <p14:creationId xmlns:p14="http://schemas.microsoft.com/office/powerpoint/2010/main" val="3283277495"/>
+        <p14:creationId xmlns:p14="http://schemas.microsoft.com/office/powerpoint/2010/main" val="3419977009"/>
       </p:ext>
     </p:extLst>
   </p:cSld>
@@ -17701,6 +17637,365 @@
       </p:par>
     </p:tnLst>
   </p:timing>
+</p:sld>
+</file>
+
+<file path=ppt/slides/slide20.xml><?xml version="1.0" encoding="utf-8"?>
+<p:sld xmlns:a="http://schemas.openxmlformats.org/drawingml/2006/main" xmlns:r="http://schemas.openxmlformats.org/officeDocument/2006/relationships" xmlns:p="http://schemas.openxmlformats.org/presentationml/2006/main">
+  <p:cSld>
+    <p:bg>
+      <p:bgPr>
+        <a:solidFill>
+          <a:srgbClr val="505050"/>
+        </a:solidFill>
+        <a:effectLst/>
+      </p:bgPr>
+    </p:bg>
+    <p:spTree>
+      <p:nvGrpSpPr>
+        <p:cNvPr id="1" name=""/>
+        <p:cNvGrpSpPr/>
+        <p:nvPr/>
+      </p:nvGrpSpPr>
+      <p:grpSpPr>
+        <a:xfrm>
+          <a:off x="0" y="0"/>
+          <a:ext cx="0" cy="0"/>
+          <a:chOff x="0" y="0"/>
+          <a:chExt cx="0" cy="0"/>
+        </a:xfrm>
+      </p:grpSpPr>
+      <p:pic>
+        <p:nvPicPr>
+          <p:cNvPr id="7" name="Content Placeholder 6"/>
+          <p:cNvPicPr>
+            <a:picLocks noGrp="1" noChangeAspect="1"/>
+          </p:cNvPicPr>
+          <p:nvPr>
+            <p:ph sz="half" idx="1"/>
+          </p:nvPr>
+        </p:nvPicPr>
+        <p:blipFill>
+          <a:blip r:embed="rId3">
+            <a:extLst>
+              <a:ext uri="{28A0092B-C50C-407E-A947-70E740481C1C}">
+                <a14:useLocalDpi xmlns:a14="http://schemas.microsoft.com/office/drawing/2010/main" val="0"/>
+              </a:ext>
+            </a:extLst>
+          </a:blip>
+          <a:stretch>
+            <a:fillRect/>
+          </a:stretch>
+        </p:blipFill>
+        <p:spPr>
+          <a:xfrm>
+            <a:off x="1253331" y="1825625"/>
+            <a:ext cx="4351338" cy="4351338"/>
+          </a:xfrm>
+        </p:spPr>
+      </p:pic>
+      <p:sp>
+        <p:nvSpPr>
+          <p:cNvPr id="2" name="Title 1"/>
+          <p:cNvSpPr>
+            <a:spLocks noGrp="1"/>
+          </p:cNvSpPr>
+          <p:nvPr>
+            <p:ph type="title"/>
+          </p:nvPr>
+        </p:nvSpPr>
+        <p:spPr/>
+        <p:txBody>
+          <a:bodyPr/>
+          <a:lstStyle/>
+          <a:p>
+            <a:r>
+              <a:rPr lang="en-US" dirty="0"/>
+              <a:t>Thank you!</a:t>
+            </a:r>
+          </a:p>
+        </p:txBody>
+      </p:sp>
+      <p:sp>
+        <p:nvSpPr>
+          <p:cNvPr id="3" name="Content Placeholder 2"/>
+          <p:cNvSpPr>
+            <a:spLocks noGrp="1"/>
+          </p:cNvSpPr>
+          <p:nvPr>
+            <p:ph sz="half" idx="2"/>
+          </p:nvPr>
+        </p:nvSpPr>
+        <p:spPr/>
+        <p:txBody>
+          <a:bodyPr>
+            <a:normAutofit fontScale="62500" lnSpcReduction="20000"/>
+          </a:bodyPr>
+          <a:lstStyle/>
+          <a:p>
+            <a:pPr marL="0" indent="0">
+              <a:buNone/>
+            </a:pPr>
+            <a:r>
+              <a:rPr lang="en-US" dirty="0"/>
+              <a:t>	</a:t>
+            </a:r>
+          </a:p>
+          <a:p>
+            <a:pPr marL="0" indent="0">
+              <a:buNone/>
+            </a:pPr>
+            <a:r>
+              <a:rPr lang="en-US" dirty="0"/>
+              <a:t>	@Scott_Addie</a:t>
+            </a:r>
+          </a:p>
+          <a:p>
+            <a:pPr marL="0" indent="0">
+              <a:buNone/>
+            </a:pPr>
+            <a:endParaRPr lang="en-US" dirty="0"/>
+          </a:p>
+          <a:p>
+            <a:pPr marL="0" indent="0">
+              <a:buNone/>
+            </a:pPr>
+            <a:r>
+              <a:rPr lang="en-US" dirty="0"/>
+              <a:t>	</a:t>
+            </a:r>
+          </a:p>
+          <a:p>
+            <a:pPr marL="0" indent="0">
+              <a:buNone/>
+            </a:pPr>
+            <a:r>
+              <a:rPr lang="en-US" dirty="0"/>
+              <a:t>	scottaddie.com</a:t>
+            </a:r>
+          </a:p>
+          <a:p>
+            <a:pPr marL="0" indent="0">
+              <a:buNone/>
+            </a:pPr>
+            <a:endParaRPr lang="en-US" dirty="0"/>
+          </a:p>
+          <a:p>
+            <a:pPr marL="0" indent="0">
+              <a:buNone/>
+            </a:pPr>
+            <a:r>
+              <a:rPr lang="en-US" sz="2400" dirty="0"/>
+              <a:t>	</a:t>
+            </a:r>
+          </a:p>
+          <a:p>
+            <a:pPr marL="0" indent="0">
+              <a:buNone/>
+            </a:pPr>
+            <a:r>
+              <a:rPr lang="en-US" sz="2400" dirty="0"/>
+              <a:t>	</a:t>
+            </a:r>
+            <a:r>
+              <a:rPr lang="en-US" dirty="0"/>
+              <a:t>github.com/</a:t>
+            </a:r>
+            <a:r>
+              <a:rPr lang="en-US" dirty="0" err="1"/>
+              <a:t>scottaddie</a:t>
+            </a:r>
+            <a:endParaRPr lang="en-US" dirty="0"/>
+          </a:p>
+          <a:p>
+            <a:pPr marL="0" indent="0">
+              <a:buNone/>
+            </a:pPr>
+            <a:r>
+              <a:rPr lang="en-US" dirty="0"/>
+              <a:t>	     /</a:t>
+            </a:r>
+            <a:r>
+              <a:rPr lang="en-US" dirty="0" err="1"/>
+              <a:t>TagHelpersDemo</a:t>
+            </a:r>
+            <a:r>
+              <a:rPr lang="en-US" dirty="0"/>
+              <a:t>	</a:t>
+            </a:r>
+          </a:p>
+          <a:p>
+            <a:pPr marL="0" indent="0">
+              <a:buNone/>
+            </a:pPr>
+            <a:r>
+              <a:rPr lang="en-US" dirty="0"/>
+              <a:t>	     /</a:t>
+            </a:r>
+            <a:r>
+              <a:rPr lang="en-US" dirty="0" err="1"/>
+              <a:t>ViewComponentsDemo</a:t>
+            </a:r>
+            <a:endParaRPr lang="en-US" dirty="0"/>
+          </a:p>
+          <a:p>
+            <a:pPr marL="0" indent="0">
+              <a:buNone/>
+            </a:pPr>
+            <a:r>
+              <a:rPr lang="en-US" dirty="0"/>
+              <a:t>	     /slide-decks</a:t>
+            </a:r>
+          </a:p>
+          <a:p>
+            <a:pPr marL="0" indent="0">
+              <a:buNone/>
+            </a:pPr>
+            <a:r>
+              <a:rPr lang="en-US" dirty="0"/>
+              <a:t>			</a:t>
+            </a:r>
+          </a:p>
+          <a:p>
+            <a:pPr marL="0" indent="0">
+              <a:buNone/>
+            </a:pPr>
+            <a:r>
+              <a:rPr lang="en-US" dirty="0"/>
+              <a:t>	</a:t>
+            </a:r>
+          </a:p>
+          <a:p>
+            <a:pPr marL="0" indent="0">
+              <a:buNone/>
+            </a:pPr>
+            <a:endParaRPr lang="en-US" dirty="0"/>
+          </a:p>
+        </p:txBody>
+      </p:sp>
+      <p:pic>
+        <p:nvPicPr>
+          <p:cNvPr id="8" name="Picture 7"/>
+          <p:cNvPicPr>
+            <a:picLocks noChangeAspect="1"/>
+          </p:cNvPicPr>
+          <p:nvPr/>
+        </p:nvPicPr>
+        <p:blipFill>
+          <a:blip r:embed="rId4" cstate="print">
+            <a:extLst>
+              <a:ext uri="{28A0092B-C50C-407E-A947-70E740481C1C}">
+                <a14:useLocalDpi xmlns:a14="http://schemas.microsoft.com/office/drawing/2010/main" val="0"/>
+              </a:ext>
+            </a:extLst>
+          </a:blip>
+          <a:stretch>
+            <a:fillRect/>
+          </a:stretch>
+        </p:blipFill>
+        <p:spPr>
+          <a:xfrm>
+            <a:off x="6402414" y="1996977"/>
+            <a:ext cx="682893" cy="555188"/>
+          </a:xfrm>
+          <a:prstGeom prst="rect">
+            <a:avLst/>
+          </a:prstGeom>
+        </p:spPr>
+      </p:pic>
+      <p:pic>
+        <p:nvPicPr>
+          <p:cNvPr id="9" name="Picture 2" descr="http://www.freeiconspng.com/uploads/github-logo-icon-30.png"/>
+          <p:cNvPicPr>
+            <a:picLocks noChangeAspect="1" noChangeArrowheads="1"/>
+          </p:cNvPicPr>
+          <p:nvPr/>
+        </p:nvPicPr>
+        <p:blipFill>
+          <a:blip r:embed="rId5">
+            <a:lum bright="70000" contrast="-70000"/>
+            <a:extLst>
+              <a:ext uri="{28A0092B-C50C-407E-A947-70E740481C1C}">
+                <a14:useLocalDpi xmlns:a14="http://schemas.microsoft.com/office/drawing/2010/main" val="0"/>
+              </a:ext>
+            </a:extLst>
+          </a:blip>
+          <a:srcRect/>
+          <a:stretch>
+            <a:fillRect/>
+          </a:stretch>
+        </p:blipFill>
+        <p:spPr bwMode="auto">
+          <a:xfrm>
+            <a:off x="6244128" y="4294173"/>
+            <a:ext cx="913109" cy="913109"/>
+          </a:xfrm>
+          <a:prstGeom prst="rect">
+            <a:avLst/>
+          </a:prstGeom>
+          <a:noFill/>
+          <a:extLst>
+            <a:ext uri="{909E8E84-426E-40DD-AFC4-6F175D3DCCD1}">
+              <a14:hiddenFill xmlns:a14="http://schemas.microsoft.com/office/drawing/2010/main">
+                <a:solidFill>
+                  <a:srgbClr val="FFFFFF"/>
+                </a:solidFill>
+              </a14:hiddenFill>
+            </a:ext>
+          </a:extLst>
+        </p:spPr>
+      </p:pic>
+      <p:pic>
+        <p:nvPicPr>
+          <p:cNvPr id="10" name="Picture 4" descr="http://pfbla47oxrfqoj1qhic01ij0.wpengine.netdna-cdn.com/wp-content/uploads/2013/11/rss.png"/>
+          <p:cNvPicPr>
+            <a:picLocks noChangeAspect="1" noChangeArrowheads="1"/>
+          </p:cNvPicPr>
+          <p:nvPr/>
+        </p:nvPicPr>
+        <p:blipFill>
+          <a:blip r:embed="rId6">
+            <a:extLst>
+              <a:ext uri="{28A0092B-C50C-407E-A947-70E740481C1C}">
+                <a14:useLocalDpi xmlns:a14="http://schemas.microsoft.com/office/drawing/2010/main" val="0"/>
+              </a:ext>
+            </a:extLst>
+          </a:blip>
+          <a:srcRect/>
+          <a:stretch>
+            <a:fillRect/>
+          </a:stretch>
+        </p:blipFill>
+        <p:spPr bwMode="auto">
+          <a:xfrm>
+            <a:off x="6351724" y="3179831"/>
+            <a:ext cx="697916" cy="697916"/>
+          </a:xfrm>
+          <a:prstGeom prst="rect">
+            <a:avLst/>
+          </a:prstGeom>
+          <a:noFill/>
+          <a:extLst>
+            <a:ext uri="{909E8E84-426E-40DD-AFC4-6F175D3DCCD1}">
+              <a14:hiddenFill xmlns:a14="http://schemas.microsoft.com/office/drawing/2010/main">
+                <a:solidFill>
+                  <a:srgbClr val="FFFFFF"/>
+                </a:solidFill>
+              </a14:hiddenFill>
+            </a:ext>
+          </a:extLst>
+        </p:spPr>
+      </p:pic>
+    </p:spTree>
+    <p:extLst>
+      <p:ext uri="{BB962C8B-B14F-4D97-AF65-F5344CB8AC3E}">
+        <p14:creationId xmlns:p14="http://schemas.microsoft.com/office/powerpoint/2010/main" val="3283277495"/>
+      </p:ext>
+    </p:extLst>
+  </p:cSld>
+  <p:clrMapOvr>
+    <a:masterClrMapping/>
+  </p:clrMapOvr>
 </p:sld>
 </file>
 

</xml_diff>

<commit_message>
Update resources and links
</commit_message>
<xml_diff>
--- a/Building Reusable UI Components in ASP.NET Core MVC.pptx
+++ b/Building Reusable UI Components in ASP.NET Core MVC.pptx
@@ -253,7 +253,7 @@
           <a:p>
             <a:fld id="{3B87D1B5-D667-42F5-9E38-2FD202ABDFA0}" type="datetimeFigureOut">
               <a:rPr lang="en-US" smtClean="0"/>
-              <a:t>9/6/2017</a:t>
+              <a:t>9/7/2017</a:t>
             </a:fld>
             <a:endParaRPr lang="en-US"/>
           </a:p>
@@ -2763,7 +2763,7 @@
           <a:p>
             <a:fld id="{EEC3160E-2579-4584-9765-DC1BA0B358F9}" type="datetimeFigureOut">
               <a:rPr lang="en-US" smtClean="0"/>
-              <a:t>9/6/2017</a:t>
+              <a:t>9/7/2017</a:t>
             </a:fld>
             <a:endParaRPr lang="en-US"/>
           </a:p>
@@ -2933,7 +2933,7 @@
           <a:p>
             <a:fld id="{EEC3160E-2579-4584-9765-DC1BA0B358F9}" type="datetimeFigureOut">
               <a:rPr lang="en-US" smtClean="0"/>
-              <a:t>9/6/2017</a:t>
+              <a:t>9/7/2017</a:t>
             </a:fld>
             <a:endParaRPr lang="en-US"/>
           </a:p>
@@ -3113,7 +3113,7 @@
           <a:p>
             <a:fld id="{EEC3160E-2579-4584-9765-DC1BA0B358F9}" type="datetimeFigureOut">
               <a:rPr lang="en-US" smtClean="0"/>
-              <a:t>9/6/2017</a:t>
+              <a:t>9/7/2017</a:t>
             </a:fld>
             <a:endParaRPr lang="en-US"/>
           </a:p>
@@ -5028,7 +5028,7 @@
           <a:p>
             <a:fld id="{EEC3160E-2579-4584-9765-DC1BA0B358F9}" type="datetimeFigureOut">
               <a:rPr lang="en-US" smtClean="0"/>
-              <a:t>9/6/2017</a:t>
+              <a:t>9/7/2017</a:t>
             </a:fld>
             <a:endParaRPr lang="en-US"/>
           </a:p>
@@ -6510,7 +6510,7 @@
           <a:p>
             <a:fld id="{EEC3160E-2579-4584-9765-DC1BA0B358F9}" type="datetimeFigureOut">
               <a:rPr lang="en-US" smtClean="0"/>
-              <a:t>9/6/2017</a:t>
+              <a:t>9/7/2017</a:t>
             </a:fld>
             <a:endParaRPr lang="en-US"/>
           </a:p>
@@ -7650,7 +7650,7 @@
           <a:p>
             <a:fld id="{EEC3160E-2579-4584-9765-DC1BA0B358F9}" type="datetimeFigureOut">
               <a:rPr lang="en-US" smtClean="0"/>
-              <a:t>9/6/2017</a:t>
+              <a:t>9/7/2017</a:t>
             </a:fld>
             <a:endParaRPr lang="en-US"/>
           </a:p>
@@ -8017,7 +8017,7 @@
           <a:p>
             <a:fld id="{EEC3160E-2579-4584-9765-DC1BA0B358F9}" type="datetimeFigureOut">
               <a:rPr lang="en-US" smtClean="0"/>
-              <a:t>9/6/2017</a:t>
+              <a:t>9/7/2017</a:t>
             </a:fld>
             <a:endParaRPr lang="en-US"/>
           </a:p>
@@ -8135,7 +8135,7 @@
           <a:p>
             <a:fld id="{EEC3160E-2579-4584-9765-DC1BA0B358F9}" type="datetimeFigureOut">
               <a:rPr lang="en-US" smtClean="0"/>
-              <a:t>9/6/2017</a:t>
+              <a:t>9/7/2017</a:t>
             </a:fld>
             <a:endParaRPr lang="en-US"/>
           </a:p>
@@ -8230,7 +8230,7 @@
           <a:p>
             <a:fld id="{EEC3160E-2579-4584-9765-DC1BA0B358F9}" type="datetimeFigureOut">
               <a:rPr lang="en-US" smtClean="0"/>
-              <a:t>9/6/2017</a:t>
+              <a:t>9/7/2017</a:t>
             </a:fld>
             <a:endParaRPr lang="en-US"/>
           </a:p>
@@ -8507,7 +8507,7 @@
           <a:p>
             <a:fld id="{EEC3160E-2579-4584-9765-DC1BA0B358F9}" type="datetimeFigureOut">
               <a:rPr lang="en-US" smtClean="0"/>
-              <a:t>9/6/2017</a:t>
+              <a:t>9/7/2017</a:t>
             </a:fld>
             <a:endParaRPr lang="en-US"/>
           </a:p>
@@ -8764,7 +8764,7 @@
           <a:p>
             <a:fld id="{EEC3160E-2579-4584-9765-DC1BA0B358F9}" type="datetimeFigureOut">
               <a:rPr lang="en-US" smtClean="0"/>
-              <a:t>9/6/2017</a:t>
+              <a:t>9/7/2017</a:t>
             </a:fld>
             <a:endParaRPr lang="en-US"/>
           </a:p>
@@ -8977,7 +8977,7 @@
           <a:p>
             <a:fld id="{EEC3160E-2579-4584-9765-DC1BA0B358F9}" type="datetimeFigureOut">
               <a:rPr lang="en-US" smtClean="0"/>
-              <a:t>9/6/2017</a:t>
+              <a:t>9/7/2017</a:t>
             </a:fld>
             <a:endParaRPr lang="en-US"/>
           </a:p>
@@ -17160,8 +17160,8 @@
         </p:blipFill>
         <p:spPr>
           <a:xfrm>
-            <a:off x="523875" y="3313250"/>
-            <a:ext cx="11144250" cy="2828925"/>
+            <a:off x="5929344" y="1825625"/>
+            <a:ext cx="5424456" cy="1376977"/>
           </a:xfrm>
           <a:prstGeom prst="rect">
             <a:avLst/>
@@ -17185,19 +17185,19 @@
           <a:p>
             <a:r>
               <a:rPr lang="en-US" dirty="0"/>
-              <a:t>A Supplementary Resource</a:t>
+              <a:t>Supplementary Resources</a:t>
             </a:r>
           </a:p>
         </p:txBody>
       </p:sp>
       <p:sp>
         <p:nvSpPr>
-          <p:cNvPr id="4" name="Content Placeholder 3"/>
+          <p:cNvPr id="11" name="Content Placeholder 10"/>
           <p:cNvSpPr>
             <a:spLocks noGrp="1"/>
           </p:cNvSpPr>
           <p:nvPr>
-            <p:ph idx="1"/>
+            <p:ph sz="half" idx="2"/>
           </p:nvPr>
         </p:nvSpPr>
         <p:spPr>
@@ -17207,15 +17207,21 @@
           </a:xfrm>
         </p:spPr>
         <p:txBody>
-          <a:bodyPr/>
+          <a:bodyPr>
+            <a:normAutofit/>
+          </a:bodyPr>
           <a:lstStyle/>
           <a:p>
             <a:pPr marL="0" indent="0">
               <a:buNone/>
             </a:pPr>
             <a:r>
+              <a:rPr lang="en-US" b="1" dirty="0" err="1"/>
+              <a:t>Telerik</a:t>
+            </a:r>
+            <a:r>
               <a:rPr lang="en-US" b="1" dirty="0"/>
-              <a:t>Telerik Developer Network </a:t>
+              <a:t> Developer Network </a:t>
             </a:r>
             <a:r>
               <a:rPr lang="en-US" dirty="0"/>
@@ -17227,8 +17233,8 @@
               <a:buNone/>
             </a:pPr>
             <a:r>
-              <a:rPr lang="en-US" i="1" dirty="0"/>
-              <a:t>Building Reusable UI Components in ASP.NET Core</a:t>
+              <a:rPr lang="en-US" sz="2400" i="1" dirty="0"/>
+              <a:t>Building Reusable UI Components</a:t>
             </a:r>
           </a:p>
           <a:p>
@@ -17236,15 +17242,100 @@
               <a:buNone/>
             </a:pPr>
             <a:r>
-              <a:rPr lang="en-US" dirty="0">
+              <a:rPr lang="en-US" sz="2400" i="1" dirty="0"/>
+              <a:t>  in ASP.NET Core</a:t>
+            </a:r>
+          </a:p>
+          <a:p>
+            <a:pPr marL="0" indent="0">
+              <a:buNone/>
+            </a:pPr>
+            <a:r>
+              <a:rPr lang="en-US" sz="2400" dirty="0">
                 <a:hlinkClick r:id="rId4"/>
               </a:rPr>
               <a:t>http://bit.ly/2uIU7Mc</a:t>
             </a:r>
-            <a:endParaRPr lang="en-US" b="1" dirty="0"/>
+            <a:endParaRPr lang="en-US" sz="2400" dirty="0"/>
+          </a:p>
+          <a:p>
+            <a:pPr marL="0" indent="0">
+              <a:buNone/>
+            </a:pPr>
+            <a:endParaRPr lang="en-US" dirty="0"/>
+          </a:p>
+          <a:p>
+            <a:pPr marL="0" indent="0">
+              <a:buNone/>
+            </a:pPr>
+            <a:endParaRPr lang="en-US" dirty="0"/>
+          </a:p>
+          <a:p>
+            <a:pPr marL="0" indent="0">
+              <a:buNone/>
+            </a:pPr>
+            <a:r>
+              <a:rPr lang="en-US" b="1" dirty="0"/>
+              <a:t>Eat, Sleep, Code</a:t>
+            </a:r>
+            <a:r>
+              <a:rPr lang="en-US" dirty="0"/>
+              <a:t> podcast</a:t>
+            </a:r>
+          </a:p>
+          <a:p>
+            <a:pPr marL="0" indent="0">
+              <a:buNone/>
+            </a:pPr>
+            <a:r>
+              <a:rPr lang="en-US" sz="2400" i="1" dirty="0"/>
+              <a:t>Implementing ASP.NET Core UIs</a:t>
+            </a:r>
+          </a:p>
+          <a:p>
+            <a:pPr marL="0" indent="0">
+              <a:buNone/>
+            </a:pPr>
+            <a:r>
+              <a:rPr lang="en-US" sz="2400" dirty="0">
+                <a:hlinkClick r:id="rId5"/>
+              </a:rPr>
+              <a:t>http://bit.ly/2wMgO3p</a:t>
+            </a:r>
+            <a:endParaRPr lang="en-US" sz="2400" dirty="0"/>
+          </a:p>
+          <a:p>
+            <a:pPr marL="0" indent="0">
+              <a:buNone/>
+            </a:pPr>
+            <a:endParaRPr lang="en-US" dirty="0"/>
           </a:p>
         </p:txBody>
       </p:sp>
+      <p:pic>
+        <p:nvPicPr>
+          <p:cNvPr id="12" name="Picture 11"/>
+          <p:cNvPicPr>
+            <a:picLocks noChangeAspect="1"/>
+          </p:cNvPicPr>
+          <p:nvPr/>
+        </p:nvPicPr>
+        <p:blipFill>
+          <a:blip r:embed="rId6"/>
+          <a:stretch>
+            <a:fillRect/>
+          </a:stretch>
+        </p:blipFill>
+        <p:spPr>
+          <a:xfrm>
+            <a:off x="6912076" y="3951475"/>
+            <a:ext cx="4441723" cy="2225488"/>
+          </a:xfrm>
+          <a:prstGeom prst="rect">
+            <a:avLst/>
+          </a:prstGeom>
+        </p:spPr>
+      </p:pic>
     </p:spTree>
     <p:extLst>
       <p:ext uri="{BB962C8B-B14F-4D97-AF65-F5344CB8AC3E}">
@@ -17726,6 +17817,36 @@
       </p:grpSpPr>
       <p:pic>
         <p:nvPicPr>
+          <p:cNvPr id="17" name="Picture 16"/>
+          <p:cNvPicPr>
+            <a:picLocks noChangeAspect="1"/>
+          </p:cNvPicPr>
+          <p:nvPr/>
+        </p:nvPicPr>
+        <p:blipFill>
+          <a:blip r:embed="rId3">
+            <a:extLst>
+              <a:ext uri="{28A0092B-C50C-407E-A947-70E740481C1C}">
+                <a14:useLocalDpi xmlns:a14="http://schemas.microsoft.com/office/drawing/2010/main" val="0"/>
+              </a:ext>
+            </a:extLst>
+          </a:blip>
+          <a:stretch>
+            <a:fillRect/>
+          </a:stretch>
+        </p:blipFill>
+        <p:spPr>
+          <a:xfrm>
+            <a:off x="6308458" y="3136565"/>
+            <a:ext cx="784448" cy="784448"/>
+          </a:xfrm>
+          <a:prstGeom prst="rect">
+            <a:avLst/>
+          </a:prstGeom>
+        </p:spPr>
+      </p:pic>
+      <p:pic>
+        <p:nvPicPr>
           <p:cNvPr id="7" name="Content Placeholder 6"/>
           <p:cNvPicPr>
             <a:picLocks noGrp="1" noChangeAspect="1"/>
@@ -17735,7 +17856,7 @@
           </p:nvPr>
         </p:nvPicPr>
         <p:blipFill>
-          <a:blip r:embed="rId3">
+          <a:blip r:embed="rId4">
             <a:extLst>
               <a:ext uri="{28A0092B-C50C-407E-A947-70E740481C1C}">
                 <a14:useLocalDpi xmlns:a14="http://schemas.microsoft.com/office/drawing/2010/main" val="0"/>
@@ -17788,7 +17909,7 @@
         <p:spPr/>
         <p:txBody>
           <a:bodyPr>
-            <a:normAutofit fontScale="62500" lnSpcReduction="20000"/>
+            <a:normAutofit fontScale="70000" lnSpcReduction="20000"/>
           </a:bodyPr>
           <a:lstStyle/>
           <a:p>
@@ -17830,7 +17951,7 @@
             </a:pPr>
             <a:r>
               <a:rPr lang="en-US" dirty="0"/>
-              <a:t>	scottaddie.com</a:t>
+              <a:t>					docs.asp.net</a:t>
             </a:r>
           </a:p>
           <a:p>
@@ -17867,44 +17988,36 @@
             <a:endParaRPr lang="en-US" dirty="0"/>
           </a:p>
           <a:p>
-            <a:pPr marL="0" indent="0">
-              <a:buNone/>
-            </a:pPr>
-            <a:r>
-              <a:rPr lang="en-US" dirty="0"/>
-              <a:t>	     /</a:t>
-            </a:r>
-            <a:r>
-              <a:rPr lang="en-US" dirty="0" err="1"/>
+            <a:pPr lvl="3"/>
+            <a:r>
+              <a:rPr lang="en-US" sz="2600" dirty="0"/>
+              <a:t>/slide-decks</a:t>
+            </a:r>
+            <a:endParaRPr lang="en-US" sz="2600" dirty="0"/>
+          </a:p>
+          <a:p>
+            <a:pPr lvl="3"/>
+            <a:r>
+              <a:rPr lang="en-US" sz="2600" dirty="0"/>
+              <a:t>/</a:t>
+            </a:r>
+            <a:r>
+              <a:rPr lang="en-US" sz="2600" dirty="0" err="1"/>
               <a:t>TagHelpersDemo</a:t>
             </a:r>
-            <a:r>
-              <a:rPr lang="en-US" dirty="0"/>
-              <a:t>	</a:t>
-            </a:r>
-          </a:p>
-          <a:p>
-            <a:pPr marL="0" indent="0">
-              <a:buNone/>
-            </a:pPr>
-            <a:r>
-              <a:rPr lang="en-US" dirty="0"/>
-              <a:t>	     /</a:t>
-            </a:r>
-            <a:r>
-              <a:rPr lang="en-US" dirty="0" err="1"/>
+            <a:endParaRPr lang="en-US" sz="2600" dirty="0"/>
+          </a:p>
+          <a:p>
+            <a:pPr lvl="3"/>
+            <a:r>
+              <a:rPr lang="en-US" sz="2600" dirty="0"/>
+              <a:t>/</a:t>
+            </a:r>
+            <a:r>
+              <a:rPr lang="en-US" sz="2600" dirty="0" err="1"/>
               <a:t>ViewComponentsDemo</a:t>
             </a:r>
-            <a:endParaRPr lang="en-US" dirty="0"/>
-          </a:p>
-          <a:p>
-            <a:pPr marL="0" indent="0">
-              <a:buNone/>
-            </a:pPr>
-            <a:r>
-              <a:rPr lang="en-US" dirty="0"/>
-              <a:t>	     /slide-decks</a:t>
-            </a:r>
+            <a:endParaRPr lang="en-US" sz="2600" dirty="0"/>
           </a:p>
           <a:p>
             <a:pPr marL="0" indent="0">
@@ -17941,7 +18054,7 @@
           <p:nvPr/>
         </p:nvPicPr>
         <p:blipFill>
-          <a:blip r:embed="rId4" cstate="print">
+          <a:blip r:embed="rId5" cstate="print">
             <a:extLst>
               <a:ext uri="{28A0092B-C50C-407E-A947-70E740481C1C}">
                 <a14:useLocalDpi xmlns:a14="http://schemas.microsoft.com/office/drawing/2010/main" val="0"/>
@@ -17971,7 +18084,7 @@
           <p:nvPr/>
         </p:nvPicPr>
         <p:blipFill>
-          <a:blip r:embed="rId5">
+          <a:blip r:embed="rId6">
             <a:lum bright="70000" contrast="-70000"/>
             <a:extLst>
               <a:ext uri="{28A0092B-C50C-407E-A947-70E740481C1C}">
@@ -17988,47 +18101,6 @@
           <a:xfrm>
             <a:off x="6244128" y="4294173"/>
             <a:ext cx="913109" cy="913109"/>
-          </a:xfrm>
-          <a:prstGeom prst="rect">
-            <a:avLst/>
-          </a:prstGeom>
-          <a:noFill/>
-          <a:extLst>
-            <a:ext uri="{909E8E84-426E-40DD-AFC4-6F175D3DCCD1}">
-              <a14:hiddenFill xmlns:a14="http://schemas.microsoft.com/office/drawing/2010/main">
-                <a:solidFill>
-                  <a:srgbClr val="FFFFFF"/>
-                </a:solidFill>
-              </a14:hiddenFill>
-            </a:ext>
-          </a:extLst>
-        </p:spPr>
-      </p:pic>
-      <p:pic>
-        <p:nvPicPr>
-          <p:cNvPr id="10" name="Picture 4" descr="http://pfbla47oxrfqoj1qhic01ij0.wpengine.netdna-cdn.com/wp-content/uploads/2013/11/rss.png"/>
-          <p:cNvPicPr>
-            <a:picLocks noChangeAspect="1" noChangeArrowheads="1"/>
-          </p:cNvPicPr>
-          <p:nvPr/>
-        </p:nvPicPr>
-        <p:blipFill>
-          <a:blip r:embed="rId6">
-            <a:extLst>
-              <a:ext uri="{28A0092B-C50C-407E-A947-70E740481C1C}">
-                <a14:useLocalDpi xmlns:a14="http://schemas.microsoft.com/office/drawing/2010/main" val="0"/>
-              </a:ext>
-            </a:extLst>
-          </a:blip>
-          <a:srcRect/>
-          <a:stretch>
-            <a:fillRect/>
-          </a:stretch>
-        </p:blipFill>
-        <p:spPr bwMode="auto">
-          <a:xfrm>
-            <a:off x="6351724" y="3179831"/>
-            <a:ext cx="697916" cy="697916"/>
           </a:xfrm>
           <a:prstGeom prst="rect">
             <a:avLst/>

</xml_diff>

<commit_message>
Add bitly URL to QR code
</commit_message>
<xml_diff>
--- a/Building Reusable UI Components in ASP.NET Core MVC.pptx
+++ b/Building Reusable UI Components in ASP.NET Core MVC.pptx
@@ -171,6 +171,10 @@
 </p:presentation>
 </file>
 
+<file path=ppt/revisionInfo.xml><?xml version="1.0" encoding="utf-8"?>
+<p1510:revInfo xmlns:a="http://schemas.openxmlformats.org/drawingml/2006/main" xmlns:r="http://schemas.openxmlformats.org/officeDocument/2006/relationships" xmlns:p1510="http://schemas.microsoft.com/office/powerpoint/2015/10/main"/>
+</file>
+
 <file path=ppt/notesMasters/notesMaster1.xml><?xml version="1.0" encoding="utf-8"?>
 <p:notesMaster xmlns:a="http://schemas.openxmlformats.org/drawingml/2006/main" xmlns:r="http://schemas.openxmlformats.org/officeDocument/2006/relationships" xmlns:p="http://schemas.openxmlformats.org/presentationml/2006/main">
   <p:cSld>
@@ -253,7 +257,7 @@
           <a:p>
             <a:fld id="{3B87D1B5-D667-42F5-9E38-2FD202ABDFA0}" type="datetimeFigureOut">
               <a:rPr lang="en-US" smtClean="0"/>
-              <a:t>9/7/2017</a:t>
+              <a:t>10/13/2017</a:t>
             </a:fld>
             <a:endParaRPr lang="en-US"/>
           </a:p>
@@ -2763,7 +2767,7 @@
           <a:p>
             <a:fld id="{EEC3160E-2579-4584-9765-DC1BA0B358F9}" type="datetimeFigureOut">
               <a:rPr lang="en-US" smtClean="0"/>
-              <a:t>9/7/2017</a:t>
+              <a:t>10/13/2017</a:t>
             </a:fld>
             <a:endParaRPr lang="en-US"/>
           </a:p>
@@ -2933,7 +2937,7 @@
           <a:p>
             <a:fld id="{EEC3160E-2579-4584-9765-DC1BA0B358F9}" type="datetimeFigureOut">
               <a:rPr lang="en-US" smtClean="0"/>
-              <a:t>9/7/2017</a:t>
+              <a:t>10/13/2017</a:t>
             </a:fld>
             <a:endParaRPr lang="en-US"/>
           </a:p>
@@ -3113,7 +3117,7 @@
           <a:p>
             <a:fld id="{EEC3160E-2579-4584-9765-DC1BA0B358F9}" type="datetimeFigureOut">
               <a:rPr lang="en-US" smtClean="0"/>
-              <a:t>9/7/2017</a:t>
+              <a:t>10/13/2017</a:t>
             </a:fld>
             <a:endParaRPr lang="en-US"/>
           </a:p>
@@ -5028,7 +5032,7 @@
           <a:p>
             <a:fld id="{EEC3160E-2579-4584-9765-DC1BA0B358F9}" type="datetimeFigureOut">
               <a:rPr lang="en-US" smtClean="0"/>
-              <a:t>9/7/2017</a:t>
+              <a:t>10/13/2017</a:t>
             </a:fld>
             <a:endParaRPr lang="en-US"/>
           </a:p>
@@ -6510,7 +6514,7 @@
           <a:p>
             <a:fld id="{EEC3160E-2579-4584-9765-DC1BA0B358F9}" type="datetimeFigureOut">
               <a:rPr lang="en-US" smtClean="0"/>
-              <a:t>9/7/2017</a:t>
+              <a:t>10/13/2017</a:t>
             </a:fld>
             <a:endParaRPr lang="en-US"/>
           </a:p>
@@ -7650,7 +7654,7 @@
           <a:p>
             <a:fld id="{EEC3160E-2579-4584-9765-DC1BA0B358F9}" type="datetimeFigureOut">
               <a:rPr lang="en-US" smtClean="0"/>
-              <a:t>9/7/2017</a:t>
+              <a:t>10/13/2017</a:t>
             </a:fld>
             <a:endParaRPr lang="en-US"/>
           </a:p>
@@ -8017,7 +8021,7 @@
           <a:p>
             <a:fld id="{EEC3160E-2579-4584-9765-DC1BA0B358F9}" type="datetimeFigureOut">
               <a:rPr lang="en-US" smtClean="0"/>
-              <a:t>9/7/2017</a:t>
+              <a:t>10/13/2017</a:t>
             </a:fld>
             <a:endParaRPr lang="en-US"/>
           </a:p>
@@ -8135,7 +8139,7 @@
           <a:p>
             <a:fld id="{EEC3160E-2579-4584-9765-DC1BA0B358F9}" type="datetimeFigureOut">
               <a:rPr lang="en-US" smtClean="0"/>
-              <a:t>9/7/2017</a:t>
+              <a:t>10/13/2017</a:t>
             </a:fld>
             <a:endParaRPr lang="en-US"/>
           </a:p>
@@ -8230,7 +8234,7 @@
           <a:p>
             <a:fld id="{EEC3160E-2579-4584-9765-DC1BA0B358F9}" type="datetimeFigureOut">
               <a:rPr lang="en-US" smtClean="0"/>
-              <a:t>9/7/2017</a:t>
+              <a:t>10/13/2017</a:t>
             </a:fld>
             <a:endParaRPr lang="en-US"/>
           </a:p>
@@ -8507,7 +8511,7 @@
           <a:p>
             <a:fld id="{EEC3160E-2579-4584-9765-DC1BA0B358F9}" type="datetimeFigureOut">
               <a:rPr lang="en-US" smtClean="0"/>
-              <a:t>9/7/2017</a:t>
+              <a:t>10/13/2017</a:t>
             </a:fld>
             <a:endParaRPr lang="en-US"/>
           </a:p>
@@ -8764,7 +8768,7 @@
           <a:p>
             <a:fld id="{EEC3160E-2579-4584-9765-DC1BA0B358F9}" type="datetimeFigureOut">
               <a:rPr lang="en-US" smtClean="0"/>
-              <a:t>9/7/2017</a:t>
+              <a:t>10/13/2017</a:t>
             </a:fld>
             <a:endParaRPr lang="en-US"/>
           </a:p>
@@ -8977,7 +8981,7 @@
           <a:p>
             <a:fld id="{EEC3160E-2579-4584-9765-DC1BA0B358F9}" type="datetimeFigureOut">
               <a:rPr lang="en-US" smtClean="0"/>
-              <a:t>9/7/2017</a:t>
+              <a:t>10/13/2017</a:t>
             </a:fld>
             <a:endParaRPr lang="en-US"/>
           </a:p>
@@ -17997,7 +18001,7 @@
         <p:spPr/>
         <p:txBody>
           <a:bodyPr>
-            <a:normAutofit fontScale="70000" lnSpcReduction="20000"/>
+            <a:normAutofit fontScale="85000" lnSpcReduction="20000"/>
           </a:bodyPr>
           <a:lstStyle/>
           <a:p>
@@ -18039,7 +18043,7 @@
             </a:pPr>
             <a:r>
               <a:rPr lang="en-US" dirty="0"/>
-              <a:t>					docs.asp.net</a:t>
+              <a:t>	docs.asp.net</a:t>
             </a:r>
           </a:p>
           <a:p>
@@ -18074,13 +18078,6 @@
               <a:t>scottaddie</a:t>
             </a:r>
             <a:endParaRPr lang="en-US" dirty="0"/>
-          </a:p>
-          <a:p>
-            <a:pPr lvl="3"/>
-            <a:r>
-              <a:rPr lang="en-US" sz="2600" dirty="0"/>
-              <a:t>/slide-decks</a:t>
-            </a:r>
           </a:p>
           <a:p>
             <a:pPr lvl="3"/>
@@ -18204,6 +18201,59 @@
           </a:extLst>
         </p:spPr>
       </p:pic>
+      <p:sp>
+        <p:nvSpPr>
+          <p:cNvPr id="4" name="Rectangle 3">
+            <a:extLst>
+              <a:ext uri="{FF2B5EF4-FFF2-40B4-BE49-F238E27FC236}">
+                <a16:creationId xmlns:a16="http://schemas.microsoft.com/office/drawing/2014/main" id="{BDF1DB61-52BC-433D-8E37-0461B9F5B283}"/>
+              </a:ext>
+            </a:extLst>
+          </p:cNvPr>
+          <p:cNvSpPr/>
+          <p:nvPr/>
+        </p:nvSpPr>
+        <p:spPr>
+          <a:xfrm>
+            <a:off x="1977227" y="5753398"/>
+            <a:ext cx="2922595" cy="461665"/>
+          </a:xfrm>
+          <a:prstGeom prst="rect">
+            <a:avLst/>
+          </a:prstGeom>
+        </p:spPr>
+        <p:txBody>
+          <a:bodyPr wrap="none">
+            <a:spAutoFit/>
+          </a:bodyPr>
+          <a:lstStyle/>
+          <a:p>
+            <a:r>
+              <a:rPr lang="en-US" sz="2400" b="1" dirty="0">
+                <a:ln w="9525">
+                  <a:solidFill>
+                    <a:schemeClr val="bg1"/>
+                  </a:solidFill>
+                  <a:prstDash val="solid"/>
+                </a:ln>
+                <a:solidFill>
+                  <a:schemeClr val="bg1"/>
+                </a:solidFill>
+                <a:effectLst>
+                  <a:outerShdw blurRad="12700" dist="38100" dir="2700000" algn="tl" rotWithShape="0">
+                    <a:schemeClr val="accent5">
+                      <a:lumMod val="60000"/>
+                      <a:lumOff val="40000"/>
+                    </a:schemeClr>
+                  </a:outerShdw>
+                </a:effectLst>
+              </a:rPr>
+              <a:t>http://bit.ly/2p7eimM</a:t>
+            </a:r>
+            <a:endParaRPr lang="en-US" sz="2400" dirty="0"/>
+          </a:p>
+        </p:txBody>
+      </p:sp>
     </p:spTree>
     <p:extLst>
       <p:ext uri="{BB962C8B-B14F-4D97-AF65-F5344CB8AC3E}">

</xml_diff>

<commit_message>
Add framework support indicators
</commit_message>
<xml_diff>
--- a/Building Reusable UI Components in ASP.NET Core MVC.pptx
+++ b/Building Reusable UI Components in ASP.NET Core MVC.pptx
@@ -295,7 +295,7 @@
           <a:p>
             <a:fld id="{3B87D1B5-D667-42F5-9E38-2FD202ABDFA0}" type="datetimeFigureOut">
               <a:rPr lang="en-US" smtClean="0"/>
-              <a:t>10/15/2017</a:t>
+              <a:t>10/16/2017</a:t>
             </a:fld>
             <a:endParaRPr lang="en-US"/>
           </a:p>
@@ -3111,7 +3111,7 @@
           <a:p>
             <a:fld id="{EEC3160E-2579-4584-9765-DC1BA0B358F9}" type="datetimeFigureOut">
               <a:rPr lang="en-US" smtClean="0"/>
-              <a:t>10/15/2017</a:t>
+              <a:t>10/16/2017</a:t>
             </a:fld>
             <a:endParaRPr lang="en-US"/>
           </a:p>
@@ -3281,7 +3281,7 @@
           <a:p>
             <a:fld id="{EEC3160E-2579-4584-9765-DC1BA0B358F9}" type="datetimeFigureOut">
               <a:rPr lang="en-US" smtClean="0"/>
-              <a:t>10/15/2017</a:t>
+              <a:t>10/16/2017</a:t>
             </a:fld>
             <a:endParaRPr lang="en-US"/>
           </a:p>
@@ -3461,7 +3461,7 @@
           <a:p>
             <a:fld id="{EEC3160E-2579-4584-9765-DC1BA0B358F9}" type="datetimeFigureOut">
               <a:rPr lang="en-US" smtClean="0"/>
-              <a:t>10/15/2017</a:t>
+              <a:t>10/16/2017</a:t>
             </a:fld>
             <a:endParaRPr lang="en-US"/>
           </a:p>
@@ -5376,7 +5376,7 @@
           <a:p>
             <a:fld id="{EEC3160E-2579-4584-9765-DC1BA0B358F9}" type="datetimeFigureOut">
               <a:rPr lang="en-US" smtClean="0"/>
-              <a:t>10/15/2017</a:t>
+              <a:t>10/16/2017</a:t>
             </a:fld>
             <a:endParaRPr lang="en-US"/>
           </a:p>
@@ -6858,7 +6858,7 @@
           <a:p>
             <a:fld id="{EEC3160E-2579-4584-9765-DC1BA0B358F9}" type="datetimeFigureOut">
               <a:rPr lang="en-US" smtClean="0"/>
-              <a:t>10/15/2017</a:t>
+              <a:t>10/16/2017</a:t>
             </a:fld>
             <a:endParaRPr lang="en-US"/>
           </a:p>
@@ -7998,7 +7998,7 @@
           <a:p>
             <a:fld id="{EEC3160E-2579-4584-9765-DC1BA0B358F9}" type="datetimeFigureOut">
               <a:rPr lang="en-US" smtClean="0"/>
-              <a:t>10/15/2017</a:t>
+              <a:t>10/16/2017</a:t>
             </a:fld>
             <a:endParaRPr lang="en-US"/>
           </a:p>
@@ -8365,7 +8365,7 @@
           <a:p>
             <a:fld id="{EEC3160E-2579-4584-9765-DC1BA0B358F9}" type="datetimeFigureOut">
               <a:rPr lang="en-US" smtClean="0"/>
-              <a:t>10/15/2017</a:t>
+              <a:t>10/16/2017</a:t>
             </a:fld>
             <a:endParaRPr lang="en-US"/>
           </a:p>
@@ -8483,7 +8483,7 @@
           <a:p>
             <a:fld id="{EEC3160E-2579-4584-9765-DC1BA0B358F9}" type="datetimeFigureOut">
               <a:rPr lang="en-US" smtClean="0"/>
-              <a:t>10/15/2017</a:t>
+              <a:t>10/16/2017</a:t>
             </a:fld>
             <a:endParaRPr lang="en-US"/>
           </a:p>
@@ -8578,7 +8578,7 @@
           <a:p>
             <a:fld id="{EEC3160E-2579-4584-9765-DC1BA0B358F9}" type="datetimeFigureOut">
               <a:rPr lang="en-US" smtClean="0"/>
-              <a:t>10/15/2017</a:t>
+              <a:t>10/16/2017</a:t>
             </a:fld>
             <a:endParaRPr lang="en-US"/>
           </a:p>
@@ -8855,7 +8855,7 @@
           <a:p>
             <a:fld id="{EEC3160E-2579-4584-9765-DC1BA0B358F9}" type="datetimeFigureOut">
               <a:rPr lang="en-US" smtClean="0"/>
-              <a:t>10/15/2017</a:t>
+              <a:t>10/16/2017</a:t>
             </a:fld>
             <a:endParaRPr lang="en-US"/>
           </a:p>
@@ -9112,7 +9112,7 @@
           <a:p>
             <a:fld id="{EEC3160E-2579-4584-9765-DC1BA0B358F9}" type="datetimeFigureOut">
               <a:rPr lang="en-US" smtClean="0"/>
-              <a:t>10/15/2017</a:t>
+              <a:t>10/16/2017</a:t>
             </a:fld>
             <a:endParaRPr lang="en-US"/>
           </a:p>
@@ -9325,7 +9325,7 @@
           <a:p>
             <a:fld id="{EEC3160E-2579-4584-9765-DC1BA0B358F9}" type="datetimeFigureOut">
               <a:rPr lang="en-US" smtClean="0"/>
-              <a:t>10/15/2017</a:t>
+              <a:t>10/16/2017</a:t>
             </a:fld>
             <a:endParaRPr lang="en-US"/>
           </a:p>
@@ -14186,6 +14186,55 @@
           </a:p>
         </p:txBody>
       </p:sp>
+      <p:sp>
+        <p:nvSpPr>
+          <p:cNvPr id="4" name="Star: 12 Points 3">
+            <a:extLst>
+              <a:ext uri="{FF2B5EF4-FFF2-40B4-BE49-F238E27FC236}">
+                <a16:creationId xmlns:a16="http://schemas.microsoft.com/office/drawing/2014/main" id="{34A844C9-5B87-46E1-A743-8F0A18111321}"/>
+              </a:ext>
+            </a:extLst>
+          </p:cNvPr>
+          <p:cNvSpPr/>
+          <p:nvPr/>
+        </p:nvSpPr>
+        <p:spPr>
+          <a:xfrm>
+            <a:off x="9746901" y="422031"/>
+            <a:ext cx="2034792" cy="1572567"/>
+          </a:xfrm>
+          <a:prstGeom prst="star12">
+            <a:avLst/>
+          </a:prstGeom>
+        </p:spPr>
+        <p:style>
+          <a:lnRef idx="2">
+            <a:schemeClr val="accent1">
+              <a:shade val="50000"/>
+            </a:schemeClr>
+          </a:lnRef>
+          <a:fillRef idx="1">
+            <a:schemeClr val="accent1"/>
+          </a:fillRef>
+          <a:effectRef idx="0">
+            <a:schemeClr val="accent1"/>
+          </a:effectRef>
+          <a:fontRef idx="minor">
+            <a:schemeClr val="lt1"/>
+          </a:fontRef>
+        </p:style>
+        <p:txBody>
+          <a:bodyPr rtlCol="0" anchor="ctr"/>
+          <a:lstStyle/>
+          <a:p>
+            <a:pPr algn="ctr"/>
+            <a:r>
+              <a:rPr lang="en-US" dirty="0"/>
+              <a:t>ASP.NET Core</a:t>
+            </a:r>
+          </a:p>
+        </p:txBody>
+      </p:sp>
     </p:spTree>
     <p:extLst>
       <p:ext uri="{BB962C8B-B14F-4D97-AF65-F5344CB8AC3E}">
@@ -21444,6 +21493,55 @@
           </a:p>
         </p:txBody>
       </p:sp>
+      <p:sp>
+        <p:nvSpPr>
+          <p:cNvPr id="4" name="Star: 12 Points 3">
+            <a:extLst>
+              <a:ext uri="{FF2B5EF4-FFF2-40B4-BE49-F238E27FC236}">
+                <a16:creationId xmlns:a16="http://schemas.microsoft.com/office/drawing/2014/main" id="{DE2292C5-9764-4416-991B-EDD49197C685}"/>
+              </a:ext>
+            </a:extLst>
+          </p:cNvPr>
+          <p:cNvSpPr/>
+          <p:nvPr/>
+        </p:nvSpPr>
+        <p:spPr>
+          <a:xfrm>
+            <a:off x="9746901" y="422031"/>
+            <a:ext cx="2034792" cy="1572567"/>
+          </a:xfrm>
+          <a:prstGeom prst="star12">
+            <a:avLst/>
+          </a:prstGeom>
+        </p:spPr>
+        <p:style>
+          <a:lnRef idx="2">
+            <a:schemeClr val="accent1">
+              <a:shade val="50000"/>
+            </a:schemeClr>
+          </a:lnRef>
+          <a:fillRef idx="1">
+            <a:schemeClr val="accent1"/>
+          </a:fillRef>
+          <a:effectRef idx="0">
+            <a:schemeClr val="accent1"/>
+          </a:effectRef>
+          <a:fontRef idx="minor">
+            <a:schemeClr val="lt1"/>
+          </a:fontRef>
+        </p:style>
+        <p:txBody>
+          <a:bodyPr rtlCol="0" anchor="ctr"/>
+          <a:lstStyle/>
+          <a:p>
+            <a:pPr algn="ctr"/>
+            <a:r>
+              <a:rPr lang="en-US" dirty="0"/>
+              <a:t>ASP.NET 4.x, Core</a:t>
+            </a:r>
+          </a:p>
+        </p:txBody>
+      </p:sp>
     </p:spTree>
     <p:extLst>
       <p:ext uri="{BB962C8B-B14F-4D97-AF65-F5344CB8AC3E}">
@@ -22216,6 +22314,55 @@
               <a:t>Index.cshtml</a:t>
             </a:r>
             <a:endParaRPr lang="en-US" b="1" dirty="0"/>
+          </a:p>
+        </p:txBody>
+      </p:sp>
+      <p:sp>
+        <p:nvSpPr>
+          <p:cNvPr id="6" name="Star: 12 Points 5">
+            <a:extLst>
+              <a:ext uri="{FF2B5EF4-FFF2-40B4-BE49-F238E27FC236}">
+                <a16:creationId xmlns:a16="http://schemas.microsoft.com/office/drawing/2014/main" id="{97450780-50A5-4398-AF1F-02BB82FF4B25}"/>
+              </a:ext>
+            </a:extLst>
+          </p:cNvPr>
+          <p:cNvSpPr/>
+          <p:nvPr/>
+        </p:nvSpPr>
+        <p:spPr>
+          <a:xfrm>
+            <a:off x="9746901" y="422031"/>
+            <a:ext cx="2034792" cy="1572567"/>
+          </a:xfrm>
+          <a:prstGeom prst="star12">
+            <a:avLst/>
+          </a:prstGeom>
+        </p:spPr>
+        <p:style>
+          <a:lnRef idx="2">
+            <a:schemeClr val="accent1">
+              <a:shade val="50000"/>
+            </a:schemeClr>
+          </a:lnRef>
+          <a:fillRef idx="1">
+            <a:schemeClr val="accent1"/>
+          </a:fillRef>
+          <a:effectRef idx="0">
+            <a:schemeClr val="accent1"/>
+          </a:effectRef>
+          <a:fontRef idx="minor">
+            <a:schemeClr val="lt1"/>
+          </a:fontRef>
+        </p:style>
+        <p:txBody>
+          <a:bodyPr rtlCol="0" anchor="ctr"/>
+          <a:lstStyle/>
+          <a:p>
+            <a:pPr algn="ctr"/>
+            <a:r>
+              <a:rPr lang="en-US" dirty="0"/>
+              <a:t>ASP.NET 4.x, Core</a:t>
+            </a:r>
           </a:p>
         </p:txBody>
       </p:sp>
@@ -22903,6 +23050,55 @@
             <a:r>
               <a:rPr lang="en-US" dirty="0"/>
               <a:t>Designed with testing in mind</a:t>
+            </a:r>
+          </a:p>
+        </p:txBody>
+      </p:sp>
+      <p:sp>
+        <p:nvSpPr>
+          <p:cNvPr id="4" name="Star: 12 Points 3">
+            <a:extLst>
+              <a:ext uri="{FF2B5EF4-FFF2-40B4-BE49-F238E27FC236}">
+                <a16:creationId xmlns:a16="http://schemas.microsoft.com/office/drawing/2014/main" id="{B4607067-2C80-45AB-BAE2-1172211A0728}"/>
+              </a:ext>
+            </a:extLst>
+          </p:cNvPr>
+          <p:cNvSpPr/>
+          <p:nvPr/>
+        </p:nvSpPr>
+        <p:spPr>
+          <a:xfrm>
+            <a:off x="9746901" y="422031"/>
+            <a:ext cx="2034792" cy="1572567"/>
+          </a:xfrm>
+          <a:prstGeom prst="star12">
+            <a:avLst/>
+          </a:prstGeom>
+        </p:spPr>
+        <p:style>
+          <a:lnRef idx="2">
+            <a:schemeClr val="accent1">
+              <a:shade val="50000"/>
+            </a:schemeClr>
+          </a:lnRef>
+          <a:fillRef idx="1">
+            <a:schemeClr val="accent1"/>
+          </a:fillRef>
+          <a:effectRef idx="0">
+            <a:schemeClr val="accent1"/>
+          </a:effectRef>
+          <a:fontRef idx="minor">
+            <a:schemeClr val="lt1"/>
+          </a:fontRef>
+        </p:style>
+        <p:txBody>
+          <a:bodyPr rtlCol="0" anchor="ctr"/>
+          <a:lstStyle/>
+          <a:p>
+            <a:pPr algn="ctr"/>
+            <a:r>
+              <a:rPr lang="en-US" dirty="0"/>
+              <a:t>ASP.NET Core</a:t>
             </a:r>
           </a:p>
         </p:txBody>

</xml_diff>

<commit_message>
Add speaker eval link
</commit_message>
<xml_diff>
--- a/Building Reusable UI Components in ASP.NET Core MVC.pptx
+++ b/Building Reusable UI Components in ASP.NET Core MVC.pptx
@@ -281,7 +281,7 @@
           <a:p>
             <a:fld id="{3B87D1B5-D667-42F5-9E38-2FD202ABDFA0}" type="datetimeFigureOut">
               <a:rPr lang="en-US" smtClean="0"/>
-              <a:t>11/8/2017</a:t>
+              <a:t>11/9/17</a:t>
             </a:fld>
             <a:endParaRPr lang="en-US"/>
           </a:p>
@@ -2967,7 +2967,7 @@
           <a:p>
             <a:fld id="{EEC3160E-2579-4584-9765-DC1BA0B358F9}" type="datetimeFigureOut">
               <a:rPr lang="en-US" smtClean="0"/>
-              <a:t>11/8/2017</a:t>
+              <a:t>11/9/17</a:t>
             </a:fld>
             <a:endParaRPr lang="en-US"/>
           </a:p>
@@ -3137,7 +3137,7 @@
           <a:p>
             <a:fld id="{EEC3160E-2579-4584-9765-DC1BA0B358F9}" type="datetimeFigureOut">
               <a:rPr lang="en-US" smtClean="0"/>
-              <a:t>11/8/2017</a:t>
+              <a:t>11/9/17</a:t>
             </a:fld>
             <a:endParaRPr lang="en-US"/>
           </a:p>
@@ -3317,7 +3317,7 @@
           <a:p>
             <a:fld id="{EEC3160E-2579-4584-9765-DC1BA0B358F9}" type="datetimeFigureOut">
               <a:rPr lang="en-US" smtClean="0"/>
-              <a:t>11/8/2017</a:t>
+              <a:t>11/9/17</a:t>
             </a:fld>
             <a:endParaRPr lang="en-US"/>
           </a:p>
@@ -5232,7 +5232,7 @@
           <a:p>
             <a:fld id="{EEC3160E-2579-4584-9765-DC1BA0B358F9}" type="datetimeFigureOut">
               <a:rPr lang="en-US" smtClean="0"/>
-              <a:t>11/8/2017</a:t>
+              <a:t>11/9/17</a:t>
             </a:fld>
             <a:endParaRPr lang="en-US"/>
           </a:p>
@@ -6714,7 +6714,7 @@
           <a:p>
             <a:fld id="{EEC3160E-2579-4584-9765-DC1BA0B358F9}" type="datetimeFigureOut">
               <a:rPr lang="en-US" smtClean="0"/>
-              <a:t>11/8/2017</a:t>
+              <a:t>11/9/17</a:t>
             </a:fld>
             <a:endParaRPr lang="en-US"/>
           </a:p>
@@ -7854,7 +7854,7 @@
           <a:p>
             <a:fld id="{EEC3160E-2579-4584-9765-DC1BA0B358F9}" type="datetimeFigureOut">
               <a:rPr lang="en-US" smtClean="0"/>
-              <a:t>11/8/2017</a:t>
+              <a:t>11/9/17</a:t>
             </a:fld>
             <a:endParaRPr lang="en-US"/>
           </a:p>
@@ -8221,7 +8221,7 @@
           <a:p>
             <a:fld id="{EEC3160E-2579-4584-9765-DC1BA0B358F9}" type="datetimeFigureOut">
               <a:rPr lang="en-US" smtClean="0"/>
-              <a:t>11/8/2017</a:t>
+              <a:t>11/9/17</a:t>
             </a:fld>
             <a:endParaRPr lang="en-US"/>
           </a:p>
@@ -8339,7 +8339,7 @@
           <a:p>
             <a:fld id="{EEC3160E-2579-4584-9765-DC1BA0B358F9}" type="datetimeFigureOut">
               <a:rPr lang="en-US" smtClean="0"/>
-              <a:t>11/8/2017</a:t>
+              <a:t>11/9/17</a:t>
             </a:fld>
             <a:endParaRPr lang="en-US"/>
           </a:p>
@@ -8434,7 +8434,7 @@
           <a:p>
             <a:fld id="{EEC3160E-2579-4584-9765-DC1BA0B358F9}" type="datetimeFigureOut">
               <a:rPr lang="en-US" smtClean="0"/>
-              <a:t>11/8/2017</a:t>
+              <a:t>11/9/17</a:t>
             </a:fld>
             <a:endParaRPr lang="en-US"/>
           </a:p>
@@ -8711,7 +8711,7 @@
           <a:p>
             <a:fld id="{EEC3160E-2579-4584-9765-DC1BA0B358F9}" type="datetimeFigureOut">
               <a:rPr lang="en-US" smtClean="0"/>
-              <a:t>11/8/2017</a:t>
+              <a:t>11/9/17</a:t>
             </a:fld>
             <a:endParaRPr lang="en-US"/>
           </a:p>
@@ -8968,7 +8968,7 @@
           <a:p>
             <a:fld id="{EEC3160E-2579-4584-9765-DC1BA0B358F9}" type="datetimeFigureOut">
               <a:rPr lang="en-US" smtClean="0"/>
-              <a:t>11/8/2017</a:t>
+              <a:t>11/9/17</a:t>
             </a:fld>
             <a:endParaRPr lang="en-US"/>
           </a:p>
@@ -9181,7 +9181,7 @@
           <a:p>
             <a:fld id="{EEC3160E-2579-4584-9765-DC1BA0B358F9}" type="datetimeFigureOut">
               <a:rPr lang="en-US" smtClean="0"/>
-              <a:t>11/8/2017</a:t>
+              <a:t>11/9/17</a:t>
             </a:fld>
             <a:endParaRPr lang="en-US"/>
           </a:p>
@@ -11608,6 +11608,10 @@
               <a:rPr lang="en-US" sz="4800" b="1" dirty="0"/>
               <a:t>Building Reusable UI Components</a:t>
             </a:r>
+            <a:r>
+              <a:rPr lang="en-US" sz="4900" b="1" dirty="0"/>
+              <a:t/>
+            </a:r>
             <a:br>
               <a:rPr lang="en-US" sz="4900" b="1" dirty="0"/>
             </a:br>
@@ -12362,7 +12366,7 @@
           <p:cNvPr id="4" name="Star: 12 Points 3">
             <a:extLst>
               <a:ext uri="{FF2B5EF4-FFF2-40B4-BE49-F238E27FC236}">
-                <a16:creationId xmlns:a16="http://schemas.microsoft.com/office/drawing/2014/main" id="{34A844C9-5B87-46E1-A743-8F0A18111321}"/>
+                <a16:creationId xmlns:a16="http://schemas.microsoft.com/office/drawing/2014/main" xmlns="" id="{34A844C9-5B87-46E1-A743-8F0A18111321}"/>
               </a:ext>
             </a:extLst>
           </p:cNvPr>
@@ -12814,7 +12818,7 @@
                 <a:gridCol w="10964918">
                   <a:extLst>
                     <a:ext uri="{9D8B030D-6E8A-4147-A177-3AD203B41FA5}">
-                      <a16:colId xmlns:a16="http://schemas.microsoft.com/office/drawing/2014/main" val="1057070397"/>
+                      <a16:colId xmlns:a16="http://schemas.microsoft.com/office/drawing/2014/main" xmlns="" val="1057070397"/>
                     </a:ext>
                   </a:extLst>
                 </a:gridCol>
@@ -13323,7 +13327,7 @@
                 </a:tc>
                 <a:extLst>
                   <a:ext uri="{0D108BD9-81ED-4DB2-BD59-A6C34878D82A}">
-                    <a16:rowId xmlns:a16="http://schemas.microsoft.com/office/drawing/2014/main" val="3473222697"/>
+                    <a16:rowId xmlns:a16="http://schemas.microsoft.com/office/drawing/2014/main" xmlns="" val="3473222697"/>
                   </a:ext>
                 </a:extLst>
               </a:tr>
@@ -14358,7 +14362,7 @@
                 <a:gridCol w="7545203">
                   <a:extLst>
                     <a:ext uri="{9D8B030D-6E8A-4147-A177-3AD203B41FA5}">
-                      <a16:colId xmlns:a16="http://schemas.microsoft.com/office/drawing/2014/main" val="1057070397"/>
+                      <a16:colId xmlns:a16="http://schemas.microsoft.com/office/drawing/2014/main" xmlns="" val="1057070397"/>
                     </a:ext>
                   </a:extLst>
                 </a:gridCol>
@@ -14587,7 +14591,7 @@
                 </a:tc>
                 <a:extLst>
                   <a:ext uri="{0D108BD9-81ED-4DB2-BD59-A6C34878D82A}">
-                    <a16:rowId xmlns:a16="http://schemas.microsoft.com/office/drawing/2014/main" val="3473222697"/>
+                    <a16:rowId xmlns:a16="http://schemas.microsoft.com/office/drawing/2014/main" xmlns="" val="3473222697"/>
                   </a:ext>
                 </a:extLst>
               </a:tr>
@@ -14665,7 +14669,7 @@
                 <a:gridCol w="7545203">
                   <a:extLst>
                     <a:ext uri="{9D8B030D-6E8A-4147-A177-3AD203B41FA5}">
-                      <a16:colId xmlns:a16="http://schemas.microsoft.com/office/drawing/2014/main" val="1057070397"/>
+                      <a16:colId xmlns:a16="http://schemas.microsoft.com/office/drawing/2014/main" xmlns="" val="1057070397"/>
                     </a:ext>
                   </a:extLst>
                 </a:gridCol>
@@ -14828,7 +14832,7 @@
                 </a:tc>
                 <a:extLst>
                   <a:ext uri="{0D108BD9-81ED-4DB2-BD59-A6C34878D82A}">
-                    <a16:rowId xmlns:a16="http://schemas.microsoft.com/office/drawing/2014/main" val="3473222697"/>
+                    <a16:rowId xmlns:a16="http://schemas.microsoft.com/office/drawing/2014/main" xmlns="" val="3473222697"/>
                   </a:ext>
                 </a:extLst>
               </a:tr>
@@ -14906,7 +14910,7 @@
                 <a:gridCol w="7545203">
                   <a:extLst>
                     <a:ext uri="{9D8B030D-6E8A-4147-A177-3AD203B41FA5}">
-                      <a16:colId xmlns:a16="http://schemas.microsoft.com/office/drawing/2014/main" val="1057070397"/>
+                      <a16:colId xmlns:a16="http://schemas.microsoft.com/office/drawing/2014/main" xmlns="" val="1057070397"/>
                     </a:ext>
                   </a:extLst>
                 </a:gridCol>
@@ -15220,7 +15224,7 @@
                 </a:tc>
                 <a:extLst>
                   <a:ext uri="{0D108BD9-81ED-4DB2-BD59-A6C34878D82A}">
-                    <a16:rowId xmlns:a16="http://schemas.microsoft.com/office/drawing/2014/main" val="3473222697"/>
+                    <a16:rowId xmlns:a16="http://schemas.microsoft.com/office/drawing/2014/main" xmlns="" val="3473222697"/>
                   </a:ext>
                 </a:extLst>
               </a:tr>
@@ -18381,9 +18385,15 @@
   <p:cSld>
     <p:bg>
       <p:bgPr>
-        <a:solidFill>
-          <a:srgbClr val="505050"/>
-        </a:solidFill>
+        <a:blipFill dpi="0" rotWithShape="1">
+          <a:blip r:embed="rId3">
+            <a:lum/>
+          </a:blip>
+          <a:srcRect/>
+          <a:stretch>
+            <a:fillRect/>
+          </a:stretch>
+        </a:blipFill>
         <a:effectLst/>
       </p:bgPr>
     </p:bg>
@@ -18401,353 +18411,6 @@
           <a:chExt cx="0" cy="0"/>
         </a:xfrm>
       </p:grpSpPr>
-      <p:pic>
-        <p:nvPicPr>
-          <p:cNvPr id="17" name="Picture 16"/>
-          <p:cNvPicPr>
-            <a:picLocks noChangeAspect="1"/>
-          </p:cNvPicPr>
-          <p:nvPr/>
-        </p:nvPicPr>
-        <p:blipFill>
-          <a:blip r:embed="rId3">
-            <a:extLst>
-              <a:ext uri="{28A0092B-C50C-407E-A947-70E740481C1C}">
-                <a14:useLocalDpi xmlns:a14="http://schemas.microsoft.com/office/drawing/2010/main" val="0"/>
-              </a:ext>
-            </a:extLst>
-          </a:blip>
-          <a:stretch>
-            <a:fillRect/>
-          </a:stretch>
-        </p:blipFill>
-        <p:spPr>
-          <a:xfrm>
-            <a:off x="6308458" y="3136565"/>
-            <a:ext cx="784448" cy="784448"/>
-          </a:xfrm>
-          <a:prstGeom prst="rect">
-            <a:avLst/>
-          </a:prstGeom>
-        </p:spPr>
-      </p:pic>
-      <p:pic>
-        <p:nvPicPr>
-          <p:cNvPr id="7" name="Content Placeholder 6"/>
-          <p:cNvPicPr>
-            <a:picLocks noGrp="1" noChangeAspect="1"/>
-          </p:cNvPicPr>
-          <p:nvPr>
-            <p:ph sz="half" idx="1"/>
-          </p:nvPr>
-        </p:nvPicPr>
-        <p:blipFill>
-          <a:blip r:embed="rId4">
-            <a:extLst>
-              <a:ext uri="{28A0092B-C50C-407E-A947-70E740481C1C}">
-                <a14:useLocalDpi xmlns:a14="http://schemas.microsoft.com/office/drawing/2010/main" val="0"/>
-              </a:ext>
-            </a:extLst>
-          </a:blip>
-          <a:stretch>
-            <a:fillRect/>
-          </a:stretch>
-        </p:blipFill>
-        <p:spPr>
-          <a:xfrm>
-            <a:off x="1253331" y="1825625"/>
-            <a:ext cx="4351338" cy="4351338"/>
-          </a:xfrm>
-        </p:spPr>
-      </p:pic>
-      <p:sp>
-        <p:nvSpPr>
-          <p:cNvPr id="2" name="Title 1"/>
-          <p:cNvSpPr>
-            <a:spLocks noGrp="1"/>
-          </p:cNvSpPr>
-          <p:nvPr>
-            <p:ph type="title"/>
-          </p:nvPr>
-        </p:nvSpPr>
-        <p:spPr/>
-        <p:txBody>
-          <a:bodyPr/>
-          <a:lstStyle/>
-          <a:p>
-            <a:r>
-              <a:rPr lang="en-US" dirty="0"/>
-              <a:t>Thank you!</a:t>
-            </a:r>
-          </a:p>
-        </p:txBody>
-      </p:sp>
-      <p:sp>
-        <p:nvSpPr>
-          <p:cNvPr id="3" name="Content Placeholder 2"/>
-          <p:cNvSpPr>
-            <a:spLocks noGrp="1"/>
-          </p:cNvSpPr>
-          <p:nvPr>
-            <p:ph sz="half" idx="2"/>
-          </p:nvPr>
-        </p:nvSpPr>
-        <p:spPr/>
-        <p:txBody>
-          <a:bodyPr>
-            <a:normAutofit fontScale="85000" lnSpcReduction="20000"/>
-          </a:bodyPr>
-          <a:lstStyle/>
-          <a:p>
-            <a:pPr marL="0" indent="0">
-              <a:buNone/>
-            </a:pPr>
-            <a:r>
-              <a:rPr lang="en-US" dirty="0"/>
-              <a:t>	</a:t>
-            </a:r>
-          </a:p>
-          <a:p>
-            <a:pPr marL="0" indent="0">
-              <a:buNone/>
-            </a:pPr>
-            <a:r>
-              <a:rPr lang="en-US" dirty="0"/>
-              <a:t>	@Scott_Addie</a:t>
-            </a:r>
-          </a:p>
-          <a:p>
-            <a:pPr marL="0" indent="0">
-              <a:buNone/>
-            </a:pPr>
-            <a:endParaRPr lang="en-US" dirty="0"/>
-          </a:p>
-          <a:p>
-            <a:pPr marL="0" indent="0">
-              <a:buNone/>
-            </a:pPr>
-            <a:r>
-              <a:rPr lang="en-US" dirty="0"/>
-              <a:t>	</a:t>
-            </a:r>
-          </a:p>
-          <a:p>
-            <a:pPr marL="0" indent="0">
-              <a:buNone/>
-            </a:pPr>
-            <a:r>
-              <a:rPr lang="en-US" dirty="0"/>
-              <a:t>	docs.asp.net</a:t>
-            </a:r>
-          </a:p>
-          <a:p>
-            <a:pPr marL="0" indent="0">
-              <a:buNone/>
-            </a:pPr>
-            <a:endParaRPr lang="en-US" dirty="0"/>
-          </a:p>
-          <a:p>
-            <a:pPr marL="0" indent="0">
-              <a:buNone/>
-            </a:pPr>
-            <a:r>
-              <a:rPr lang="en-US" sz="2400" dirty="0"/>
-              <a:t>	</a:t>
-            </a:r>
-          </a:p>
-          <a:p>
-            <a:pPr marL="0" indent="0">
-              <a:buNone/>
-            </a:pPr>
-            <a:r>
-              <a:rPr lang="en-US" sz="2400" dirty="0"/>
-              <a:t>	</a:t>
-            </a:r>
-            <a:r>
-              <a:rPr lang="en-US" dirty="0"/>
-              <a:t>github.com/</a:t>
-            </a:r>
-            <a:r>
-              <a:rPr lang="en-US" dirty="0" err="1"/>
-              <a:t>scottaddie</a:t>
-            </a:r>
-            <a:endParaRPr lang="en-US" dirty="0"/>
-          </a:p>
-          <a:p>
-            <a:pPr lvl="3"/>
-            <a:r>
-              <a:rPr lang="en-US" sz="2600" dirty="0"/>
-              <a:t>/</a:t>
-            </a:r>
-            <a:r>
-              <a:rPr lang="en-US" sz="2600" dirty="0" err="1"/>
-              <a:t>TagHelpersDemo</a:t>
-            </a:r>
-            <a:endParaRPr lang="en-US" sz="2600" dirty="0"/>
-          </a:p>
-          <a:p>
-            <a:pPr lvl="3"/>
-            <a:r>
-              <a:rPr lang="en-US" sz="2600" dirty="0"/>
-              <a:t>/</a:t>
-            </a:r>
-            <a:r>
-              <a:rPr lang="en-US" sz="2600" dirty="0" err="1"/>
-              <a:t>ViewComponentsDemo</a:t>
-            </a:r>
-            <a:endParaRPr lang="en-US" sz="2600" dirty="0"/>
-          </a:p>
-          <a:p>
-            <a:pPr marL="0" indent="0">
-              <a:buNone/>
-            </a:pPr>
-            <a:r>
-              <a:rPr lang="en-US" dirty="0"/>
-              <a:t>			</a:t>
-            </a:r>
-          </a:p>
-          <a:p>
-            <a:pPr marL="0" indent="0">
-              <a:buNone/>
-            </a:pPr>
-            <a:r>
-              <a:rPr lang="en-US" dirty="0"/>
-              <a:t>	</a:t>
-            </a:r>
-          </a:p>
-          <a:p>
-            <a:pPr marL="0" indent="0">
-              <a:buNone/>
-            </a:pPr>
-            <a:endParaRPr lang="en-US" dirty="0"/>
-          </a:p>
-        </p:txBody>
-      </p:sp>
-      <p:pic>
-        <p:nvPicPr>
-          <p:cNvPr id="8" name="Picture 7"/>
-          <p:cNvPicPr>
-            <a:picLocks noChangeAspect="1"/>
-          </p:cNvPicPr>
-          <p:nvPr/>
-        </p:nvPicPr>
-        <p:blipFill>
-          <a:blip r:embed="rId5" cstate="print">
-            <a:extLst>
-              <a:ext uri="{28A0092B-C50C-407E-A947-70E740481C1C}">
-                <a14:useLocalDpi xmlns:a14="http://schemas.microsoft.com/office/drawing/2010/main" val="0"/>
-              </a:ext>
-            </a:extLst>
-          </a:blip>
-          <a:stretch>
-            <a:fillRect/>
-          </a:stretch>
-        </p:blipFill>
-        <p:spPr>
-          <a:xfrm>
-            <a:off x="6402414" y="1996977"/>
-            <a:ext cx="682893" cy="555188"/>
-          </a:xfrm>
-          <a:prstGeom prst="rect">
-            <a:avLst/>
-          </a:prstGeom>
-        </p:spPr>
-      </p:pic>
-      <p:pic>
-        <p:nvPicPr>
-          <p:cNvPr id="9" name="Picture 2" descr="http://www.freeiconspng.com/uploads/github-logo-icon-30.png"/>
-          <p:cNvPicPr>
-            <a:picLocks noChangeAspect="1" noChangeArrowheads="1"/>
-          </p:cNvPicPr>
-          <p:nvPr/>
-        </p:nvPicPr>
-        <p:blipFill>
-          <a:blip r:embed="rId6">
-            <a:lum bright="70000" contrast="-70000"/>
-            <a:extLst>
-              <a:ext uri="{28A0092B-C50C-407E-A947-70E740481C1C}">
-                <a14:useLocalDpi xmlns:a14="http://schemas.microsoft.com/office/drawing/2010/main" val="0"/>
-              </a:ext>
-            </a:extLst>
-          </a:blip>
-          <a:srcRect/>
-          <a:stretch>
-            <a:fillRect/>
-          </a:stretch>
-        </p:blipFill>
-        <p:spPr bwMode="auto">
-          <a:xfrm>
-            <a:off x="6244128" y="4294173"/>
-            <a:ext cx="913109" cy="913109"/>
-          </a:xfrm>
-          <a:prstGeom prst="rect">
-            <a:avLst/>
-          </a:prstGeom>
-          <a:noFill/>
-          <a:extLst>
-            <a:ext uri="{909E8E84-426E-40DD-AFC4-6F175D3DCCD1}">
-              <a14:hiddenFill xmlns:a14="http://schemas.microsoft.com/office/drawing/2010/main">
-                <a:solidFill>
-                  <a:srgbClr val="FFFFFF"/>
-                </a:solidFill>
-              </a14:hiddenFill>
-            </a:ext>
-          </a:extLst>
-        </p:spPr>
-      </p:pic>
-      <p:sp>
-        <p:nvSpPr>
-          <p:cNvPr id="4" name="Rectangle 3">
-            <a:extLst>
-              <a:ext uri="{FF2B5EF4-FFF2-40B4-BE49-F238E27FC236}">
-                <a16:creationId xmlns:a16="http://schemas.microsoft.com/office/drawing/2014/main" id="{BDF1DB61-52BC-433D-8E37-0461B9F5B283}"/>
-              </a:ext>
-            </a:extLst>
-          </p:cNvPr>
-          <p:cNvSpPr/>
-          <p:nvPr/>
-        </p:nvSpPr>
-        <p:spPr>
-          <a:xfrm>
-            <a:off x="1977227" y="5746471"/>
-            <a:ext cx="2533066" cy="461665"/>
-          </a:xfrm>
-          <a:prstGeom prst="rect">
-            <a:avLst/>
-          </a:prstGeom>
-        </p:spPr>
-        <p:txBody>
-          <a:bodyPr wrap="none">
-            <a:spAutoFit/>
-          </a:bodyPr>
-          <a:lstStyle/>
-          <a:p>
-            <a:r>
-              <a:rPr lang="en-US" sz="2400" b="1" dirty="0">
-                <a:ln w="9525">
-                  <a:solidFill>
-                    <a:schemeClr val="bg1"/>
-                  </a:solidFill>
-                  <a:prstDash val="solid"/>
-                </a:ln>
-                <a:solidFill>
-                  <a:schemeClr val="bg1"/>
-                </a:solidFill>
-                <a:effectLst>
-                  <a:outerShdw blurRad="12700" dist="38100" dir="2700000" algn="tl" rotWithShape="0">
-                    <a:schemeClr val="accent5">
-                      <a:lumMod val="60000"/>
-                      <a:lumOff val="40000"/>
-                    </a:schemeClr>
-                  </a:outerShdw>
-                </a:effectLst>
-              </a:rPr>
-              <a:t>     bit.ly/2p7eimM</a:t>
-            </a:r>
-            <a:endParaRPr lang="en-US" sz="2400" dirty="0"/>
-          </a:p>
-        </p:txBody>
-      </p:sp>
     </p:spTree>
     <p:extLst>
       <p:ext uri="{BB962C8B-B14F-4D97-AF65-F5344CB8AC3E}">
@@ -18890,7 +18553,7 @@
                 <a:gridCol w="10416310">
                   <a:extLst>
                     <a:ext uri="{9D8B030D-6E8A-4147-A177-3AD203B41FA5}">
-                      <a16:colId xmlns:a16="http://schemas.microsoft.com/office/drawing/2014/main" val="1057070397"/>
+                      <a16:colId xmlns:a16="http://schemas.microsoft.com/office/drawing/2014/main" xmlns="" val="1057070397"/>
                     </a:ext>
                   </a:extLst>
                 </a:gridCol>
@@ -19040,7 +18703,7 @@
                 </a:tc>
                 <a:extLst>
                   <a:ext uri="{0D108BD9-81ED-4DB2-BD59-A6C34878D82A}">
-                    <a16:rowId xmlns:a16="http://schemas.microsoft.com/office/drawing/2014/main" val="3473222697"/>
+                    <a16:rowId xmlns:a16="http://schemas.microsoft.com/office/drawing/2014/main" xmlns="" val="3473222697"/>
                   </a:ext>
                 </a:extLst>
               </a:tr>
@@ -19095,7 +18758,7 @@
           <p:cNvPr id="4" name="Star: 12 Points 3">
             <a:extLst>
               <a:ext uri="{FF2B5EF4-FFF2-40B4-BE49-F238E27FC236}">
-                <a16:creationId xmlns:a16="http://schemas.microsoft.com/office/drawing/2014/main" id="{DE2292C5-9764-4416-991B-EDD49197C685}"/>
+                <a16:creationId xmlns:a16="http://schemas.microsoft.com/office/drawing/2014/main" xmlns="" id="{DE2292C5-9764-4416-991B-EDD49197C685}"/>
               </a:ext>
             </a:extLst>
           </p:cNvPr>
@@ -19651,7 +19314,7 @@
                 <a:gridCol w="10416310">
                   <a:extLst>
                     <a:ext uri="{9D8B030D-6E8A-4147-A177-3AD203B41FA5}">
-                      <a16:colId xmlns:a16="http://schemas.microsoft.com/office/drawing/2014/main" val="1057070397"/>
+                      <a16:colId xmlns:a16="http://schemas.microsoft.com/office/drawing/2014/main" xmlns="" val="1057070397"/>
                     </a:ext>
                   </a:extLst>
                 </a:gridCol>
@@ -19864,7 +19527,7 @@
                 </a:tc>
                 <a:extLst>
                   <a:ext uri="{0D108BD9-81ED-4DB2-BD59-A6C34878D82A}">
-                    <a16:rowId xmlns:a16="http://schemas.microsoft.com/office/drawing/2014/main" val="3473222697"/>
+                    <a16:rowId xmlns:a16="http://schemas.microsoft.com/office/drawing/2014/main" xmlns="" val="3473222697"/>
                   </a:ext>
                 </a:extLst>
               </a:tr>
@@ -19919,7 +19582,7 @@
           <p:cNvPr id="6" name="Star: 12 Points 5">
             <a:extLst>
               <a:ext uri="{FF2B5EF4-FFF2-40B4-BE49-F238E27FC236}">
-                <a16:creationId xmlns:a16="http://schemas.microsoft.com/office/drawing/2014/main" id="{97450780-50A5-4398-AF1F-02BB82FF4B25}"/>
+                <a16:creationId xmlns:a16="http://schemas.microsoft.com/office/drawing/2014/main" xmlns="" id="{97450780-50A5-4398-AF1F-02BB82FF4B25}"/>
               </a:ext>
             </a:extLst>
           </p:cNvPr>
@@ -20656,7 +20319,7 @@
           <p:cNvPr id="4" name="Star: 12 Points 3">
             <a:extLst>
               <a:ext uri="{FF2B5EF4-FFF2-40B4-BE49-F238E27FC236}">
-                <a16:creationId xmlns:a16="http://schemas.microsoft.com/office/drawing/2014/main" id="{B4607067-2C80-45AB-BAE2-1172211A0728}"/>
+                <a16:creationId xmlns:a16="http://schemas.microsoft.com/office/drawing/2014/main" xmlns="" id="{B4607067-2C80-45AB-BAE2-1172211A0728}"/>
               </a:ext>
             </a:extLst>
           </p:cNvPr>
@@ -21145,7 +20808,7 @@
                 <a:gridCol w="10416310">
                   <a:extLst>
                     <a:ext uri="{9D8B030D-6E8A-4147-A177-3AD203B41FA5}">
-                      <a16:colId xmlns:a16="http://schemas.microsoft.com/office/drawing/2014/main" val="1057070397"/>
+                      <a16:colId xmlns:a16="http://schemas.microsoft.com/office/drawing/2014/main" xmlns="" val="1057070397"/>
                     </a:ext>
                   </a:extLst>
                 </a:gridCol>
@@ -21315,7 +20978,7 @@
                 </a:tc>
                 <a:extLst>
                   <a:ext uri="{0D108BD9-81ED-4DB2-BD59-A6C34878D82A}">
-                    <a16:rowId xmlns:a16="http://schemas.microsoft.com/office/drawing/2014/main" val="3473222697"/>
+                    <a16:rowId xmlns:a16="http://schemas.microsoft.com/office/drawing/2014/main" xmlns="" val="3473222697"/>
                   </a:ext>
                 </a:extLst>
               </a:tr>
@@ -21909,7 +21572,7 @@
                 <a:gridCol w="10416310">
                   <a:extLst>
                     <a:ext uri="{9D8B030D-6E8A-4147-A177-3AD203B41FA5}">
-                      <a16:colId xmlns:a16="http://schemas.microsoft.com/office/drawing/2014/main" val="1057070397"/>
+                      <a16:colId xmlns:a16="http://schemas.microsoft.com/office/drawing/2014/main" xmlns="" val="1057070397"/>
                     </a:ext>
                   </a:extLst>
                 </a:gridCol>
@@ -22328,7 +21991,7 @@
                 </a:tc>
                 <a:extLst>
                   <a:ext uri="{0D108BD9-81ED-4DB2-BD59-A6C34878D82A}">
-                    <a16:rowId xmlns:a16="http://schemas.microsoft.com/office/drawing/2014/main" val="3473222697"/>
+                    <a16:rowId xmlns:a16="http://schemas.microsoft.com/office/drawing/2014/main" xmlns="" val="3473222697"/>
                   </a:ext>
                 </a:extLst>
               </a:tr>

</xml_diff>

<commit_message>
Shorten title on 1st slide
</commit_message>
<xml_diff>
--- a/Building Reusable UI Components in ASP.NET Core MVC.pptx
+++ b/Building Reusable UI Components in ASP.NET Core MVC.pptx
@@ -11638,8 +11638,13 @@
             </a:br>
             <a:r>
               <a:rPr lang="en-US" sz="4000" b="1" dirty="0"/>
-              <a:t>in ASP.NET Core MVC</a:t>
-            </a:r>
+              <a:t>in ASP.</a:t>
+            </a:r>
+            <a:r>
+              <a:rPr lang="en-US" sz="4000" b="1"/>
+              <a:t>NET Core</a:t>
+            </a:r>
+            <a:endParaRPr lang="en-US" sz="4000" b="1" dirty="0"/>
           </a:p>
         </p:txBody>
       </p:sp>

</xml_diff>

<commit_message>
Add better Tag Helpers anatomy example
</commit_message>
<xml_diff>
--- a/Building Reusable UI Components in ASP.NET Core MVC.pptx
+++ b/Building Reusable UI Components in ASP.NET Core MVC.pptx
@@ -19355,7 +19355,7 @@
           <p:nvPr>
             <p:extLst>
               <p:ext uri="{D42A27DB-BD31-4B8C-83A1-F6EECF244321}">
-                <p14:modId xmlns:p14="http://schemas.microsoft.com/office/powerpoint/2010/main" val="3752173427"/>
+                <p14:modId xmlns:p14="http://schemas.microsoft.com/office/powerpoint/2010/main" val="1766291267"/>
               </p:ext>
             </p:extLst>
           </p:nvPr>
@@ -19379,7 +19379,7 @@
                   </a:extLst>
                 </a:gridCol>
               </a:tblGrid>
-              <a:tr h="584446">
+              <a:tr h="644812">
                 <a:tc>
                   <a:txBody>
                     <a:bodyPr/>
@@ -20821,25 +20821,6 @@
           </a:p>
         </p:txBody>
       </p:sp>
-      <p:sp>
-        <p:nvSpPr>
-          <p:cNvPr id="3" name="Content Placeholder 2"/>
-          <p:cNvSpPr>
-            <a:spLocks noGrp="1"/>
-          </p:cNvSpPr>
-          <p:nvPr>
-            <p:ph idx="1"/>
-          </p:nvPr>
-        </p:nvSpPr>
-        <p:spPr/>
-        <p:txBody>
-          <a:bodyPr/>
-          <a:lstStyle/>
-          <a:p>
-            <a:endParaRPr lang="en-US" dirty="0"/>
-          </a:p>
-        </p:txBody>
-      </p:sp>
       <p:graphicFrame>
         <p:nvGraphicFramePr>
           <p:cNvPr id="4" name="Table 3"/>
@@ -20849,14 +20830,14 @@
           <p:nvPr>
             <p:extLst>
               <p:ext uri="{D42A27DB-BD31-4B8C-83A1-F6EECF244321}">
-                <p14:modId xmlns:p14="http://schemas.microsoft.com/office/powerpoint/2010/main" val="1064688232"/>
+                <p14:modId xmlns:p14="http://schemas.microsoft.com/office/powerpoint/2010/main" val="826585555"/>
               </p:ext>
             </p:extLst>
           </p:nvPr>
         </p:nvGraphicFramePr>
         <p:xfrm>
           <a:off x="937490" y="2272193"/>
-          <a:ext cx="10416310" cy="3831427"/>
+          <a:ext cx="10416310" cy="2604607"/>
         </p:xfrm>
         <a:graphic>
           <a:graphicData uri="http://schemas.openxmlformats.org/drawingml/2006/table">
@@ -20873,14 +20854,14 @@
                   </a:extLst>
                 </a:gridCol>
               </a:tblGrid>
-              <a:tr h="3831427">
+              <a:tr h="2604607">
                 <a:tc>
                   <a:txBody>
                     <a:bodyPr/>
                     <a:lstStyle/>
                     <a:p>
                       <a:r>
-                        <a:rPr lang="en-US" sz="2000" dirty="0">
+                        <a:rPr lang="en-US" sz="2000" b="0" dirty="0">
                           <a:solidFill>
                             <a:srgbClr val="0000FF"/>
                           </a:solidFill>
@@ -20889,13 +20870,13 @@
                         <a:t>&lt;</a:t>
                       </a:r>
                       <a:r>
-                        <a:rPr lang="en-US" sz="2000" b="1" dirty="0">
+                        <a:rPr lang="en-US" sz="2000" b="1" dirty="0" err="1">
                           <a:solidFill>
                             <a:srgbClr val="800080"/>
                           </a:solidFill>
                           <a:latin typeface="Consolas" panose="020B0609020204030204" pitchFamily="49" charset="0"/>
                         </a:rPr>
-                        <a:t>label</a:t>
+                        <a:t>img</a:t>
                       </a:r>
                       <a:r>
                         <a:rPr lang="en-US" sz="2000" b="0" dirty="0">
@@ -20907,13 +20888,13 @@
                         <a:t> </a:t>
                       </a:r>
                       <a:r>
-                        <a:rPr lang="en-US" sz="2000" b="0" dirty="0">
+                        <a:rPr lang="en-US" sz="2000" b="1" dirty="0" err="1">
                           <a:solidFill>
-                            <a:srgbClr val="FF0000"/>
+                            <a:srgbClr val="800080"/>
                           </a:solidFill>
                           <a:latin typeface="Consolas" panose="020B0609020204030204" pitchFamily="49" charset="0"/>
                         </a:rPr>
-                        <a:t>class</a:t>
+                        <a:t>src</a:t>
                       </a:r>
                       <a:r>
                         <a:rPr lang="en-US" sz="2000" b="0" dirty="0">
@@ -20922,7 +20903,7 @@
                           </a:solidFill>
                           <a:latin typeface="Consolas" panose="020B0609020204030204" pitchFamily="49" charset="0"/>
                         </a:rPr>
-                        <a:t>="caption"</a:t>
+                        <a:t>="~/images/banner1.svg"</a:t>
                       </a:r>
                       <a:r>
                         <a:rPr lang="en-US" sz="2000" b="0" dirty="0">
@@ -20940,7 +20921,7 @@
                           </a:solidFill>
                           <a:latin typeface="Consolas" panose="020B0609020204030204" pitchFamily="49" charset="0"/>
                         </a:rPr>
-                        <a:t>asp-for</a:t>
+                        <a:t>asp-append-version</a:t>
                       </a:r>
                       <a:r>
                         <a:rPr lang="en-US" sz="2000" b="0" dirty="0">
@@ -20949,25 +20930,7 @@
                           </a:solidFill>
                           <a:latin typeface="Consolas" panose="020B0609020204030204" pitchFamily="49" charset="0"/>
                         </a:rPr>
-                        <a:t>="</a:t>
-                      </a:r>
-                      <a:r>
-                        <a:rPr lang="en-US" sz="2000" b="0" dirty="0" err="1">
-                          <a:solidFill>
-                            <a:srgbClr val="000000"/>
-                          </a:solidFill>
-                          <a:latin typeface="Consolas" panose="020B0609020204030204" pitchFamily="49" charset="0"/>
-                        </a:rPr>
-                        <a:t>FirstName</a:t>
-                      </a:r>
-                      <a:r>
-                        <a:rPr lang="en-US" sz="2000" b="0" dirty="0">
-                          <a:solidFill>
-                            <a:srgbClr val="0000FF"/>
-                          </a:solidFill>
-                          <a:latin typeface="Consolas" panose="020B0609020204030204" pitchFamily="49" charset="0"/>
-                        </a:rPr>
-                        <a:t>"</a:t>
+                        <a:t>="true"</a:t>
                       </a:r>
                       <a:r>
                         <a:rPr lang="en-US" sz="2000" b="0" dirty="0">
@@ -21173,13 +21136,15 @@
       <p:cxnSp>
         <p:nvCxnSpPr>
           <p:cNvPr id="11" name="Straight Arrow Connector 10"/>
-          <p:cNvCxnSpPr/>
+          <p:cNvCxnSpPr>
+            <a:cxnSpLocks/>
+          </p:cNvCxnSpPr>
           <p:nvPr/>
         </p:nvCxnSpPr>
         <p:spPr>
           <a:xfrm flipH="1" flipV="1">
-            <a:off x="1623060" y="2651760"/>
-            <a:ext cx="933828" cy="1000442"/>
+            <a:off x="1406236" y="2651760"/>
+            <a:ext cx="1150652" cy="1000442"/>
           </a:xfrm>
           <a:prstGeom prst="straightConnector1">
             <a:avLst/>
@@ -21213,9 +21178,9 @@
           <p:nvPr/>
         </p:nvCxnSpPr>
         <p:spPr>
-          <a:xfrm flipH="1" flipV="1">
-            <a:off x="4792980" y="2651760"/>
-            <a:ext cx="1055748" cy="1000442"/>
+          <a:xfrm flipV="1">
+            <a:off x="5848728" y="2651760"/>
+            <a:ext cx="0" cy="1000442"/>
           </a:xfrm>
           <a:prstGeom prst="straightConnector1">
             <a:avLst/>
@@ -21247,7 +21212,7 @@
         </p:nvSpPr>
         <p:spPr>
           <a:xfrm>
-            <a:off x="2889568" y="4875927"/>
+            <a:off x="2889568" y="4266332"/>
             <a:ext cx="2900800" cy="446567"/>
           </a:xfrm>
           <a:prstGeom prst="rect">
@@ -21285,13 +21250,14 @@
           <p:cNvPr id="16" name="Straight Arrow Connector 15"/>
           <p:cNvCxnSpPr>
             <a:cxnSpLocks/>
+            <a:stCxn id="15" idx="0"/>
           </p:cNvCxnSpPr>
           <p:nvPr/>
         </p:nvCxnSpPr>
         <p:spPr>
           <a:xfrm flipH="1" flipV="1">
-            <a:off x="2381628" y="2651760"/>
-            <a:ext cx="1967056" cy="2224168"/>
+            <a:off x="2102885" y="2651760"/>
+            <a:ext cx="2237083" cy="1614572"/>
           </a:xfrm>
           <a:prstGeom prst="straightConnector1">
             <a:avLst/>
@@ -21315,6 +21281,274 @@
           </a:fontRef>
         </p:style>
       </p:cxnSp>
+      <p:graphicFrame>
+        <p:nvGraphicFramePr>
+          <p:cNvPr id="18" name="Table 17">
+            <a:extLst>
+              <a:ext uri="{FF2B5EF4-FFF2-40B4-BE49-F238E27FC236}">
+                <a16:creationId xmlns:a16="http://schemas.microsoft.com/office/drawing/2014/main" id="{36B03AC6-093F-48B6-8232-D38FB9E41216}"/>
+              </a:ext>
+            </a:extLst>
+          </p:cNvPr>
+          <p:cNvGraphicFramePr>
+            <a:graphicFrameLocks noGrp="1"/>
+          </p:cNvGraphicFramePr>
+          <p:nvPr>
+            <p:extLst>
+              <p:ext uri="{D42A27DB-BD31-4B8C-83A1-F6EECF244321}">
+                <p14:modId xmlns:p14="http://schemas.microsoft.com/office/powerpoint/2010/main" val="2651944439"/>
+              </p:ext>
+            </p:extLst>
+          </p:nvPr>
+        </p:nvGraphicFramePr>
+        <p:xfrm>
+          <a:off x="2556888" y="5011737"/>
+          <a:ext cx="8732983" cy="1097280"/>
+        </p:xfrm>
+        <a:graphic>
+          <a:graphicData uri="http://schemas.openxmlformats.org/drawingml/2006/table">
+            <a:tbl>
+              <a:tblPr firstRow="1" bandRow="1">
+                <a:tableStyleId>{5C22544A-7EE6-4342-B048-85BDC9FD1C3A}</a:tableStyleId>
+              </a:tblPr>
+              <a:tblGrid>
+                <a:gridCol w="8732983">
+                  <a:extLst>
+                    <a:ext uri="{9D8B030D-6E8A-4147-A177-3AD203B41FA5}">
+                      <a16:colId xmlns:a16="http://schemas.microsoft.com/office/drawing/2014/main" val="1057070397"/>
+                    </a:ext>
+                  </a:extLst>
+                </a:gridCol>
+              </a:tblGrid>
+              <a:tr h="552962">
+                <a:tc>
+                  <a:txBody>
+                    <a:bodyPr/>
+                    <a:lstStyle/>
+                    <a:p>
+                      <a:r>
+                        <a:rPr lang="en-US" sz="2000" b="0" dirty="0">
+                          <a:solidFill>
+                            <a:srgbClr val="0000FF"/>
+                          </a:solidFill>
+                          <a:latin typeface="Consolas" panose="020B0609020204030204" pitchFamily="49" charset="0"/>
+                        </a:rPr>
+                        <a:t>&lt;</a:t>
+                      </a:r>
+                      <a:r>
+                        <a:rPr lang="en-US" sz="2000" b="1" dirty="0" err="1">
+                          <a:solidFill>
+                            <a:srgbClr val="800080"/>
+                          </a:solidFill>
+                          <a:latin typeface="Consolas" panose="020B0609020204030204" pitchFamily="49" charset="0"/>
+                        </a:rPr>
+                        <a:t>img</a:t>
+                      </a:r>
+                      <a:r>
+                        <a:rPr lang="en-US" sz="2000" b="0" dirty="0">
+                          <a:solidFill>
+                            <a:srgbClr val="000000"/>
+                          </a:solidFill>
+                          <a:latin typeface="Consolas" panose="020B0609020204030204" pitchFamily="49" charset="0"/>
+                        </a:rPr>
+                        <a:t> </a:t>
+                      </a:r>
+                      <a:r>
+                        <a:rPr lang="en-US" sz="2000" b="1" dirty="0" err="1">
+                          <a:solidFill>
+                            <a:srgbClr val="800080"/>
+                          </a:solidFill>
+                          <a:latin typeface="Consolas" panose="020B0609020204030204" pitchFamily="49" charset="0"/>
+                        </a:rPr>
+                        <a:t>src</a:t>
+                      </a:r>
+                      <a:r>
+                        <a:rPr lang="en-US" sz="2000" b="0" dirty="0">
+                          <a:solidFill>
+                            <a:srgbClr val="0000FF"/>
+                          </a:solidFill>
+                          <a:latin typeface="Consolas" panose="020B0609020204030204" pitchFamily="49" charset="0"/>
+                        </a:rPr>
+                        <a:t>="/images/banner1.svg</a:t>
+                      </a:r>
+                      <a:endParaRPr lang="en-US" sz="2000" dirty="0">
+                        <a:solidFill>
+                          <a:srgbClr val="0000FF"/>
+                        </a:solidFill>
+                        <a:latin typeface="Consolas" panose="020B0609020204030204" pitchFamily="49" charset="0"/>
+                      </a:endParaRPr>
+                    </a:p>
+                    <a:p>
+                      <a:r>
+                        <a:rPr lang="en-US" sz="2000" dirty="0">
+                          <a:solidFill>
+                            <a:srgbClr val="0000FF"/>
+                          </a:solidFill>
+                          <a:latin typeface="Consolas" panose="020B0609020204030204" pitchFamily="49" charset="0"/>
+                        </a:rPr>
+                        <a:t>?v=GaE_EmkeBf-yBbrJ26lpkGd4jkOSh1eVKJaNOw9I4uk</a:t>
+                      </a:r>
+                      <a:r>
+                        <a:rPr lang="en-US" sz="2000" b="0" dirty="0">
+                          <a:solidFill>
+                            <a:srgbClr val="0000FF"/>
+                          </a:solidFill>
+                          <a:latin typeface="Consolas" panose="020B0609020204030204" pitchFamily="49" charset="0"/>
+                        </a:rPr>
+                        <a:t>"&gt;</a:t>
+                      </a:r>
+                      <a:endParaRPr lang="en-US" sz="2000" b="0" dirty="0">
+                        <a:solidFill>
+                          <a:schemeClr val="bg1"/>
+                        </a:solidFill>
+                      </a:endParaRPr>
+                    </a:p>
+                  </a:txBody>
+                  <a:tcPr>
+                    <a:lnL w="12700" cap="flat" cmpd="sng" algn="ctr">
+                      <a:solidFill>
+                        <a:schemeClr val="tx1"/>
+                      </a:solidFill>
+                      <a:prstDash val="solid"/>
+                      <a:round/>
+                      <a:headEnd type="none" w="med" len="med"/>
+                      <a:tailEnd type="none" w="med" len="med"/>
+                    </a:lnL>
+                    <a:lnR w="12700" cap="flat" cmpd="sng" algn="ctr">
+                      <a:solidFill>
+                        <a:schemeClr val="tx1"/>
+                      </a:solidFill>
+                      <a:prstDash val="solid"/>
+                      <a:round/>
+                      <a:headEnd type="none" w="med" len="med"/>
+                      <a:tailEnd type="none" w="med" len="med"/>
+                    </a:lnR>
+                    <a:lnT w="12700" cap="flat" cmpd="sng" algn="ctr">
+                      <a:solidFill>
+                        <a:schemeClr val="tx1"/>
+                      </a:solidFill>
+                      <a:prstDash val="solid"/>
+                      <a:round/>
+                      <a:headEnd type="none" w="med" len="med"/>
+                      <a:tailEnd type="none" w="med" len="med"/>
+                    </a:lnT>
+                    <a:lnB w="12700" cap="flat" cmpd="sng" algn="ctr">
+                      <a:solidFill>
+                        <a:schemeClr val="tx1"/>
+                      </a:solidFill>
+                      <a:prstDash val="solid"/>
+                      <a:round/>
+                      <a:headEnd type="none" w="med" len="med"/>
+                      <a:tailEnd type="none" w="med" len="med"/>
+                    </a:lnB>
+                    <a:solidFill>
+                      <a:schemeClr val="tx1"/>
+                    </a:solidFill>
+                  </a:tcPr>
+                </a:tc>
+                <a:extLst>
+                  <a:ext uri="{0D108BD9-81ED-4DB2-BD59-A6C34878D82A}">
+                    <a16:rowId xmlns:a16="http://schemas.microsoft.com/office/drawing/2014/main" val="3473222697"/>
+                  </a:ext>
+                </a:extLst>
+              </a:tr>
+              <a:tr h="312543">
+                <a:tc>
+                  <a:txBody>
+                    <a:bodyPr/>
+                    <a:lstStyle/>
+                    <a:p>
+                      <a:endParaRPr lang="en-US" sz="2000" b="0" dirty="0">
+                        <a:solidFill>
+                          <a:schemeClr val="bg1"/>
+                        </a:solidFill>
+                      </a:endParaRPr>
+                    </a:p>
+                  </a:txBody>
+                  <a:tcPr>
+                    <a:lnL w="12700" cap="flat" cmpd="sng" algn="ctr">
+                      <a:solidFill>
+                        <a:schemeClr val="tx1"/>
+                      </a:solidFill>
+                      <a:prstDash val="solid"/>
+                      <a:round/>
+                      <a:headEnd type="none" w="med" len="med"/>
+                      <a:tailEnd type="none" w="med" len="med"/>
+                    </a:lnL>
+                    <a:lnR w="12700" cap="flat" cmpd="sng" algn="ctr">
+                      <a:solidFill>
+                        <a:schemeClr val="tx1"/>
+                      </a:solidFill>
+                      <a:prstDash val="solid"/>
+                      <a:round/>
+                      <a:headEnd type="none" w="med" len="med"/>
+                      <a:tailEnd type="none" w="med" len="med"/>
+                    </a:lnR>
+                    <a:lnT w="12700" cap="flat" cmpd="sng" algn="ctr">
+                      <a:solidFill>
+                        <a:schemeClr val="tx1"/>
+                      </a:solidFill>
+                      <a:prstDash val="solid"/>
+                      <a:round/>
+                      <a:headEnd type="none" w="med" len="med"/>
+                      <a:tailEnd type="none" w="med" len="med"/>
+                    </a:lnT>
+                    <a:lnB w="12700" cap="flat" cmpd="sng" algn="ctr">
+                      <a:solidFill>
+                        <a:schemeClr val="tx1"/>
+                      </a:solidFill>
+                      <a:prstDash val="solid"/>
+                      <a:round/>
+                      <a:headEnd type="none" w="med" len="med"/>
+                      <a:tailEnd type="none" w="med" len="med"/>
+                    </a:lnB>
+                    <a:solidFill>
+                      <a:schemeClr val="tx1"/>
+                    </a:solidFill>
+                  </a:tcPr>
+                </a:tc>
+                <a:extLst>
+                  <a:ext uri="{0D108BD9-81ED-4DB2-BD59-A6C34878D82A}">
+                    <a16:rowId xmlns:a16="http://schemas.microsoft.com/office/drawing/2014/main" val="4078901567"/>
+                  </a:ext>
+                </a:extLst>
+              </a:tr>
+            </a:tbl>
+          </a:graphicData>
+        </a:graphic>
+      </p:graphicFrame>
+      <p:pic>
+        <p:nvPicPr>
+          <p:cNvPr id="20" name="Content Placeholder 19">
+            <a:extLst>
+              <a:ext uri="{FF2B5EF4-FFF2-40B4-BE49-F238E27FC236}">
+                <a16:creationId xmlns:a16="http://schemas.microsoft.com/office/drawing/2014/main" id="{2778D535-092F-4A91-9BDC-A5D046EA84AD}"/>
+              </a:ext>
+            </a:extLst>
+          </p:cNvPr>
+          <p:cNvPicPr>
+            <a:picLocks noGrp="1" noChangeAspect="1"/>
+          </p:cNvPicPr>
+          <p:nvPr>
+            <p:ph idx="1"/>
+          </p:nvPr>
+        </p:nvPicPr>
+        <p:blipFill>
+          <a:blip r:embed="rId3"/>
+          <a:stretch>
+            <a:fillRect/>
+          </a:stretch>
+        </p:blipFill>
+        <p:spPr>
+          <a:xfrm>
+            <a:off x="773808" y="2736273"/>
+            <a:ext cx="1881599" cy="3311236"/>
+          </a:xfrm>
+          <a:prstGeom prst="rect">
+            <a:avLst/>
+          </a:prstGeom>
+        </p:spPr>
+      </p:pic>
     </p:spTree>
     <p:extLst>
       <p:ext uri="{BB962C8B-B14F-4D97-AF65-F5344CB8AC3E}">
@@ -21540,6 +21774,94 @@
                                         <p:strVal val="visible"/>
                                       </p:to>
                                     </p:set>
+                                  </p:childTnLst>
+                                </p:cTn>
+                              </p:par>
+                            </p:childTnLst>
+                          </p:cTn>
+                        </p:par>
+                      </p:childTnLst>
+                    </p:cTn>
+                  </p:par>
+                  <p:par>
+                    <p:cTn id="21" fill="hold">
+                      <p:stCondLst>
+                        <p:cond delay="indefinite"/>
+                      </p:stCondLst>
+                      <p:childTnLst>
+                        <p:par>
+                          <p:cTn id="22" fill="hold">
+                            <p:stCondLst>
+                              <p:cond delay="0"/>
+                            </p:stCondLst>
+                            <p:childTnLst>
+                              <p:par>
+                                <p:cTn id="23" presetID="22" presetClass="entr" presetSubtype="1" fill="hold" nodeType="clickEffect">
+                                  <p:stCondLst>
+                                    <p:cond delay="0"/>
+                                  </p:stCondLst>
+                                  <p:childTnLst>
+                                    <p:set>
+                                      <p:cBhvr>
+                                        <p:cTn id="24" dur="1" fill="hold">
+                                          <p:stCondLst>
+                                            <p:cond delay="0"/>
+                                          </p:stCondLst>
+                                        </p:cTn>
+                                        <p:tgtEl>
+                                          <p:spTgt spid="20"/>
+                                        </p:tgtEl>
+                                        <p:attrNameLst>
+                                          <p:attrName>style.visibility</p:attrName>
+                                        </p:attrNameLst>
+                                      </p:cBhvr>
+                                      <p:to>
+                                        <p:strVal val="visible"/>
+                                      </p:to>
+                                    </p:set>
+                                    <p:animEffect transition="in" filter="wipe(up)">
+                                      <p:cBhvr>
+                                        <p:cTn id="25" dur="500"/>
+                                        <p:tgtEl>
+                                          <p:spTgt spid="20"/>
+                                        </p:tgtEl>
+                                      </p:cBhvr>
+                                    </p:animEffect>
+                                  </p:childTnLst>
+                                </p:cTn>
+                              </p:par>
+                              <p:par>
+                                <p:cTn id="26" presetID="22" presetClass="entr" presetSubtype="1" fill="hold" nodeType="withEffect">
+                                  <p:stCondLst>
+                                    <p:cond delay="0"/>
+                                  </p:stCondLst>
+                                  <p:childTnLst>
+                                    <p:set>
+                                      <p:cBhvr>
+                                        <p:cTn id="27" dur="1" fill="hold">
+                                          <p:stCondLst>
+                                            <p:cond delay="0"/>
+                                          </p:stCondLst>
+                                        </p:cTn>
+                                        <p:tgtEl>
+                                          <p:spTgt spid="18"/>
+                                        </p:tgtEl>
+                                        <p:attrNameLst>
+                                          <p:attrName>style.visibility</p:attrName>
+                                        </p:attrNameLst>
+                                      </p:cBhvr>
+                                      <p:to>
+                                        <p:strVal val="visible"/>
+                                      </p:to>
+                                    </p:set>
+                                    <p:animEffect transition="in" filter="wipe(up)">
+                                      <p:cBhvr>
+                                        <p:cTn id="28" dur="500"/>
+                                        <p:tgtEl>
+                                          <p:spTgt spid="18"/>
+                                        </p:tgtEl>
+                                      </p:cBhvr>
+                                    </p:animEffect>
                                   </p:childTnLst>
                                 </p:cTn>
                               </p:par>

</xml_diff>

<commit_message>
Update view search paths
</commit_message>
<xml_diff>
--- a/Building Reusable UI Components in ASP.NET Core MVC.pptx
+++ b/Building Reusable UI Components in ASP.NET Core MVC.pptx
@@ -1390,7 +1390,7 @@
             </a:pPr>
             <a:r>
               <a:rPr lang="en-US" dirty="0"/>
-              <a:t>Runtime searches in 2 paths</a:t>
+              <a:t>Runtime searches in multiple paths</a:t>
             </a:r>
           </a:p>
           <a:p>
@@ -1401,6 +1401,16 @@
             <a:r>
               <a:rPr lang="en-US" dirty="0"/>
               <a:t>Views/Shared… is recommended path</a:t>
+            </a:r>
+          </a:p>
+          <a:p>
+            <a:pPr marL="628650" lvl="1" indent="-171450">
+              <a:buFontTx/>
+              <a:buChar char="-"/>
+            </a:pPr>
+            <a:r>
+              <a:rPr lang="en-US" dirty="0"/>
+              <a:t>Works in Areas folder too</a:t>
             </a:r>
           </a:p>
           <a:p>
@@ -1416,10 +1426,9 @@
               <a:buChar char="-"/>
             </a:pPr>
             <a:r>
-              <a:rPr lang="en-US"/>
+              <a:rPr lang="en-US" dirty="0"/>
               <a:t>Pages directory for Razor Pages apps (Pages/Shared in 2.1+ only)</a:t>
             </a:r>
-            <a:endParaRPr lang="en-US" dirty="0"/>
           </a:p>
         </p:txBody>
       </p:sp>
@@ -15153,204 +15162,6 @@
           <a:chExt cx="0" cy="0"/>
         </a:xfrm>
       </p:grpSpPr>
-      <p:sp>
-        <p:nvSpPr>
-          <p:cNvPr id="2" name="Title 1"/>
-          <p:cNvSpPr>
-            <a:spLocks noGrp="1"/>
-          </p:cNvSpPr>
-          <p:nvPr>
-            <p:ph type="title"/>
-          </p:nvPr>
-        </p:nvSpPr>
-        <p:spPr/>
-        <p:txBody>
-          <a:bodyPr/>
-          <a:lstStyle/>
-          <a:p>
-            <a:r>
-              <a:rPr lang="en-US" dirty="0"/>
-              <a:t>View Search Paths</a:t>
-            </a:r>
-          </a:p>
-        </p:txBody>
-      </p:sp>
-      <p:sp>
-        <p:nvSpPr>
-          <p:cNvPr id="3" name="Content Placeholder 2"/>
-          <p:cNvSpPr>
-            <a:spLocks noGrp="1"/>
-          </p:cNvSpPr>
-          <p:nvPr>
-            <p:ph idx="1"/>
-          </p:nvPr>
-        </p:nvSpPr>
-        <p:spPr/>
-        <p:txBody>
-          <a:bodyPr>
-            <a:normAutofit/>
-          </a:bodyPr>
-          <a:lstStyle/>
-          <a:p>
-            <a:r>
-              <a:rPr lang="en-US" dirty="0"/>
-              <a:t>Views/</a:t>
-            </a:r>
-            <a:r>
-              <a:rPr lang="en-US" dirty="0">
-                <a:solidFill>
-                  <a:srgbClr val="A0C0E5"/>
-                </a:solidFill>
-              </a:rPr>
-              <a:t>&lt;</a:t>
-            </a:r>
-            <a:r>
-              <a:rPr lang="en-US" dirty="0" err="1">
-                <a:solidFill>
-                  <a:srgbClr val="A0C0E5"/>
-                </a:solidFill>
-              </a:rPr>
-              <a:t>controller_name</a:t>
-            </a:r>
-            <a:r>
-              <a:rPr lang="en-US" dirty="0">
-                <a:solidFill>
-                  <a:srgbClr val="A0C0E5"/>
-                </a:solidFill>
-              </a:rPr>
-              <a:t>&gt;</a:t>
-            </a:r>
-            <a:r>
-              <a:rPr lang="en-US" dirty="0"/>
-              <a:t>/Components/</a:t>
-            </a:r>
-            <a:r>
-              <a:rPr lang="en-US" dirty="0">
-                <a:solidFill>
-                  <a:srgbClr val="A0C0E5"/>
-                </a:solidFill>
-              </a:rPr>
-              <a:t>&lt;</a:t>
-            </a:r>
-            <a:r>
-              <a:rPr lang="en-US" dirty="0" err="1">
-                <a:solidFill>
-                  <a:srgbClr val="A0C0E5"/>
-                </a:solidFill>
-              </a:rPr>
-              <a:t>vc_name</a:t>
-            </a:r>
-            <a:r>
-              <a:rPr lang="en-US" dirty="0">
-                <a:solidFill>
-                  <a:srgbClr val="A0C0E5"/>
-                </a:solidFill>
-              </a:rPr>
-              <a:t>&gt;</a:t>
-            </a:r>
-            <a:r>
-              <a:rPr lang="en-US" dirty="0"/>
-              <a:t>/</a:t>
-            </a:r>
-            <a:r>
-              <a:rPr lang="en-US" dirty="0">
-                <a:solidFill>
-                  <a:srgbClr val="A0C0E5"/>
-                </a:solidFill>
-              </a:rPr>
-              <a:t>&lt;</a:t>
-            </a:r>
-            <a:r>
-              <a:rPr lang="en-US" dirty="0" err="1">
-                <a:solidFill>
-                  <a:srgbClr val="A0C0E5"/>
-                </a:solidFill>
-              </a:rPr>
-              <a:t>view_name</a:t>
-            </a:r>
-            <a:r>
-              <a:rPr lang="en-US" dirty="0">
-                <a:solidFill>
-                  <a:srgbClr val="A0C0E5"/>
-                </a:solidFill>
-              </a:rPr>
-              <a:t>&gt;</a:t>
-            </a:r>
-          </a:p>
-          <a:p>
-            <a:r>
-              <a:rPr lang="en-US" dirty="0"/>
-              <a:t>Views/Shared/Components/</a:t>
-            </a:r>
-            <a:r>
-              <a:rPr lang="en-US" dirty="0">
-                <a:solidFill>
-                  <a:srgbClr val="A0C0E5"/>
-                </a:solidFill>
-              </a:rPr>
-              <a:t>&lt;</a:t>
-            </a:r>
-            <a:r>
-              <a:rPr lang="en-US" dirty="0" err="1">
-                <a:solidFill>
-                  <a:srgbClr val="A0C0E5"/>
-                </a:solidFill>
-              </a:rPr>
-              <a:t>vc_name</a:t>
-            </a:r>
-            <a:r>
-              <a:rPr lang="en-US" dirty="0">
-                <a:solidFill>
-                  <a:srgbClr val="A0C0E5"/>
-                </a:solidFill>
-              </a:rPr>
-              <a:t>&gt;</a:t>
-            </a:r>
-            <a:r>
-              <a:rPr lang="en-US" dirty="0"/>
-              <a:t>/</a:t>
-            </a:r>
-            <a:r>
-              <a:rPr lang="en-US" dirty="0">
-                <a:solidFill>
-                  <a:srgbClr val="A0C0E5"/>
-                </a:solidFill>
-              </a:rPr>
-              <a:t>&lt;</a:t>
-            </a:r>
-            <a:r>
-              <a:rPr lang="en-US" dirty="0" err="1">
-                <a:solidFill>
-                  <a:srgbClr val="A0C0E5"/>
-                </a:solidFill>
-              </a:rPr>
-              <a:t>view_name</a:t>
-            </a:r>
-            <a:r>
-              <a:rPr lang="en-US" dirty="0">
-                <a:solidFill>
-                  <a:srgbClr val="A0C0E5"/>
-                </a:solidFill>
-              </a:rPr>
-              <a:t>&gt;</a:t>
-            </a:r>
-          </a:p>
-          <a:p>
-            <a:endParaRPr lang="en-US" dirty="0"/>
-          </a:p>
-          <a:p>
-            <a:r>
-              <a:rPr lang="en-US" dirty="0"/>
-              <a:t>Default view = </a:t>
-            </a:r>
-            <a:r>
-              <a:rPr lang="en-US" b="1" i="1" dirty="0" err="1"/>
-              <a:t>Default.cshtml</a:t>
-            </a:r>
-            <a:endParaRPr lang="en-US" b="1" i="1" dirty="0"/>
-          </a:p>
-        </p:txBody>
-      </p:sp>
       <p:pic>
         <p:nvPicPr>
           <p:cNvPr id="8" name="Picture 7"/>
@@ -15410,6 +15221,252 @@
           </a:prstGeom>
         </p:spPr>
       </p:pic>
+      <p:sp>
+        <p:nvSpPr>
+          <p:cNvPr id="2" name="Title 1"/>
+          <p:cNvSpPr>
+            <a:spLocks noGrp="1"/>
+          </p:cNvSpPr>
+          <p:nvPr>
+            <p:ph type="title"/>
+          </p:nvPr>
+        </p:nvSpPr>
+        <p:spPr/>
+        <p:txBody>
+          <a:bodyPr/>
+          <a:lstStyle/>
+          <a:p>
+            <a:r>
+              <a:rPr lang="en-US" dirty="0"/>
+              <a:t>View Search Paths</a:t>
+            </a:r>
+          </a:p>
+        </p:txBody>
+      </p:sp>
+      <p:sp>
+        <p:nvSpPr>
+          <p:cNvPr id="3" name="Content Placeholder 2"/>
+          <p:cNvSpPr>
+            <a:spLocks noGrp="1"/>
+          </p:cNvSpPr>
+          <p:nvPr>
+            <p:ph idx="1"/>
+          </p:nvPr>
+        </p:nvSpPr>
+        <p:spPr/>
+        <p:txBody>
+          <a:bodyPr>
+            <a:normAutofit/>
+          </a:bodyPr>
+          <a:lstStyle/>
+          <a:p>
+            <a:pPr marL="0" indent="0">
+              <a:buNone/>
+            </a:pPr>
+            <a:r>
+              <a:rPr lang="en-US" b="1" dirty="0"/>
+              <a:t>Razor Pages</a:t>
+            </a:r>
+          </a:p>
+          <a:p>
+            <a:r>
+              <a:rPr lang="en-US" dirty="0"/>
+              <a:t>Pages/Components/</a:t>
+            </a:r>
+            <a:r>
+              <a:rPr lang="en-US" dirty="0">
+                <a:solidFill>
+                  <a:srgbClr val="A0C0E5"/>
+                </a:solidFill>
+              </a:rPr>
+              <a:t>&lt;</a:t>
+            </a:r>
+            <a:r>
+              <a:rPr lang="en-US" dirty="0" err="1">
+                <a:solidFill>
+                  <a:srgbClr val="A0C0E5"/>
+                </a:solidFill>
+              </a:rPr>
+              <a:t>vc_name</a:t>
+            </a:r>
+            <a:r>
+              <a:rPr lang="en-US" dirty="0">
+                <a:solidFill>
+                  <a:srgbClr val="A0C0E5"/>
+                </a:solidFill>
+              </a:rPr>
+              <a:t>&gt;</a:t>
+            </a:r>
+            <a:r>
+              <a:rPr lang="en-US" dirty="0"/>
+              <a:t>/</a:t>
+            </a:r>
+          </a:p>
+          <a:p>
+            <a:r>
+              <a:rPr lang="en-US" dirty="0"/>
+              <a:t>Pages/Shared/Components/</a:t>
+            </a:r>
+            <a:r>
+              <a:rPr lang="en-US" dirty="0">
+                <a:solidFill>
+                  <a:srgbClr val="A0C0E5"/>
+                </a:solidFill>
+              </a:rPr>
+              <a:t>&lt;</a:t>
+            </a:r>
+            <a:r>
+              <a:rPr lang="en-US" dirty="0" err="1">
+                <a:solidFill>
+                  <a:srgbClr val="A0C0E5"/>
+                </a:solidFill>
+              </a:rPr>
+              <a:t>vc_name</a:t>
+            </a:r>
+            <a:r>
+              <a:rPr lang="en-US" dirty="0">
+                <a:solidFill>
+                  <a:srgbClr val="A0C0E5"/>
+                </a:solidFill>
+              </a:rPr>
+              <a:t>&gt;</a:t>
+            </a:r>
+            <a:r>
+              <a:rPr lang="en-US" dirty="0"/>
+              <a:t>/</a:t>
+            </a:r>
+          </a:p>
+          <a:p>
+            <a:pPr marL="0" indent="0">
+              <a:buNone/>
+            </a:pPr>
+            <a:r>
+              <a:rPr lang="en-US" b="1" dirty="0"/>
+              <a:t>MVC</a:t>
+            </a:r>
+          </a:p>
+          <a:p>
+            <a:r>
+              <a:rPr lang="en-US" dirty="0"/>
+              <a:t>Views/</a:t>
+            </a:r>
+            <a:r>
+              <a:rPr lang="en-US" dirty="0">
+                <a:solidFill>
+                  <a:srgbClr val="A0C0E5"/>
+                </a:solidFill>
+              </a:rPr>
+              <a:t>&lt;</a:t>
+            </a:r>
+            <a:r>
+              <a:rPr lang="en-US" dirty="0" err="1">
+                <a:solidFill>
+                  <a:srgbClr val="A0C0E5"/>
+                </a:solidFill>
+              </a:rPr>
+              <a:t>controller_name</a:t>
+            </a:r>
+            <a:r>
+              <a:rPr lang="en-US" dirty="0">
+                <a:solidFill>
+                  <a:srgbClr val="A0C0E5"/>
+                </a:solidFill>
+              </a:rPr>
+              <a:t>&gt;</a:t>
+            </a:r>
+            <a:r>
+              <a:rPr lang="en-US" dirty="0"/>
+              <a:t>/Components/</a:t>
+            </a:r>
+            <a:r>
+              <a:rPr lang="en-US" dirty="0">
+                <a:solidFill>
+                  <a:srgbClr val="A0C0E5"/>
+                </a:solidFill>
+              </a:rPr>
+              <a:t>&lt;</a:t>
+            </a:r>
+            <a:r>
+              <a:rPr lang="en-US" dirty="0" err="1">
+                <a:solidFill>
+                  <a:srgbClr val="A0C0E5"/>
+                </a:solidFill>
+              </a:rPr>
+              <a:t>vc_name</a:t>
+            </a:r>
+            <a:r>
+              <a:rPr lang="en-US" dirty="0">
+                <a:solidFill>
+                  <a:srgbClr val="A0C0E5"/>
+                </a:solidFill>
+              </a:rPr>
+              <a:t>&gt;</a:t>
+            </a:r>
+            <a:r>
+              <a:rPr lang="en-US" dirty="0"/>
+              <a:t>/</a:t>
+            </a:r>
+            <a:endParaRPr lang="en-US" dirty="0">
+              <a:solidFill>
+                <a:srgbClr val="A0C0E5"/>
+              </a:solidFill>
+            </a:endParaRPr>
+          </a:p>
+          <a:p>
+            <a:r>
+              <a:rPr lang="en-US" dirty="0"/>
+              <a:t>Views/Shared/Components/</a:t>
+            </a:r>
+            <a:r>
+              <a:rPr lang="en-US" dirty="0">
+                <a:solidFill>
+                  <a:srgbClr val="A0C0E5"/>
+                </a:solidFill>
+              </a:rPr>
+              <a:t>&lt;</a:t>
+            </a:r>
+            <a:r>
+              <a:rPr lang="en-US" dirty="0" err="1">
+                <a:solidFill>
+                  <a:srgbClr val="A0C0E5"/>
+                </a:solidFill>
+              </a:rPr>
+              <a:t>vc_name</a:t>
+            </a:r>
+            <a:r>
+              <a:rPr lang="en-US" dirty="0">
+                <a:solidFill>
+                  <a:srgbClr val="A0C0E5"/>
+                </a:solidFill>
+              </a:rPr>
+              <a:t>&gt;</a:t>
+            </a:r>
+            <a:r>
+              <a:rPr lang="en-US" dirty="0"/>
+              <a:t>/</a:t>
+            </a:r>
+            <a:endParaRPr lang="en-US" dirty="0">
+              <a:solidFill>
+                <a:srgbClr val="A0C0E5"/>
+              </a:solidFill>
+            </a:endParaRPr>
+          </a:p>
+          <a:p>
+            <a:endParaRPr lang="en-US" dirty="0"/>
+          </a:p>
+          <a:p>
+            <a:r>
+              <a:rPr lang="en-US" dirty="0"/>
+              <a:t>Default view = </a:t>
+            </a:r>
+            <a:r>
+              <a:rPr lang="en-US" b="1" i="1" dirty="0" err="1"/>
+              <a:t>Default.cshtml</a:t>
+            </a:r>
+            <a:endParaRPr lang="en-US" b="1" i="1" dirty="0"/>
+          </a:p>
+        </p:txBody>
+      </p:sp>
     </p:spTree>
     <p:extLst>
       <p:ext uri="{BB962C8B-B14F-4D97-AF65-F5344CB8AC3E}">
@@ -15456,7 +15513,7 @@
                                         <p:tgtEl>
                                           <p:spTgt spid="3">
                                             <p:txEl>
-                                              <p:pRg st="0" end="0"/>
+                                              <p:pRg st="4" end="4"/>
                                             </p:txEl>
                                           </p:spTgt>
                                         </p:tgtEl>
@@ -15474,7 +15531,7 @@
                                         <p:tgtEl>
                                           <p:spTgt spid="3">
                                             <p:txEl>
-                                              <p:pRg st="0" end="0"/>
+                                              <p:pRg st="4" end="4"/>
                                             </p:txEl>
                                           </p:spTgt>
                                         </p:tgtEl>
@@ -15578,7 +15635,7 @@
                                         <p:tgtEl>
                                           <p:spTgt spid="3">
                                             <p:txEl>
-                                              <p:pRg st="3" end="3"/>
+                                              <p:pRg st="0" end="0"/>
                                             </p:txEl>
                                           </p:spTgt>
                                         </p:tgtEl>
@@ -15596,7 +15653,251 @@
                                         <p:tgtEl>
                                           <p:spTgt spid="3">
                                             <p:txEl>
+                                              <p:pRg st="0" end="0"/>
+                                            </p:txEl>
+                                          </p:spTgt>
+                                        </p:tgtEl>
+                                      </p:cBhvr>
+                                    </p:animEffect>
+                                  </p:childTnLst>
+                                </p:cTn>
+                              </p:par>
+                            </p:childTnLst>
+                          </p:cTn>
+                        </p:par>
+                      </p:childTnLst>
+                    </p:cTn>
+                  </p:par>
+                  <p:par>
+                    <p:cTn id="18" fill="hold">
+                      <p:stCondLst>
+                        <p:cond delay="indefinite"/>
+                      </p:stCondLst>
+                      <p:childTnLst>
+                        <p:par>
+                          <p:cTn id="19" fill="hold">
+                            <p:stCondLst>
+                              <p:cond delay="0"/>
+                            </p:stCondLst>
+                            <p:childTnLst>
+                              <p:par>
+                                <p:cTn id="20" presetID="10" presetClass="entr" presetSubtype="0" fill="hold" nodeType="clickEffect">
+                                  <p:stCondLst>
+                                    <p:cond delay="0"/>
+                                  </p:stCondLst>
+                                  <p:childTnLst>
+                                    <p:set>
+                                      <p:cBhvr>
+                                        <p:cTn id="21" dur="1" fill="hold">
+                                          <p:stCondLst>
+                                            <p:cond delay="0"/>
+                                          </p:stCondLst>
+                                        </p:cTn>
+                                        <p:tgtEl>
+                                          <p:spTgt spid="3">
+                                            <p:txEl>
+                                              <p:pRg st="2" end="2"/>
+                                            </p:txEl>
+                                          </p:spTgt>
+                                        </p:tgtEl>
+                                        <p:attrNameLst>
+                                          <p:attrName>style.visibility</p:attrName>
+                                        </p:attrNameLst>
+                                      </p:cBhvr>
+                                      <p:to>
+                                        <p:strVal val="visible"/>
+                                      </p:to>
+                                    </p:set>
+                                    <p:animEffect transition="in" filter="fade">
+                                      <p:cBhvr>
+                                        <p:cTn id="22" dur="500"/>
+                                        <p:tgtEl>
+                                          <p:spTgt spid="3">
+                                            <p:txEl>
+                                              <p:pRg st="2" end="2"/>
+                                            </p:txEl>
+                                          </p:spTgt>
+                                        </p:tgtEl>
+                                      </p:cBhvr>
+                                    </p:animEffect>
+                                  </p:childTnLst>
+                                </p:cTn>
+                              </p:par>
+                            </p:childTnLst>
+                          </p:cTn>
+                        </p:par>
+                      </p:childTnLst>
+                    </p:cTn>
+                  </p:par>
+                  <p:par>
+                    <p:cTn id="23" fill="hold">
+                      <p:stCondLst>
+                        <p:cond delay="indefinite"/>
+                      </p:stCondLst>
+                      <p:childTnLst>
+                        <p:par>
+                          <p:cTn id="24" fill="hold">
+                            <p:stCondLst>
+                              <p:cond delay="0"/>
+                            </p:stCondLst>
+                            <p:childTnLst>
+                              <p:par>
+                                <p:cTn id="25" presetID="10" presetClass="entr" presetSubtype="0" fill="hold" nodeType="clickEffect">
+                                  <p:stCondLst>
+                                    <p:cond delay="0"/>
+                                  </p:stCondLst>
+                                  <p:childTnLst>
+                                    <p:set>
+                                      <p:cBhvr>
+                                        <p:cTn id="26" dur="1" fill="hold">
+                                          <p:stCondLst>
+                                            <p:cond delay="0"/>
+                                          </p:stCondLst>
+                                        </p:cTn>
+                                        <p:tgtEl>
+                                          <p:spTgt spid="3">
+                                            <p:txEl>
                                               <p:pRg st="3" end="3"/>
+                                            </p:txEl>
+                                          </p:spTgt>
+                                        </p:tgtEl>
+                                        <p:attrNameLst>
+                                          <p:attrName>style.visibility</p:attrName>
+                                        </p:attrNameLst>
+                                      </p:cBhvr>
+                                      <p:to>
+                                        <p:strVal val="visible"/>
+                                      </p:to>
+                                    </p:set>
+                                    <p:animEffect transition="in" filter="fade">
+                                      <p:cBhvr>
+                                        <p:cTn id="27" dur="500"/>
+                                        <p:tgtEl>
+                                          <p:spTgt spid="3">
+                                            <p:txEl>
+                                              <p:pRg st="3" end="3"/>
+                                            </p:txEl>
+                                          </p:spTgt>
+                                        </p:tgtEl>
+                                      </p:cBhvr>
+                                    </p:animEffect>
+                                  </p:childTnLst>
+                                </p:cTn>
+                              </p:par>
+                            </p:childTnLst>
+                          </p:cTn>
+                        </p:par>
+                      </p:childTnLst>
+                    </p:cTn>
+                  </p:par>
+                  <p:par>
+                    <p:cTn id="28" fill="hold">
+                      <p:stCondLst>
+                        <p:cond delay="indefinite"/>
+                      </p:stCondLst>
+                      <p:childTnLst>
+                        <p:par>
+                          <p:cTn id="29" fill="hold">
+                            <p:stCondLst>
+                              <p:cond delay="0"/>
+                            </p:stCondLst>
+                            <p:childTnLst>
+                              <p:par>
+                                <p:cTn id="30" presetID="10" presetClass="entr" presetSubtype="0" fill="hold" nodeType="clickEffect">
+                                  <p:stCondLst>
+                                    <p:cond delay="0"/>
+                                  </p:stCondLst>
+                                  <p:childTnLst>
+                                    <p:set>
+                                      <p:cBhvr>
+                                        <p:cTn id="31" dur="1" fill="hold">
+                                          <p:stCondLst>
+                                            <p:cond delay="0"/>
+                                          </p:stCondLst>
+                                        </p:cTn>
+                                        <p:tgtEl>
+                                          <p:spTgt spid="3">
+                                            <p:txEl>
+                                              <p:pRg st="5" end="5"/>
+                                            </p:txEl>
+                                          </p:spTgt>
+                                        </p:tgtEl>
+                                        <p:attrNameLst>
+                                          <p:attrName>style.visibility</p:attrName>
+                                        </p:attrNameLst>
+                                      </p:cBhvr>
+                                      <p:to>
+                                        <p:strVal val="visible"/>
+                                      </p:to>
+                                    </p:set>
+                                    <p:animEffect transition="in" filter="fade">
+                                      <p:cBhvr>
+                                        <p:cTn id="32" dur="500"/>
+                                        <p:tgtEl>
+                                          <p:spTgt spid="3">
+                                            <p:txEl>
+                                              <p:pRg st="5" end="5"/>
+                                            </p:txEl>
+                                          </p:spTgt>
+                                        </p:tgtEl>
+                                      </p:cBhvr>
+                                    </p:animEffect>
+                                  </p:childTnLst>
+                                </p:cTn>
+                              </p:par>
+                            </p:childTnLst>
+                          </p:cTn>
+                        </p:par>
+                      </p:childTnLst>
+                    </p:cTn>
+                  </p:par>
+                  <p:par>
+                    <p:cTn id="33" fill="hold">
+                      <p:stCondLst>
+                        <p:cond delay="indefinite"/>
+                      </p:stCondLst>
+                      <p:childTnLst>
+                        <p:par>
+                          <p:cTn id="34" fill="hold">
+                            <p:stCondLst>
+                              <p:cond delay="0"/>
+                            </p:stCondLst>
+                            <p:childTnLst>
+                              <p:par>
+                                <p:cTn id="35" presetID="10" presetClass="entr" presetSubtype="0" fill="hold" nodeType="clickEffect">
+                                  <p:stCondLst>
+                                    <p:cond delay="0"/>
+                                  </p:stCondLst>
+                                  <p:childTnLst>
+                                    <p:set>
+                                      <p:cBhvr>
+                                        <p:cTn id="36" dur="1" fill="hold">
+                                          <p:stCondLst>
+                                            <p:cond delay="0"/>
+                                          </p:stCondLst>
+                                        </p:cTn>
+                                        <p:tgtEl>
+                                          <p:spTgt spid="3">
+                                            <p:txEl>
+                                              <p:pRg st="7" end="7"/>
+                                            </p:txEl>
+                                          </p:spTgt>
+                                        </p:tgtEl>
+                                        <p:attrNameLst>
+                                          <p:attrName>style.visibility</p:attrName>
+                                        </p:attrNameLst>
+                                      </p:cBhvr>
+                                      <p:to>
+                                        <p:strVal val="visible"/>
+                                      </p:to>
+                                    </p:set>
+                                    <p:animEffect transition="in" filter="fade">
+                                      <p:cBhvr>
+                                        <p:cTn id="37" dur="500"/>
+                                        <p:tgtEl>
+                                          <p:spTgt spid="3">
+                                            <p:txEl>
+                                              <p:pRg st="7" end="7"/>
                                             </p:txEl>
                                           </p:spTgt>
                                         </p:tgtEl>

</xml_diff>